<commit_message>
Test variant for playing unencrypted file, debugging
</commit_message>
<xml_diff>
--- a/docs/SGX Enclave Programming - Common Mistakes.pptx
+++ b/docs/SGX Enclave Programming - Common Mistakes.pptx
@@ -5,7 +5,7 @@
     <p:sldMasterId id="2147483696" r:id="rId1"/>
   </p:sldMasterIdLst>
   <p:notesMasterIdLst>
-    <p:notesMasterId r:id="rId52"/>
+    <p:notesMasterId r:id="rId53"/>
   </p:notesMasterIdLst>
   <p:sldIdLst>
     <p:sldId id="256" r:id="rId2"/>
@@ -56,8 +56,9 @@
     <p:sldId id="282" r:id="rId47"/>
     <p:sldId id="307" r:id="rId48"/>
     <p:sldId id="291" r:id="rId49"/>
-    <p:sldId id="269" r:id="rId50"/>
-    <p:sldId id="265" r:id="rId51"/>
+    <p:sldId id="315" r:id="rId50"/>
+    <p:sldId id="269" r:id="rId51"/>
+    <p:sldId id="265" r:id="rId52"/>
   </p:sldIdLst>
   <p:sldSz cx="12192000" cy="6858000"/>
   <p:notesSz cx="6858000" cy="9144000"/>
@@ -162,10 +163,6 @@
     </p:ext>
   </p:extLst>
 </p:presentation>
-</file>
-
-<file path=ppt/revisionInfo.xml><?xml version="1.0" encoding="utf-8"?>
-<p1510:revInfo xmlns:a="http://schemas.openxmlformats.org/drawingml/2006/main" xmlns:r="http://schemas.openxmlformats.org/officeDocument/2006/relationships" xmlns:p1510="http://schemas.microsoft.com/office/powerpoint/2015/10/main"/>
 </file>
 
 <file path=ppt/notesMasters/notesMaster1.xml><?xml version="1.0" encoding="utf-8"?>
@@ -5475,7 +5472,7 @@
           <a:p>
             <a:fld id="{CD8728AD-2EC3-CF45-89B7-24476471A0CA}" type="slidenum">
               <a:rPr lang="ru-RU" smtClean="0"/>
-              <a:t>49</a:t>
+              <a:t>50</a:t>
             </a:fld>
             <a:endParaRPr lang="ru-RU"/>
           </a:p>
@@ -5569,7 +5566,7 @@
           <a:p>
             <a:fld id="{CD8728AD-2EC3-CF45-89B7-24476471A0CA}" type="slidenum">
               <a:rPr lang="ru-RU" smtClean="0"/>
-              <a:t>50</a:t>
+              <a:t>51</a:t>
             </a:fld>
             <a:endParaRPr lang="ru-RU"/>
           </a:p>
@@ -30443,9 +30440,15 @@
           </a:p>
           <a:p>
             <a:r>
-              <a:rPr lang="en-US" dirty="0"/>
-              <a:t>[insert links]</a:t>
-            </a:r>
+              <a:rPr lang="en-US" dirty="0">
+                <a:hlinkClick r:id="rId3"/>
+              </a:rPr>
+              <a:t>https://github.com/wireshrink/RECONMTL-2017</a:t>
+            </a:r>
+            <a:endParaRPr lang="en-US" dirty="0"/>
+          </a:p>
+          <a:p>
+            <a:endParaRPr lang="en-US" dirty="0"/>
           </a:p>
         </p:txBody>
       </p:sp>
@@ -35036,7 +35039,7 @@
       </p:grpSpPr>
       <p:sp>
         <p:nvSpPr>
-          <p:cNvPr id="2" name="Title 1"/>
+          <p:cNvPr id="2" name="כותרת 1"/>
           <p:cNvSpPr>
             <a:spLocks noGrp="1"/>
           </p:cNvSpPr>
@@ -35051,14 +35054,14 @@
           <a:p>
             <a:r>
               <a:rPr lang="en-US" dirty="0"/>
-              <a:t>Note on involved crypto</a:t>
-            </a:r>
-          </a:p>
-        </p:txBody>
-      </p:sp>
-      <p:sp>
-        <p:nvSpPr>
-          <p:cNvPr id="3" name="Content Placeholder 2"/>
+              <a:t>Why can’t I sign it myself</a:t>
+            </a:r>
+          </a:p>
+        </p:txBody>
+      </p:sp>
+      <p:sp>
+        <p:nvSpPr>
+          <p:cNvPr id="3" name="מציין מיקום תוכן 2"/>
           <p:cNvSpPr>
             <a:spLocks noGrp="1"/>
           </p:cNvSpPr>
@@ -35068,19 +35071,83 @@
         </p:nvSpPr>
         <p:spPr/>
         <p:txBody>
-          <a:bodyPr/>
+          <a:bodyPr>
+            <a:normAutofit fontScale="47500" lnSpcReduction="20000"/>
+          </a:bodyPr>
           <a:lstStyle/>
           <a:p>
             <a:r>
-              <a:rPr lang="en-US" dirty="0"/>
-              <a:t>AES GCM is used for sealing data</a:t>
-            </a:r>
-          </a:p>
-          <a:p>
-            <a:r>
-              <a:rPr lang="en-US" dirty="0"/>
-              <a:t>EPID and other things are out of scope</a:t>
-            </a:r>
+              <a:rPr lang="en-US" dirty="0">
+                <a:hlinkClick r:id="rId2"/>
+              </a:rPr>
+              <a:t>https://software.intel.com/en-us/license/intel-software-guard-extensions-licensee-guide</a:t>
+            </a:r>
+            <a:endParaRPr lang="en-US" dirty="0"/>
+          </a:p>
+          <a:p>
+            <a:r>
+              <a:rPr lang="en-US" dirty="0"/>
+              <a:t>“ In addition, Licensees should:</a:t>
+            </a:r>
+          </a:p>
+          <a:p>
+            <a:r>
+              <a:rPr lang="en-US" dirty="0"/>
+              <a:t>Observe industry secure coding best practices for software development to avoid vulnerabilities (such practices might include a secure software development framework, coding standards, data input validation, least access possible, secure logging, and so on).</a:t>
+            </a:r>
+          </a:p>
+          <a:p>
+            <a:r>
+              <a:rPr lang="en-US" dirty="0"/>
+              <a:t>Address and fix significant security vulnerabilities within a reasonable time, or within a time frame established under existing disclosure arrangements between Intel and the Licensee, after becoming aware of the vulnerability.</a:t>
+            </a:r>
+          </a:p>
+          <a:p>
+            <a:r>
+              <a:rPr lang="en-US" dirty="0"/>
+              <a:t>Ensure that the licensed application installer, or the operating environment in which the application resides, includes the most current Platform Software (PSW) Installer for Intel SGX.</a:t>
+            </a:r>
+          </a:p>
+          <a:p>
+            <a:r>
+              <a:rPr lang="en-US" dirty="0"/>
+              <a:t>Ensure that end-users receive PSW updates via application update mechanism, or via the operating environment in which the application resides.</a:t>
+            </a:r>
+          </a:p>
+          <a:p>
+            <a:r>
+              <a:rPr lang="en-US" dirty="0"/>
+              <a:t>Observe best industry practices to: (</a:t>
+            </a:r>
+            <a:r>
+              <a:rPr lang="en-US" dirty="0" err="1"/>
+              <a:t>i</a:t>
+            </a:r>
+            <a:r>
+              <a:rPr lang="en-US" dirty="0"/>
+              <a:t>) not write malware, spyware or other nuisance software; (ii) </a:t>
+            </a:r>
+            <a:r>
+              <a:rPr lang="en-US" b="1" u="sng" dirty="0">
+                <a:solidFill>
+                  <a:srgbClr val="FF0000"/>
+                </a:solidFill>
+              </a:rPr>
+              <a:t>not write poorly designed software that contains significant security vulnerabilities or that fails to deliver its security promise</a:t>
+            </a:r>
+            <a:r>
+              <a:rPr lang="en-US" dirty="0"/>
+              <a:t>.</a:t>
+            </a:r>
+          </a:p>
+          <a:p>
+            <a:r>
+              <a:rPr lang="en-US" dirty="0"/>
+              <a:t>Construct Licensed Software Applications to enable complete removal on end user request, including removal of any sealed data.”</a:t>
+            </a:r>
+          </a:p>
+          <a:p>
+            <a:endParaRPr lang="en-US" dirty="0"/>
           </a:p>
         </p:txBody>
       </p:sp>
@@ -35110,7 +35177,7 @@
     </p:spTree>
     <p:extLst>
       <p:ext uri="{BB962C8B-B14F-4D97-AF65-F5344CB8AC3E}">
-        <p14:creationId xmlns:p14="http://schemas.microsoft.com/office/powerpoint/2010/main" val="2498105173"/>
+        <p14:creationId xmlns:p14="http://schemas.microsoft.com/office/powerpoint/2010/main" val="994950159"/>
       </p:ext>
     </p:extLst>
   </p:cSld>
@@ -35257,6 +35324,109 @@
           <a:p>
             <a:r>
               <a:rPr lang="en-US" dirty="0"/>
+              <a:t>Note on involved crypto</a:t>
+            </a:r>
+          </a:p>
+        </p:txBody>
+      </p:sp>
+      <p:sp>
+        <p:nvSpPr>
+          <p:cNvPr id="3" name="Content Placeholder 2"/>
+          <p:cNvSpPr>
+            <a:spLocks noGrp="1"/>
+          </p:cNvSpPr>
+          <p:nvPr>
+            <p:ph idx="1"/>
+          </p:nvPr>
+        </p:nvSpPr>
+        <p:spPr/>
+        <p:txBody>
+          <a:bodyPr/>
+          <a:lstStyle/>
+          <a:p>
+            <a:r>
+              <a:rPr lang="en-US" dirty="0"/>
+              <a:t>AES GCM is used for sealing data</a:t>
+            </a:r>
+          </a:p>
+          <a:p>
+            <a:r>
+              <a:rPr lang="en-US" dirty="0"/>
+              <a:t>EPID and other things are out of scope</a:t>
+            </a:r>
+          </a:p>
+        </p:txBody>
+      </p:sp>
+      <p:sp>
+        <p:nvSpPr>
+          <p:cNvPr id="4" name="מציין מיקום של מספר שקופית 3"/>
+          <p:cNvSpPr>
+            <a:spLocks noGrp="1"/>
+          </p:cNvSpPr>
+          <p:nvPr>
+            <p:ph type="sldNum" sz="quarter" idx="12"/>
+          </p:nvPr>
+        </p:nvSpPr>
+        <p:spPr/>
+        <p:txBody>
+          <a:bodyPr/>
+          <a:lstStyle/>
+          <a:p>
+            <a:fld id="{E49B20E1-BFBC-4C97-821D-580820242ED4}" type="slidenum">
+              <a:rPr lang="en-US" smtClean="0"/>
+              <a:t>50</a:t>
+            </a:fld>
+            <a:endParaRPr lang="en-US"/>
+          </a:p>
+        </p:txBody>
+      </p:sp>
+    </p:spTree>
+    <p:extLst>
+      <p:ext uri="{BB962C8B-B14F-4D97-AF65-F5344CB8AC3E}">
+        <p14:creationId xmlns:p14="http://schemas.microsoft.com/office/powerpoint/2010/main" val="2498105173"/>
+      </p:ext>
+    </p:extLst>
+  </p:cSld>
+  <p:clrMapOvr>
+    <a:masterClrMapping/>
+  </p:clrMapOvr>
+</p:sld>
+</file>
+
+<file path=ppt/slides/slide51.xml><?xml version="1.0" encoding="utf-8"?>
+<p:sld xmlns:a="http://schemas.openxmlformats.org/drawingml/2006/main" xmlns:r="http://schemas.openxmlformats.org/officeDocument/2006/relationships" xmlns:p="http://schemas.openxmlformats.org/presentationml/2006/main">
+  <p:cSld>
+    <p:spTree>
+      <p:nvGrpSpPr>
+        <p:cNvPr id="1" name=""/>
+        <p:cNvGrpSpPr/>
+        <p:nvPr/>
+      </p:nvGrpSpPr>
+      <p:grpSpPr>
+        <a:xfrm>
+          <a:off x="0" y="0"/>
+          <a:ext cx="0" cy="0"/>
+          <a:chOff x="0" y="0"/>
+          <a:chExt cx="0" cy="0"/>
+        </a:xfrm>
+      </p:grpSpPr>
+      <p:sp>
+        <p:nvSpPr>
+          <p:cNvPr id="2" name="Title 1"/>
+          <p:cNvSpPr>
+            <a:spLocks noGrp="1"/>
+          </p:cNvSpPr>
+          <p:nvPr>
+            <p:ph type="title"/>
+          </p:nvPr>
+        </p:nvSpPr>
+        <p:spPr/>
+        <p:txBody>
+          <a:bodyPr/>
+          <a:lstStyle/>
+          <a:p>
+            <a:r>
+              <a:rPr lang="en-US" dirty="0"/>
               <a:t>SGX instructions</a:t>
             </a:r>
           </a:p>
@@ -35472,7 +35642,7 @@
           <a:p>
             <a:fld id="{E49B20E1-BFBC-4C97-821D-580820242ED4}" type="slidenum">
               <a:rPr lang="en-US" smtClean="0"/>
-              <a:t>50</a:t>
+              <a:t>51</a:t>
             </a:fld>
             <a:endParaRPr lang="en-US"/>
           </a:p>

</xml_diff>

<commit_message>
Independent of rdrand sealing compiles
</commit_message>
<xml_diff>
--- a/docs/SGX Enclave Programming - Common Mistakes.pptx
+++ b/docs/SGX Enclave Programming - Common Mistakes.pptx
@@ -31784,7 +31784,15 @@
             <a:pPr lvl="1"/>
             <a:r>
               <a:rPr lang="en-US" dirty="0"/>
-              <a:t>AES GCM IV exhaustion with sealing </a:t>
+              <a:t>Key </a:t>
+            </a:r>
+            <a:r>
+              <a:rPr lang="en-US"/>
+              <a:t>material and AES </a:t>
+            </a:r>
+            <a:r>
+              <a:rPr lang="en-US" dirty="0"/>
+              <a:t>GCM IV exhaustion with sealing </a:t>
             </a:r>
           </a:p>
           <a:p>

</xml_diff>

<commit_message>
Adding a threatening comment for every file
I really dont want this to be used as a template for working projects
</commit_message>
<xml_diff>
--- a/docs/SGX Enclave Programming - Common Mistakes.pptx
+++ b/docs/SGX Enclave Programming - Common Mistakes.pptx
@@ -5,7 +5,7 @@
     <p:sldMasterId id="2147483696" r:id="rId1"/>
   </p:sldMasterIdLst>
   <p:notesMasterIdLst>
-    <p:notesMasterId r:id="rId53"/>
+    <p:notesMasterId r:id="rId54"/>
   </p:notesMasterIdLst>
   <p:sldIdLst>
     <p:sldId id="256" r:id="rId2"/>
@@ -51,14 +51,15 @@
     <p:sldId id="280" r:id="rId42"/>
     <p:sldId id="281" r:id="rId43"/>
     <p:sldId id="283" r:id="rId44"/>
-    <p:sldId id="284" r:id="rId45"/>
-    <p:sldId id="261" r:id="rId46"/>
-    <p:sldId id="282" r:id="rId47"/>
-    <p:sldId id="307" r:id="rId48"/>
-    <p:sldId id="291" r:id="rId49"/>
-    <p:sldId id="315" r:id="rId50"/>
-    <p:sldId id="269" r:id="rId51"/>
-    <p:sldId id="265" r:id="rId52"/>
+    <p:sldId id="316" r:id="rId45"/>
+    <p:sldId id="284" r:id="rId46"/>
+    <p:sldId id="261" r:id="rId47"/>
+    <p:sldId id="282" r:id="rId48"/>
+    <p:sldId id="307" r:id="rId49"/>
+    <p:sldId id="291" r:id="rId50"/>
+    <p:sldId id="315" r:id="rId51"/>
+    <p:sldId id="269" r:id="rId52"/>
+    <p:sldId id="265" r:id="rId53"/>
   </p:sldIdLst>
   <p:sldSz cx="12192000" cy="6858000"/>
   <p:notesSz cx="6858000" cy="9144000"/>
@@ -165,6 +166,10 @@
 </p:presentation>
 </file>
 
+<file path=ppt/revisionInfo.xml><?xml version="1.0" encoding="utf-8"?>
+<p1510:revInfo xmlns:a="http://schemas.openxmlformats.org/drawingml/2006/main" xmlns:r="http://schemas.openxmlformats.org/officeDocument/2006/relationships" xmlns:p1510="http://schemas.microsoft.com/office/powerpoint/2015/10/main"/>
+</file>
+
 <file path=ppt/notesMasters/notesMaster1.xml><?xml version="1.0" encoding="utf-8"?>
 <p:notesMaster xmlns:a="http://schemas.openxmlformats.org/drawingml/2006/main" xmlns:r="http://schemas.openxmlformats.org/officeDocument/2006/relationships" xmlns:p="http://schemas.openxmlformats.org/presentationml/2006/main">
   <p:cSld>
@@ -247,7 +252,7 @@
           <a:p>
             <a:fld id="{7A0F84C6-4B66-FC4F-9BD6-6F53B9E68AE3}" type="datetimeFigureOut">
               <a:rPr lang="ru-RU" smtClean="0"/>
-              <a:t>26.05.2017</a:t>
+              <a:t>10.06.2017</a:t>
             </a:fld>
             <a:endParaRPr lang="ru-RU"/>
           </a:p>
@@ -5272,7 +5277,7 @@
           <a:p>
             <a:fld id="{CD8728AD-2EC3-CF45-89B7-24476471A0CA}" type="slidenum">
               <a:rPr lang="ru-RU" smtClean="0"/>
-              <a:t>45</a:t>
+              <a:t>46</a:t>
             </a:fld>
             <a:endParaRPr lang="ru-RU"/>
           </a:p>
@@ -5368,7 +5373,7 @@
           <a:p>
             <a:fld id="{CD8728AD-2EC3-CF45-89B7-24476471A0CA}" type="slidenum">
               <a:rPr lang="ru-RU" smtClean="0"/>
-              <a:t>48</a:t>
+              <a:t>49</a:t>
             </a:fld>
             <a:endParaRPr lang="ru-RU"/>
           </a:p>
@@ -5472,7 +5477,7 @@
           <a:p>
             <a:fld id="{CD8728AD-2EC3-CF45-89B7-24476471A0CA}" type="slidenum">
               <a:rPr lang="ru-RU" smtClean="0"/>
-              <a:t>50</a:t>
+              <a:t>51</a:t>
             </a:fld>
             <a:endParaRPr lang="ru-RU"/>
           </a:p>
@@ -5566,7 +5571,7 @@
           <a:p>
             <a:fld id="{CD8728AD-2EC3-CF45-89B7-24476471A0CA}" type="slidenum">
               <a:rPr lang="ru-RU" smtClean="0"/>
-              <a:t>51</a:t>
+              <a:t>52</a:t>
             </a:fld>
             <a:endParaRPr lang="ru-RU"/>
           </a:p>
@@ -10468,7 +10473,7 @@
           <a:p>
             <a:fld id="{41DCBB70-9A08-4AA5-A271-721B6525CB9F}" type="datetime1">
               <a:rPr lang="en-US" smtClean="0"/>
-              <a:t>5/26/2017</a:t>
+              <a:t>6/10/2017</a:t>
             </a:fld>
             <a:endParaRPr lang="en-US"/>
           </a:p>
@@ -10735,7 +10740,7 @@
           <a:p>
             <a:fld id="{9E661AA1-C993-49F4-84DE-675C7065B200}" type="datetime1">
               <a:rPr lang="en-US" smtClean="0"/>
-              <a:t>5/26/2017</a:t>
+              <a:t>6/10/2017</a:t>
             </a:fld>
             <a:endParaRPr lang="en-US"/>
           </a:p>
@@ -10931,7 +10936,7 @@
           <a:p>
             <a:fld id="{35ED3023-723E-443F-8079-577C9EEE921C}" type="datetime1">
               <a:rPr lang="en-US" smtClean="0"/>
-              <a:t>5/26/2017</a:t>
+              <a:t>6/10/2017</a:t>
             </a:fld>
             <a:endParaRPr lang="en-US"/>
           </a:p>
@@ -11194,7 +11199,7 @@
           <a:p>
             <a:fld id="{6B73FD1C-B51A-48F7-AC02-2F0D97D814F7}" type="datetime1">
               <a:rPr lang="en-US" smtClean="0"/>
-              <a:t>5/26/2017</a:t>
+              <a:t>6/10/2017</a:t>
             </a:fld>
             <a:endParaRPr lang="en-US"/>
           </a:p>
@@ -11628,7 +11633,7 @@
           <a:p>
             <a:fld id="{FB8D9E83-F75A-43AD-B2ED-7E8CAF48F668}" type="datetime1">
               <a:rPr lang="en-US" smtClean="0"/>
-              <a:t>5/26/2017</a:t>
+              <a:t>6/10/2017</a:t>
             </a:fld>
             <a:endParaRPr lang="en-US"/>
           </a:p>
@@ -12174,7 +12179,7 @@
           <a:p>
             <a:fld id="{768A83B0-3BAE-4E53-B5B7-0FF7FE737D64}" type="datetime1">
               <a:rPr lang="en-US" smtClean="0"/>
-              <a:t>5/26/2017</a:t>
+              <a:t>6/10/2017</a:t>
             </a:fld>
             <a:endParaRPr lang="en-US"/>
           </a:p>
@@ -12894,7 +12899,7 @@
           <a:p>
             <a:fld id="{B16730D7-1777-41F9-B918-BBBB96CD566E}" type="datetime1">
               <a:rPr lang="en-US" smtClean="0"/>
-              <a:t>5/26/2017</a:t>
+              <a:t>6/10/2017</a:t>
             </a:fld>
             <a:endParaRPr lang="en-US"/>
           </a:p>
@@ -13064,7 +13069,7 @@
           <a:p>
             <a:fld id="{6D09EAFD-48A8-461E-BE3C-44687419BF39}" type="datetime1">
               <a:rPr lang="en-US" smtClean="0"/>
-              <a:t>5/26/2017</a:t>
+              <a:t>6/10/2017</a:t>
             </a:fld>
             <a:endParaRPr lang="en-US"/>
           </a:p>
@@ -13244,7 +13249,7 @@
           <a:p>
             <a:fld id="{8FD3B498-F311-4C43-B1BB-5A8293E0A9A4}" type="datetime1">
               <a:rPr lang="en-US" smtClean="0"/>
-              <a:t>5/26/2017</a:t>
+              <a:t>6/10/2017</a:t>
             </a:fld>
             <a:endParaRPr lang="en-US"/>
           </a:p>
@@ -13414,7 +13419,7 @@
           <a:p>
             <a:fld id="{883771BF-CA23-432F-8D8B-D4805A2FDC25}" type="datetime1">
               <a:rPr lang="en-US" smtClean="0"/>
-              <a:t>5/26/2017</a:t>
+              <a:t>6/10/2017</a:t>
             </a:fld>
             <a:endParaRPr lang="en-US"/>
           </a:p>
@@ -13664,7 +13669,7 @@
           <a:p>
             <a:fld id="{1D68C36A-6259-4E5A-A049-3DCA1D14583C}" type="datetime1">
               <a:rPr lang="en-US" smtClean="0"/>
-              <a:t>5/26/2017</a:t>
+              <a:t>6/10/2017</a:t>
             </a:fld>
             <a:endParaRPr lang="en-US"/>
           </a:p>
@@ -13896,7 +13901,7 @@
           <a:p>
             <a:fld id="{F34191F4-FB8B-48CA-AE1C-459EE9927C52}" type="datetime1">
               <a:rPr lang="en-US" smtClean="0"/>
-              <a:t>5/26/2017</a:t>
+              <a:t>6/10/2017</a:t>
             </a:fld>
             <a:endParaRPr lang="en-US"/>
           </a:p>
@@ -14277,7 +14282,7 @@
           <a:p>
             <a:fld id="{1A00DB3D-0C93-46F0-85AD-FA7B3F55FC09}" type="datetime1">
               <a:rPr lang="en-US" smtClean="0"/>
-              <a:t>5/26/2017</a:t>
+              <a:t>6/10/2017</a:t>
             </a:fld>
             <a:endParaRPr lang="en-US"/>
           </a:p>
@@ -14395,7 +14400,7 @@
           <a:p>
             <a:fld id="{497B238E-31D3-4B1F-B348-185C972FE44A}" type="datetime1">
               <a:rPr lang="en-US" smtClean="0"/>
-              <a:t>5/26/2017</a:t>
+              <a:t>6/10/2017</a:t>
             </a:fld>
             <a:endParaRPr lang="en-US"/>
           </a:p>
@@ -14490,7 +14495,7 @@
           <a:p>
             <a:fld id="{19582FB6-8FF1-4BD0-8894-95577FB7710C}" type="datetime1">
               <a:rPr lang="en-US" smtClean="0"/>
-              <a:t>5/26/2017</a:t>
+              <a:t>6/10/2017</a:t>
             </a:fld>
             <a:endParaRPr lang="en-US"/>
           </a:p>
@@ -14739,7 +14744,7 @@
           <a:p>
             <a:fld id="{4DA5B7C6-DBC3-44D3-B529-A12A76EAA082}" type="datetime1">
               <a:rPr lang="en-US" smtClean="0"/>
-              <a:t>5/26/2017</a:t>
+              <a:t>6/10/2017</a:t>
             </a:fld>
             <a:endParaRPr lang="en-US"/>
           </a:p>
@@ -15019,7 +15024,7 @@
           <a:p>
             <a:fld id="{A5E04D17-1D2A-4495-A1D2-AEA6C5658C0F}" type="datetime1">
               <a:rPr lang="en-US" smtClean="0"/>
-              <a:t>5/26/2017</a:t>
+              <a:t>6/10/2017</a:t>
             </a:fld>
             <a:endParaRPr lang="en-US"/>
           </a:p>
@@ -18096,7 +18101,7 @@
           <a:p>
             <a:fld id="{0780C3C2-E360-4074-89B7-939D42F4D217}" type="datetime1">
               <a:rPr lang="en-US" smtClean="0"/>
-              <a:t>5/26/2017</a:t>
+              <a:t>6/10/2017</a:t>
             </a:fld>
             <a:endParaRPr lang="en-US"/>
           </a:p>
@@ -20668,7 +20673,14 @@
             <a:pPr lvl="1"/>
             <a:r>
               <a:rPr lang="en-US" dirty="0"/>
-              <a:t>Predefined enclaves (quoting, licensing, provisioning)	</a:t>
+              <a:t>Predefined enclaves (quoting, licensing, provisioning)</a:t>
+            </a:r>
+          </a:p>
+          <a:p>
+            <a:pPr lvl="1"/>
+            <a:r>
+              <a:rPr lang="en-US" dirty="0"/>
+              <a:t>Driver	</a:t>
             </a:r>
           </a:p>
           <a:p>
@@ -30435,7 +30447,7 @@
           <a:p>
             <a:r>
               <a:rPr lang="en-US" dirty="0"/>
-              <a:t>If you can sign the enclave – try to break in pre-release mode</a:t>
+              <a:t>If you cannot sign the enclave – try to break in pre-release mode</a:t>
             </a:r>
           </a:p>
           <a:p>
@@ -30544,7 +30556,7 @@
           <a:p>
             <a:r>
               <a:rPr lang="en-US" dirty="0"/>
-              <a:t>All mistakes deliberately inserted to “DVSE” were observed in real life in “finished” or “near to production” quality code</a:t>
+              <a:t>All mistakes deliberately inserted to “DVSE” were observed in real life in “finished” or “near to production” quality code more than one time</a:t>
             </a:r>
           </a:p>
           <a:p>
@@ -31282,7 +31294,7 @@
             <a:pPr lvl="1"/>
             <a:r>
               <a:rPr lang="en-US" dirty="0"/>
-              <a:t>Assumed to be protected with obfuscation and anti-debugging</a:t>
+              <a:t>Assumed to be protected with obfuscation and anti-debugging in the real life target </a:t>
             </a:r>
           </a:p>
           <a:p>
@@ -31293,17 +31305,31 @@
             </a:r>
           </a:p>
           <a:p>
+            <a:pPr lvl="2"/>
+            <a:r>
+              <a:rPr lang="en-US" dirty="0"/>
+              <a:t>Not used here: it is an exercise </a:t>
+            </a:r>
+          </a:p>
+          <a:p>
             <a:pPr lvl="1"/>
             <a:r>
               <a:rPr lang="en-US" dirty="0"/>
-              <a:t>Secure channel between the application and the enclave is established for DRM defense simulation (random AES key inside an enclave)</a:t>
+              <a:t>Assumed to be protected with remote attestation</a:t>
+            </a:r>
+          </a:p>
+          <a:p>
+            <a:pPr lvl="2"/>
+            <a:r>
+              <a:rPr lang="en-US" dirty="0"/>
+              <a:t>Not used here: it is an exercise </a:t>
             </a:r>
           </a:p>
           <a:p>
             <a:pPr lvl="1"/>
             <a:r>
               <a:rPr lang="en-US" u="sng" dirty="0"/>
-              <a:t>The goal is not to hack the application, but to hack the SGX enclave</a:t>
+              <a:t>The goal is not to hack the application, but to hack the badly written SGX enclave</a:t>
             </a:r>
           </a:p>
           <a:p>
@@ -31421,6 +31447,13 @@
             </a:r>
           </a:p>
           <a:p>
+            <a:pPr lvl="1"/>
+            <a:r>
+              <a:rPr lang="en-US" dirty="0"/>
+              <a:t>SSL with self-signed certificates (sha1 of the certificate is checked inside the enclave)</a:t>
+            </a:r>
+          </a:p>
+          <a:p>
             <a:endParaRPr lang="en-US" dirty="0"/>
           </a:p>
         </p:txBody>
@@ -31529,7 +31562,7 @@
           <a:p>
             <a:r>
               <a:rPr lang="en-US" dirty="0"/>
-              <a:t>Run server on a local machine, add media to the media folder</a:t>
+              <a:t>Run server on a local machine(media is already inside, public domain cartoons)</a:t>
             </a:r>
           </a:p>
           <a:p>
@@ -31791,7 +31824,7 @@
             <a:pPr lvl="1"/>
             <a:r>
               <a:rPr lang="en-US" dirty="0"/>
-              <a:t>Not constant time crypto-algorithms</a:t>
+              <a:t>Not constant time crypto and other sensitive algorithms</a:t>
             </a:r>
           </a:p>
           <a:p>
@@ -34360,7 +34393,13 @@
       </p:grpSpPr>
       <p:sp>
         <p:nvSpPr>
-          <p:cNvPr id="2" name="Title 1"/>
+          <p:cNvPr id="2" name="כותרת 1">
+            <a:extLst>
+              <a:ext uri="{FF2B5EF4-FFF2-40B4-BE49-F238E27FC236}">
+                <a16:creationId xmlns:a16="http://schemas.microsoft.com/office/drawing/2014/main" id="{2441E693-AAC6-490E-AAB9-F3263105878D}"/>
+              </a:ext>
+            </a:extLst>
+          </p:cNvPr>
           <p:cNvSpPr>
             <a:spLocks noGrp="1"/>
           </p:cNvSpPr>
@@ -34375,21 +34414,20 @@
           <a:p>
             <a:r>
               <a:rPr lang="en-US" dirty="0"/>
-              <a:t>BTW, Intel opened a bug bounty program </a:t>
-            </a:r>
-            <a:r>
-              <a:rPr lang="en-US" dirty="0">
-                <a:sym typeface="Wingdings" panose="05000000000000000000" pitchFamily="2" charset="2"/>
-              </a:rPr>
-              <a:t></a:t>
-            </a:r>
-            <a:endParaRPr lang="en-US" dirty="0"/>
-          </a:p>
-        </p:txBody>
-      </p:sp>
-      <p:sp>
-        <p:nvSpPr>
-          <p:cNvPr id="3" name="Content Placeholder 2"/>
+              <a:t>Future work</a:t>
+            </a:r>
+          </a:p>
+        </p:txBody>
+      </p:sp>
+      <p:sp>
+        <p:nvSpPr>
+          <p:cNvPr id="3" name="מציין מיקום תוכן 2">
+            <a:extLst>
+              <a:ext uri="{FF2B5EF4-FFF2-40B4-BE49-F238E27FC236}">
+                <a16:creationId xmlns:a16="http://schemas.microsoft.com/office/drawing/2014/main" id="{40D7FADA-349C-4F46-A92A-84063BD0ED85}"/>
+              </a:ext>
+            </a:extLst>
+          </p:cNvPr>
           <p:cNvSpPr>
             <a:spLocks noGrp="1"/>
           </p:cNvSpPr>
@@ -34403,37 +34441,33 @@
           <a:lstStyle/>
           <a:p>
             <a:r>
-              <a:rPr lang="en-US" dirty="0">
-                <a:hlinkClick r:id="rId2"/>
-              </a:rPr>
-              <a:t>https://security-center.intel.com/BugBountyProgram.aspx</a:t>
-            </a:r>
-            <a:endParaRPr lang="en-US" dirty="0"/>
-          </a:p>
-          <a:p>
-            <a:r>
-              <a:rPr lang="en-US" dirty="0"/>
-              <a:t>All the PSW is a critical part of the infrastructure</a:t>
-            </a:r>
-          </a:p>
-          <a:p>
-            <a:pPr lvl="1"/>
-            <a:r>
-              <a:rPr lang="en-US" dirty="0"/>
-              <a:t>Bugs which are found sooner are easier to cure</a:t>
-            </a:r>
-          </a:p>
-          <a:p>
-            <a:pPr marL="0" indent="0">
-              <a:buNone/>
-            </a:pPr>
-            <a:endParaRPr lang="en-US" dirty="0"/>
-          </a:p>
-        </p:txBody>
-      </p:sp>
-      <p:sp>
-        <p:nvSpPr>
-          <p:cNvPr id="4" name="מציין מיקום של מספר שקופית 3"/>
+              <a:rPr lang="en-US" dirty="0"/>
+              <a:t>Porting it to Linux</a:t>
+            </a:r>
+          </a:p>
+          <a:p>
+            <a:r>
+              <a:rPr lang="en-US" dirty="0"/>
+              <a:t>Publishing exploits</a:t>
+            </a:r>
+          </a:p>
+          <a:p>
+            <a:r>
+              <a:rPr lang="en-US" dirty="0"/>
+              <a:t>Automatic deduction of the enclave ECALLs/OCALLs from binary analysis</a:t>
+            </a:r>
+          </a:p>
+        </p:txBody>
+      </p:sp>
+      <p:sp>
+        <p:nvSpPr>
+          <p:cNvPr id="4" name="מציין מיקום של מספר שקופית 3">
+            <a:extLst>
+              <a:ext uri="{FF2B5EF4-FFF2-40B4-BE49-F238E27FC236}">
+                <a16:creationId xmlns:a16="http://schemas.microsoft.com/office/drawing/2014/main" id="{DCC7083C-F067-4A46-953F-24D561884803}"/>
+              </a:ext>
+            </a:extLst>
+          </p:cNvPr>
           <p:cNvSpPr>
             <a:spLocks noGrp="1"/>
           </p:cNvSpPr>
@@ -34457,7 +34491,7 @@
     </p:spTree>
     <p:extLst>
       <p:ext uri="{BB962C8B-B14F-4D97-AF65-F5344CB8AC3E}">
-        <p14:creationId xmlns:p14="http://schemas.microsoft.com/office/powerpoint/2010/main" val="2106738480"/>
+        <p14:creationId xmlns:p14="http://schemas.microsoft.com/office/powerpoint/2010/main" val="2338012447"/>
       </p:ext>
     </p:extLst>
   </p:cSld>
@@ -34501,8 +34535,15 @@
           <a:p>
             <a:r>
               <a:rPr lang="en-US" dirty="0"/>
-              <a:t>enclave – USEFUL links</a:t>
-            </a:r>
+              <a:t>BTW, Intel opened a bug bounty program </a:t>
+            </a:r>
+            <a:r>
+              <a:rPr lang="en-US" dirty="0">
+                <a:sym typeface="Wingdings" panose="05000000000000000000" pitchFamily="2" charset="2"/>
+              </a:rPr>
+              <a:t></a:t>
+            </a:r>
+            <a:endParaRPr lang="en-US" dirty="0"/>
           </a:p>
         </p:txBody>
       </p:sp>
@@ -34518,120 +34559,34 @@
         </p:nvSpPr>
         <p:spPr/>
         <p:txBody>
-          <a:bodyPr>
-            <a:normAutofit fontScale="62500" lnSpcReduction="20000"/>
-          </a:bodyPr>
-          <a:lstStyle/>
-          <a:p>
-            <a:r>
-              <a:rPr lang="en-US" dirty="0"/>
-              <a:t>Where to start : </a:t>
-            </a:r>
+          <a:bodyPr/>
+          <a:lstStyle/>
+          <a:p>
             <a:r>
               <a:rPr lang="en-US" dirty="0">
-                <a:hlinkClick r:id="rId3"/>
+                <a:hlinkClick r:id="rId2"/>
               </a:rPr>
-              <a:t>https://software.intel.com/en-us/sgx</a:t>
-            </a:r>
-            <a:r>
-              <a:rPr lang="en-US" dirty="0"/>
-              <a:t> </a:t>
-            </a:r>
-          </a:p>
-          <a:p>
-            <a:r>
-              <a:rPr lang="en-US" dirty="0"/>
-              <a:t>ISCA 2015 SGX tutorial: </a:t>
-            </a:r>
-            <a:r>
-              <a:rPr lang="en-US" dirty="0">
-                <a:hlinkClick r:id="rId4"/>
-              </a:rPr>
-              <a:t>https://software.intel.com/sites/default/files/332680-002.pdf</a:t>
+              <a:t>https://security-center.intel.com/BugBountyProgram.aspx</a:t>
             </a:r>
             <a:endParaRPr lang="en-US" dirty="0"/>
           </a:p>
           <a:p>
             <a:r>
               <a:rPr lang="en-US" dirty="0"/>
-              <a:t>Good external analysis: </a:t>
-            </a:r>
-            <a:r>
-              <a:rPr lang="en-US" dirty="0">
-                <a:hlinkClick r:id="rId5"/>
-              </a:rPr>
-              <a:t>http://eprint.iacr.org/2016/086.pdf</a:t>
-            </a:r>
-            <a:r>
-              <a:rPr lang="en-US" dirty="0"/>
-              <a:t> </a:t>
-            </a:r>
-          </a:p>
-          <a:p>
-            <a:r>
-              <a:rPr lang="en-US" dirty="0"/>
-              <a:t>For HW - SDM is the best: Vol. 3D : </a:t>
-            </a:r>
-            <a:r>
-              <a:rPr lang="en-US" dirty="0">
-                <a:hlinkClick r:id="rId6"/>
-              </a:rPr>
-              <a:t>http://www.intel.com/content/dam/www/public/us/en/documents/manuals/64-ia-32-architectures-software-developer-manual-325462.pdf</a:t>
-            </a:r>
-            <a:r>
-              <a:rPr lang="en-US" dirty="0"/>
-              <a:t> </a:t>
-            </a:r>
-          </a:p>
-          <a:p>
-            <a:r>
-              <a:rPr lang="en-US" dirty="0"/>
-              <a:t>Linux SDK and platform software</a:t>
+              <a:t>All the PSW is a critical part of the infrastructure</a:t>
             </a:r>
           </a:p>
           <a:p>
             <a:pPr lvl="1"/>
             <a:r>
-              <a:rPr lang="en-US" dirty="0">
-                <a:hlinkClick r:id="rId7"/>
-              </a:rPr>
-              <a:t>https://01.org/intel-softwareguard-extensions</a:t>
-            </a:r>
-            <a:r>
-              <a:rPr lang="en-US" dirty="0"/>
-              <a:t>  </a:t>
-            </a:r>
-          </a:p>
-          <a:p>
-            <a:pPr lvl="1"/>
-            <a:r>
-              <a:rPr lang="en-US" dirty="0">
-                <a:hlinkClick r:id="rId8"/>
-              </a:rPr>
-              <a:t>https://github.com/01org/linux-sgx</a:t>
-            </a:r>
-            <a:r>
-              <a:rPr lang="en-US" dirty="0"/>
-              <a:t> </a:t>
-            </a:r>
-          </a:p>
-          <a:p>
-            <a:r>
-              <a:rPr lang="en-US" dirty="0"/>
-              <a:t>Enclave writers guide </a:t>
-            </a:r>
-            <a:r>
-              <a:rPr lang="en-US" dirty="0">
-                <a:hlinkClick r:id="rId9"/>
-              </a:rPr>
-              <a:t>https://software.intel.com/sites/default/files/managed/ae/48/Software-Guard-Extensions-Enclave-Writers-Guide.pdf</a:t>
-            </a:r>
-            <a:r>
-              <a:rPr lang="en-US" dirty="0"/>
-              <a:t>   </a:t>
-            </a:r>
-          </a:p>
-          <a:p>
+              <a:rPr lang="en-US" dirty="0"/>
+              <a:t>Bugs which are found sooner are easier to cure</a:t>
+            </a:r>
+          </a:p>
+          <a:p>
+            <a:pPr marL="0" indent="0">
+              <a:buNone/>
+            </a:pPr>
             <a:endParaRPr lang="en-US" dirty="0"/>
           </a:p>
         </p:txBody>
@@ -34662,7 +34617,7 @@
     </p:spTree>
     <p:extLst>
       <p:ext uri="{BB962C8B-B14F-4D97-AF65-F5344CB8AC3E}">
-        <p14:creationId xmlns:p14="http://schemas.microsoft.com/office/powerpoint/2010/main" val="3255152671"/>
+        <p14:creationId xmlns:p14="http://schemas.microsoft.com/office/powerpoint/2010/main" val="2106738480"/>
       </p:ext>
     </p:extLst>
   </p:cSld>
@@ -34706,7 +34661,7 @@
           <a:p>
             <a:r>
               <a:rPr lang="en-US" dirty="0"/>
-              <a:t>Questions</a:t>
+              <a:t>enclave – USEFUL links</a:t>
             </a:r>
           </a:p>
         </p:txBody>
@@ -34723,13 +34678,121 @@
         </p:nvSpPr>
         <p:spPr/>
         <p:txBody>
-          <a:bodyPr/>
-          <a:lstStyle/>
-          <a:p>
-            <a:r>
-              <a:rPr lang="en-US" dirty="0"/>
-              <a:t>Please ?</a:t>
-            </a:r>
+          <a:bodyPr>
+            <a:normAutofit fontScale="62500" lnSpcReduction="20000"/>
+          </a:bodyPr>
+          <a:lstStyle/>
+          <a:p>
+            <a:r>
+              <a:rPr lang="en-US" dirty="0"/>
+              <a:t>Where to start : </a:t>
+            </a:r>
+            <a:r>
+              <a:rPr lang="en-US" dirty="0">
+                <a:hlinkClick r:id="rId3"/>
+              </a:rPr>
+              <a:t>https://software.intel.com/en-us/sgx</a:t>
+            </a:r>
+            <a:r>
+              <a:rPr lang="en-US" dirty="0"/>
+              <a:t> </a:t>
+            </a:r>
+          </a:p>
+          <a:p>
+            <a:r>
+              <a:rPr lang="en-US" dirty="0"/>
+              <a:t>ISCA 2015 SGX tutorial: </a:t>
+            </a:r>
+            <a:r>
+              <a:rPr lang="en-US" dirty="0">
+                <a:hlinkClick r:id="rId4"/>
+              </a:rPr>
+              <a:t>https://software.intel.com/sites/default/files/332680-002.pdf</a:t>
+            </a:r>
+            <a:endParaRPr lang="en-US" dirty="0"/>
+          </a:p>
+          <a:p>
+            <a:r>
+              <a:rPr lang="en-US" dirty="0"/>
+              <a:t>Good external analysis: </a:t>
+            </a:r>
+            <a:r>
+              <a:rPr lang="en-US" dirty="0">
+                <a:hlinkClick r:id="rId5"/>
+              </a:rPr>
+              <a:t>http://eprint.iacr.org/2016/086.pdf</a:t>
+            </a:r>
+            <a:r>
+              <a:rPr lang="en-US" dirty="0"/>
+              <a:t> </a:t>
+            </a:r>
+          </a:p>
+          <a:p>
+            <a:r>
+              <a:rPr lang="en-US" dirty="0"/>
+              <a:t>For HW - SDM is the best: Vol. 3D : </a:t>
+            </a:r>
+            <a:r>
+              <a:rPr lang="en-US" dirty="0">
+                <a:hlinkClick r:id="rId6"/>
+              </a:rPr>
+              <a:t>http://www.intel.com/content/dam/www/public/us/en/documents/manuals/64-ia-32-architectures-software-developer-manual-325462.pdf</a:t>
+            </a:r>
+            <a:r>
+              <a:rPr lang="en-US" dirty="0"/>
+              <a:t> </a:t>
+            </a:r>
+          </a:p>
+          <a:p>
+            <a:r>
+              <a:rPr lang="en-US" dirty="0"/>
+              <a:t>Linux SDK and platform software</a:t>
+            </a:r>
+          </a:p>
+          <a:p>
+            <a:pPr lvl="1"/>
+            <a:r>
+              <a:rPr lang="en-US" dirty="0">
+                <a:hlinkClick r:id="rId7"/>
+              </a:rPr>
+              <a:t>https://01.org/intel-softwareguard-extensions</a:t>
+            </a:r>
+            <a:r>
+              <a:rPr lang="en-US" dirty="0"/>
+              <a:t>  </a:t>
+            </a:r>
+          </a:p>
+          <a:p>
+            <a:pPr lvl="1"/>
+            <a:r>
+              <a:rPr lang="en-US" dirty="0">
+                <a:hlinkClick r:id="rId8"/>
+              </a:rPr>
+              <a:t>https://github.com/01org/linux-sgx</a:t>
+            </a:r>
+            <a:r>
+              <a:rPr lang="en-US" dirty="0"/>
+              <a:t> </a:t>
+            </a:r>
+          </a:p>
+          <a:p>
+            <a:r>
+              <a:rPr lang="en-US" dirty="0"/>
+              <a:t>Enclave writers guide </a:t>
+            </a:r>
+            <a:r>
+              <a:rPr lang="en-US" dirty="0">
+                <a:hlinkClick r:id="rId9"/>
+              </a:rPr>
+              <a:t>https://software.intel.com/sites/default/files/managed/ae/48/Software-Guard-Extensions-Enclave-Writers-Guide.pdf</a:t>
+            </a:r>
+            <a:r>
+              <a:rPr lang="en-US" dirty="0"/>
+              <a:t>   </a:t>
+            </a:r>
+          </a:p>
+          <a:p>
+            <a:endParaRPr lang="en-US" dirty="0"/>
           </a:p>
         </p:txBody>
       </p:sp>
@@ -34759,7 +34822,7 @@
     </p:spTree>
     <p:extLst>
       <p:ext uri="{BB962C8B-B14F-4D97-AF65-F5344CB8AC3E}">
-        <p14:creationId xmlns:p14="http://schemas.microsoft.com/office/powerpoint/2010/main" val="3073879730"/>
+        <p14:creationId xmlns:p14="http://schemas.microsoft.com/office/powerpoint/2010/main" val="3255152671"/>
       </p:ext>
     </p:extLst>
   </p:cSld>
@@ -34803,7 +34866,7 @@
           <a:p>
             <a:r>
               <a:rPr lang="en-US" dirty="0"/>
-              <a:t>backup</a:t>
+              <a:t>Questions</a:t>
             </a:r>
           </a:p>
         </p:txBody>
@@ -34823,7 +34886,10 @@
           <a:bodyPr/>
           <a:lstStyle/>
           <a:p>
-            <a:endParaRPr lang="en-US"/>
+            <a:r>
+              <a:rPr lang="en-US" dirty="0"/>
+              <a:t>Please ?</a:t>
+            </a:r>
           </a:p>
         </p:txBody>
       </p:sp>
@@ -34853,7 +34919,7 @@
     </p:spTree>
     <p:extLst>
       <p:ext uri="{BB962C8B-B14F-4D97-AF65-F5344CB8AC3E}">
-        <p14:creationId xmlns:p14="http://schemas.microsoft.com/office/powerpoint/2010/main" val="811180702"/>
+        <p14:creationId xmlns:p14="http://schemas.microsoft.com/office/powerpoint/2010/main" val="3073879730"/>
       </p:ext>
     </p:extLst>
   </p:cSld>
@@ -34882,7 +34948,7 @@
       </p:grpSpPr>
       <p:sp>
         <p:nvSpPr>
-          <p:cNvPr id="2" name="Заголовок 1"/>
+          <p:cNvPr id="2" name="Title 1"/>
           <p:cNvSpPr>
             <a:spLocks noGrp="1"/>
           </p:cNvSpPr>
@@ -34897,96 +34963,33 @@
           <a:p>
             <a:r>
               <a:rPr lang="en-US" dirty="0"/>
-              <a:t>Note on SGX sealing key derivation material</a:t>
-            </a:r>
-            <a:endParaRPr lang="ru-RU" dirty="0"/>
-          </a:p>
-        </p:txBody>
-      </p:sp>
-      <p:pic>
-        <p:nvPicPr>
-          <p:cNvPr id="5" name="Рисунок 4"/>
-          <p:cNvPicPr>
-            <a:picLocks noChangeAspect="1"/>
-          </p:cNvPicPr>
-          <p:nvPr/>
-        </p:nvPicPr>
-        <p:blipFill rotWithShape="1">
-          <a:blip r:embed="rId3"/>
-          <a:srcRect l="20086" t="38769" r="24273" b="24513"/>
-          <a:stretch/>
-        </p:blipFill>
-        <p:spPr>
-          <a:xfrm>
-            <a:off x="684212" y="2128104"/>
-            <a:ext cx="8534400" cy="3615267"/>
-          </a:xfrm>
-          <a:prstGeom prst="rect">
-            <a:avLst/>
-          </a:prstGeom>
-        </p:spPr>
-      </p:pic>
-      <p:sp>
-        <p:nvSpPr>
-          <p:cNvPr id="6" name="TextBox 5"/>
-          <p:cNvSpPr txBox="1"/>
-          <p:nvPr/>
-        </p:nvSpPr>
-        <p:spPr>
-          <a:xfrm>
-            <a:off x="9556749" y="2249487"/>
-            <a:ext cx="2489982" cy="2585323"/>
-          </a:xfrm>
-          <a:prstGeom prst="rect">
-            <a:avLst/>
-          </a:prstGeom>
-          <a:noFill/>
-        </p:spPr>
-        <p:txBody>
-          <a:bodyPr wrap="square" rtlCol="0">
-            <a:spAutoFit/>
-          </a:bodyPr>
-          <a:lstStyle/>
-          <a:p>
-            <a:pPr marL="285750" indent="-285750">
-              <a:buFont typeface="Arial" charset="0"/>
-              <a:buChar char="•"/>
-            </a:pPr>
-            <a:r>
-              <a:rPr lang="en-US" dirty="0"/>
-              <a:t>+ Fuses, of course (CR_SEAL_FUSES in terms of SDM, the screenshot is from there)</a:t>
-            </a:r>
-          </a:p>
-          <a:p>
-            <a:pPr marL="285750" indent="-285750">
-              <a:buFont typeface="Arial" charset="0"/>
-              <a:buChar char="•"/>
-            </a:pPr>
-            <a:r>
-              <a:rPr lang="en-US" dirty="0"/>
-              <a:t>Note Sealing key </a:t>
-            </a:r>
-            <a:r>
-              <a:rPr lang="mr-IN" dirty="0"/>
-              <a:t>–</a:t>
-            </a:r>
-            <a:r>
-              <a:rPr lang="en-US" dirty="0"/>
-              <a:t> it is enclave or signer specific</a:t>
-            </a:r>
-          </a:p>
-          <a:p>
-            <a:pPr marL="285750" indent="-285750">
-              <a:buFont typeface="Arial" charset="0"/>
-              <a:buChar char="•"/>
-            </a:pPr>
-            <a:endParaRPr lang="ru-RU" dirty="0"/>
-          </a:p>
-        </p:txBody>
-      </p:sp>
-      <p:sp>
-        <p:nvSpPr>
-          <p:cNvPr id="3" name="מציין מיקום של מספר שקופית 2"/>
+              <a:t>backup</a:t>
+            </a:r>
+          </a:p>
+        </p:txBody>
+      </p:sp>
+      <p:sp>
+        <p:nvSpPr>
+          <p:cNvPr id="3" name="Content Placeholder 2"/>
+          <p:cNvSpPr>
+            <a:spLocks noGrp="1"/>
+          </p:cNvSpPr>
+          <p:nvPr>
+            <p:ph idx="1"/>
+          </p:nvPr>
+        </p:nvSpPr>
+        <p:spPr/>
+        <p:txBody>
+          <a:bodyPr/>
+          <a:lstStyle/>
+          <a:p>
+            <a:endParaRPr lang="en-US"/>
+          </a:p>
+        </p:txBody>
+      </p:sp>
+      <p:sp>
+        <p:nvSpPr>
+          <p:cNvPr id="4" name="מציין מיקום של מספר שקופית 3"/>
           <p:cNvSpPr>
             <a:spLocks noGrp="1"/>
           </p:cNvSpPr>
@@ -35010,7 +35013,7 @@
     </p:spTree>
     <p:extLst>
       <p:ext uri="{BB962C8B-B14F-4D97-AF65-F5344CB8AC3E}">
-        <p14:creationId xmlns:p14="http://schemas.microsoft.com/office/powerpoint/2010/main" val="1130062494"/>
+        <p14:creationId xmlns:p14="http://schemas.microsoft.com/office/powerpoint/2010/main" val="811180702"/>
       </p:ext>
     </p:extLst>
   </p:cSld>
@@ -35039,7 +35042,7 @@
       </p:grpSpPr>
       <p:sp>
         <p:nvSpPr>
-          <p:cNvPr id="2" name="כותרת 1"/>
+          <p:cNvPr id="2" name="Заголовок 1"/>
           <p:cNvSpPr>
             <a:spLocks noGrp="1"/>
           </p:cNvSpPr>
@@ -35054,106 +35057,96 @@
           <a:p>
             <a:r>
               <a:rPr lang="en-US" dirty="0"/>
-              <a:t>Why can’t I sign it myself</a:t>
-            </a:r>
-          </a:p>
-        </p:txBody>
-      </p:sp>
-      <p:sp>
-        <p:nvSpPr>
-          <p:cNvPr id="3" name="מציין מיקום תוכן 2"/>
-          <p:cNvSpPr>
-            <a:spLocks noGrp="1"/>
-          </p:cNvSpPr>
-          <p:nvPr>
-            <p:ph idx="1"/>
-          </p:nvPr>
-        </p:nvSpPr>
-        <p:spPr/>
-        <p:txBody>
-          <a:bodyPr>
-            <a:normAutofit fontScale="47500" lnSpcReduction="20000"/>
+              <a:t>Note on SGX sealing key derivation material</a:t>
+            </a:r>
+            <a:endParaRPr lang="ru-RU" dirty="0"/>
+          </a:p>
+        </p:txBody>
+      </p:sp>
+      <p:pic>
+        <p:nvPicPr>
+          <p:cNvPr id="5" name="Рисунок 4"/>
+          <p:cNvPicPr>
+            <a:picLocks noChangeAspect="1"/>
+          </p:cNvPicPr>
+          <p:nvPr/>
+        </p:nvPicPr>
+        <p:blipFill rotWithShape="1">
+          <a:blip r:embed="rId3"/>
+          <a:srcRect l="20086" t="38769" r="24273" b="24513"/>
+          <a:stretch/>
+        </p:blipFill>
+        <p:spPr>
+          <a:xfrm>
+            <a:off x="684212" y="2128104"/>
+            <a:ext cx="8534400" cy="3615267"/>
+          </a:xfrm>
+          <a:prstGeom prst="rect">
+            <a:avLst/>
+          </a:prstGeom>
+        </p:spPr>
+      </p:pic>
+      <p:sp>
+        <p:nvSpPr>
+          <p:cNvPr id="6" name="TextBox 5"/>
+          <p:cNvSpPr txBox="1"/>
+          <p:nvPr/>
+        </p:nvSpPr>
+        <p:spPr>
+          <a:xfrm>
+            <a:off x="9556749" y="2249487"/>
+            <a:ext cx="2489982" cy="2585323"/>
+          </a:xfrm>
+          <a:prstGeom prst="rect">
+            <a:avLst/>
+          </a:prstGeom>
+          <a:noFill/>
+        </p:spPr>
+        <p:txBody>
+          <a:bodyPr wrap="square" rtlCol="0">
+            <a:spAutoFit/>
           </a:bodyPr>
           <a:lstStyle/>
           <a:p>
-            <a:r>
-              <a:rPr lang="en-US" dirty="0">
-                <a:hlinkClick r:id="rId2"/>
-              </a:rPr>
-              <a:t>https://software.intel.com/en-us/license/intel-software-guard-extensions-licensee-guide</a:t>
-            </a:r>
-            <a:endParaRPr lang="en-US" dirty="0"/>
-          </a:p>
-          <a:p>
-            <a:r>
-              <a:rPr lang="en-US" dirty="0"/>
-              <a:t>“ In addition, Licensees should:</a:t>
-            </a:r>
-          </a:p>
-          <a:p>
-            <a:r>
-              <a:rPr lang="en-US" dirty="0"/>
-              <a:t>Observe industry secure coding best practices for software development to avoid vulnerabilities (such practices might include a secure software development framework, coding standards, data input validation, least access possible, secure logging, and so on).</a:t>
-            </a:r>
-          </a:p>
-          <a:p>
-            <a:r>
-              <a:rPr lang="en-US" dirty="0"/>
-              <a:t>Address and fix significant security vulnerabilities within a reasonable time, or within a time frame established under existing disclosure arrangements between Intel and the Licensee, after becoming aware of the vulnerability.</a:t>
-            </a:r>
-          </a:p>
-          <a:p>
-            <a:r>
-              <a:rPr lang="en-US" dirty="0"/>
-              <a:t>Ensure that the licensed application installer, or the operating environment in which the application resides, includes the most current Platform Software (PSW) Installer for Intel SGX.</a:t>
-            </a:r>
-          </a:p>
-          <a:p>
-            <a:r>
-              <a:rPr lang="en-US" dirty="0"/>
-              <a:t>Ensure that end-users receive PSW updates via application update mechanism, or via the operating environment in which the application resides.</a:t>
-            </a:r>
-          </a:p>
-          <a:p>
-            <a:r>
-              <a:rPr lang="en-US" dirty="0"/>
-              <a:t>Observe best industry practices to: (</a:t>
-            </a:r>
-            <a:r>
-              <a:rPr lang="en-US" dirty="0" err="1"/>
-              <a:t>i</a:t>
-            </a:r>
-            <a:r>
-              <a:rPr lang="en-US" dirty="0"/>
-              <a:t>) not write malware, spyware or other nuisance software; (ii) </a:t>
-            </a:r>
-            <a:r>
-              <a:rPr lang="en-US" b="1" u="sng" dirty="0">
-                <a:solidFill>
-                  <a:srgbClr val="FF0000"/>
-                </a:solidFill>
-              </a:rPr>
-              <a:t>not write poorly designed software that contains significant security vulnerabilities or that fails to deliver its security promise</a:t>
-            </a:r>
-            <a:r>
-              <a:rPr lang="en-US" dirty="0"/>
-              <a:t>.</a:t>
-            </a:r>
-          </a:p>
-          <a:p>
-            <a:r>
-              <a:rPr lang="en-US" dirty="0"/>
-              <a:t>Construct Licensed Software Applications to enable complete removal on end user request, including removal of any sealed data.”</a:t>
-            </a:r>
-          </a:p>
-          <a:p>
-            <a:endParaRPr lang="en-US" dirty="0"/>
-          </a:p>
-        </p:txBody>
-      </p:sp>
-      <p:sp>
-        <p:nvSpPr>
-          <p:cNvPr id="4" name="מציין מיקום של מספר שקופית 3"/>
+            <a:pPr marL="285750" indent="-285750">
+              <a:buFont typeface="Arial" charset="0"/>
+              <a:buChar char="•"/>
+            </a:pPr>
+            <a:r>
+              <a:rPr lang="en-US" dirty="0"/>
+              <a:t>+ Fuses, of course (CR_SEAL_FUSES in terms of SDM, the screenshot is from there)</a:t>
+            </a:r>
+          </a:p>
+          <a:p>
+            <a:pPr marL="285750" indent="-285750">
+              <a:buFont typeface="Arial" charset="0"/>
+              <a:buChar char="•"/>
+            </a:pPr>
+            <a:r>
+              <a:rPr lang="en-US" dirty="0"/>
+              <a:t>Note Sealing key </a:t>
+            </a:r>
+            <a:r>
+              <a:rPr lang="mr-IN" dirty="0"/>
+              <a:t>–</a:t>
+            </a:r>
+            <a:r>
+              <a:rPr lang="en-US" dirty="0"/>
+              <a:t> it is enclave or signer specific</a:t>
+            </a:r>
+          </a:p>
+          <a:p>
+            <a:pPr marL="285750" indent="-285750">
+              <a:buFont typeface="Arial" charset="0"/>
+              <a:buChar char="•"/>
+            </a:pPr>
+            <a:endParaRPr lang="ru-RU" dirty="0"/>
+          </a:p>
+        </p:txBody>
+      </p:sp>
+      <p:sp>
+        <p:nvSpPr>
+          <p:cNvPr id="3" name="מציין מיקום של מספר שקופית 2"/>
           <p:cNvSpPr>
             <a:spLocks noGrp="1"/>
           </p:cNvSpPr>
@@ -35177,7 +35170,7 @@
     </p:spTree>
     <p:extLst>
       <p:ext uri="{BB962C8B-B14F-4D97-AF65-F5344CB8AC3E}">
-        <p14:creationId xmlns:p14="http://schemas.microsoft.com/office/powerpoint/2010/main" val="994950159"/>
+        <p14:creationId xmlns:p14="http://schemas.microsoft.com/office/powerpoint/2010/main" val="1130062494"/>
       </p:ext>
     </p:extLst>
   </p:cSld>
@@ -35309,7 +35302,7 @@
       </p:grpSpPr>
       <p:sp>
         <p:nvSpPr>
-          <p:cNvPr id="2" name="Title 1"/>
+          <p:cNvPr id="2" name="כותרת 1"/>
           <p:cNvSpPr>
             <a:spLocks noGrp="1"/>
           </p:cNvSpPr>
@@ -35324,14 +35317,14 @@
           <a:p>
             <a:r>
               <a:rPr lang="en-US" dirty="0"/>
-              <a:t>Note on involved crypto</a:t>
-            </a:r>
-          </a:p>
-        </p:txBody>
-      </p:sp>
-      <p:sp>
-        <p:nvSpPr>
-          <p:cNvPr id="3" name="Content Placeholder 2"/>
+              <a:t>Why can’t I sign it myself</a:t>
+            </a:r>
+          </a:p>
+        </p:txBody>
+      </p:sp>
+      <p:sp>
+        <p:nvSpPr>
+          <p:cNvPr id="3" name="מציין מיקום תוכן 2"/>
           <p:cNvSpPr>
             <a:spLocks noGrp="1"/>
           </p:cNvSpPr>
@@ -35341,19 +35334,83 @@
         </p:nvSpPr>
         <p:spPr/>
         <p:txBody>
-          <a:bodyPr/>
-          <a:lstStyle/>
-          <a:p>
-            <a:r>
-              <a:rPr lang="en-US" dirty="0"/>
-              <a:t>AES GCM is used for sealing data</a:t>
-            </a:r>
-          </a:p>
-          <a:p>
-            <a:r>
-              <a:rPr lang="en-US" dirty="0"/>
-              <a:t>EPID and other things are out of scope</a:t>
-            </a:r>
+          <a:bodyPr>
+            <a:normAutofit fontScale="47500" lnSpcReduction="20000"/>
+          </a:bodyPr>
+          <a:lstStyle/>
+          <a:p>
+            <a:r>
+              <a:rPr lang="en-US" dirty="0">
+                <a:hlinkClick r:id="rId2"/>
+              </a:rPr>
+              <a:t>https://software.intel.com/en-us/license/intel-software-guard-extensions-licensee-guide</a:t>
+            </a:r>
+            <a:endParaRPr lang="en-US" dirty="0"/>
+          </a:p>
+          <a:p>
+            <a:r>
+              <a:rPr lang="en-US" dirty="0"/>
+              <a:t>“ In addition, Licensees should:</a:t>
+            </a:r>
+          </a:p>
+          <a:p>
+            <a:r>
+              <a:rPr lang="en-US" dirty="0"/>
+              <a:t>Observe industry secure coding best practices for software development to avoid vulnerabilities (such practices might include a secure software development framework, coding standards, data input validation, least access possible, secure logging, and so on).</a:t>
+            </a:r>
+          </a:p>
+          <a:p>
+            <a:r>
+              <a:rPr lang="en-US" dirty="0"/>
+              <a:t>Address and fix significant security vulnerabilities within a reasonable time, or within a time frame established under existing disclosure arrangements between Intel and the Licensee, after becoming aware of the vulnerability.</a:t>
+            </a:r>
+          </a:p>
+          <a:p>
+            <a:r>
+              <a:rPr lang="en-US" dirty="0"/>
+              <a:t>Ensure that the licensed application installer, or the operating environment in which the application resides, includes the most current Platform Software (PSW) Installer for Intel SGX.</a:t>
+            </a:r>
+          </a:p>
+          <a:p>
+            <a:r>
+              <a:rPr lang="en-US" dirty="0"/>
+              <a:t>Ensure that end-users receive PSW updates via application update mechanism, or via the operating environment in which the application resides.</a:t>
+            </a:r>
+          </a:p>
+          <a:p>
+            <a:r>
+              <a:rPr lang="en-US" dirty="0"/>
+              <a:t>Observe best industry practices to: (</a:t>
+            </a:r>
+            <a:r>
+              <a:rPr lang="en-US" dirty="0" err="1"/>
+              <a:t>i</a:t>
+            </a:r>
+            <a:r>
+              <a:rPr lang="en-US" dirty="0"/>
+              <a:t>) not write malware, spyware or other nuisance software; (ii) </a:t>
+            </a:r>
+            <a:r>
+              <a:rPr lang="en-US" b="1" u="sng" dirty="0">
+                <a:solidFill>
+                  <a:srgbClr val="FF0000"/>
+                </a:solidFill>
+              </a:rPr>
+              <a:t>not write poorly designed software that contains significant security vulnerabilities or that fails to deliver its security promise</a:t>
+            </a:r>
+            <a:r>
+              <a:rPr lang="en-US" dirty="0"/>
+              <a:t>.</a:t>
+            </a:r>
+          </a:p>
+          <a:p>
+            <a:r>
+              <a:rPr lang="en-US" dirty="0"/>
+              <a:t>Construct Licensed Software Applications to enable complete removal on end user request, including removal of any sealed data.”</a:t>
+            </a:r>
+          </a:p>
+          <a:p>
+            <a:endParaRPr lang="en-US" dirty="0"/>
           </a:p>
         </p:txBody>
       </p:sp>
@@ -35383,7 +35440,7 @@
     </p:spTree>
     <p:extLst>
       <p:ext uri="{BB962C8B-B14F-4D97-AF65-F5344CB8AC3E}">
-        <p14:creationId xmlns:p14="http://schemas.microsoft.com/office/powerpoint/2010/main" val="2498105173"/>
+        <p14:creationId xmlns:p14="http://schemas.microsoft.com/office/powerpoint/2010/main" val="994950159"/>
       </p:ext>
     </p:extLst>
   </p:cSld>
@@ -35427,6 +35484,109 @@
           <a:p>
             <a:r>
               <a:rPr lang="en-US" dirty="0"/>
+              <a:t>Note on involved crypto</a:t>
+            </a:r>
+          </a:p>
+        </p:txBody>
+      </p:sp>
+      <p:sp>
+        <p:nvSpPr>
+          <p:cNvPr id="3" name="Content Placeholder 2"/>
+          <p:cNvSpPr>
+            <a:spLocks noGrp="1"/>
+          </p:cNvSpPr>
+          <p:nvPr>
+            <p:ph idx="1"/>
+          </p:nvPr>
+        </p:nvSpPr>
+        <p:spPr/>
+        <p:txBody>
+          <a:bodyPr/>
+          <a:lstStyle/>
+          <a:p>
+            <a:r>
+              <a:rPr lang="en-US" dirty="0"/>
+              <a:t>AES GCM is used for sealing data</a:t>
+            </a:r>
+          </a:p>
+          <a:p>
+            <a:r>
+              <a:rPr lang="en-US" dirty="0"/>
+              <a:t>EPID and other things are out of scope</a:t>
+            </a:r>
+          </a:p>
+        </p:txBody>
+      </p:sp>
+      <p:sp>
+        <p:nvSpPr>
+          <p:cNvPr id="4" name="מציין מיקום של מספר שקופית 3"/>
+          <p:cNvSpPr>
+            <a:spLocks noGrp="1"/>
+          </p:cNvSpPr>
+          <p:nvPr>
+            <p:ph type="sldNum" sz="quarter" idx="12"/>
+          </p:nvPr>
+        </p:nvSpPr>
+        <p:spPr/>
+        <p:txBody>
+          <a:bodyPr/>
+          <a:lstStyle/>
+          <a:p>
+            <a:fld id="{E49B20E1-BFBC-4C97-821D-580820242ED4}" type="slidenum">
+              <a:rPr lang="en-US" smtClean="0"/>
+              <a:t>51</a:t>
+            </a:fld>
+            <a:endParaRPr lang="en-US"/>
+          </a:p>
+        </p:txBody>
+      </p:sp>
+    </p:spTree>
+    <p:extLst>
+      <p:ext uri="{BB962C8B-B14F-4D97-AF65-F5344CB8AC3E}">
+        <p14:creationId xmlns:p14="http://schemas.microsoft.com/office/powerpoint/2010/main" val="2498105173"/>
+      </p:ext>
+    </p:extLst>
+  </p:cSld>
+  <p:clrMapOvr>
+    <a:masterClrMapping/>
+  </p:clrMapOvr>
+</p:sld>
+</file>
+
+<file path=ppt/slides/slide52.xml><?xml version="1.0" encoding="utf-8"?>
+<p:sld xmlns:a="http://schemas.openxmlformats.org/drawingml/2006/main" xmlns:r="http://schemas.openxmlformats.org/officeDocument/2006/relationships" xmlns:p="http://schemas.openxmlformats.org/presentationml/2006/main">
+  <p:cSld>
+    <p:spTree>
+      <p:nvGrpSpPr>
+        <p:cNvPr id="1" name=""/>
+        <p:cNvGrpSpPr/>
+        <p:nvPr/>
+      </p:nvGrpSpPr>
+      <p:grpSpPr>
+        <a:xfrm>
+          <a:off x="0" y="0"/>
+          <a:ext cx="0" cy="0"/>
+          <a:chOff x="0" y="0"/>
+          <a:chExt cx="0" cy="0"/>
+        </a:xfrm>
+      </p:grpSpPr>
+      <p:sp>
+        <p:nvSpPr>
+          <p:cNvPr id="2" name="Title 1"/>
+          <p:cNvSpPr>
+            <a:spLocks noGrp="1"/>
+          </p:cNvSpPr>
+          <p:nvPr>
+            <p:ph type="title"/>
+          </p:nvPr>
+        </p:nvSpPr>
+        <p:spPr/>
+        <p:txBody>
+          <a:bodyPr/>
+          <a:lstStyle/>
+          <a:p>
+            <a:r>
+              <a:rPr lang="en-US" dirty="0"/>
               <a:t>SGX instructions</a:t>
             </a:r>
           </a:p>
@@ -35642,7 +35802,7 @@
           <a:p>
             <a:fld id="{E49B20E1-BFBC-4C97-821D-580820242ED4}" type="slidenum">
               <a:rPr lang="en-US" smtClean="0"/>
-              <a:t>51</a:t>
+              <a:t>52</a:t>
             </a:fld>
             <a:endParaRPr lang="en-US"/>
           </a:p>

</xml_diff>

<commit_message>
Cleaning warning, leaving enclave as debug for licensing gods sake
</commit_message>
<xml_diff>
--- a/docs/SGX Enclave Programming - Common Mistakes.pptx
+++ b/docs/SGX Enclave Programming - Common Mistakes.pptx
@@ -21158,7 +21158,7 @@
               <a:rPr lang="en-US" smtClean="0"/>
               <a:t>2</a:t>
             </a:fld>
-            <a:endParaRPr lang="en-US"/>
+            <a:endParaRPr lang="en-US" dirty="0"/>
           </a:p>
         </p:txBody>
       </p:sp>
@@ -31189,14 +31189,7 @@
             <a:pPr lvl="2"/>
             <a:r>
               <a:rPr lang="en-US" dirty="0"/>
-              <a:t>“Secure” subscription management</a:t>
-            </a:r>
-          </a:p>
-          <a:p>
-            <a:pPr lvl="2"/>
-            <a:r>
-              <a:rPr lang="en-US" dirty="0"/>
-              <a:t>“Secure” local library management</a:t>
+              <a:t>“Secure” local media library</a:t>
             </a:r>
           </a:p>
         </p:txBody>
@@ -31545,7 +31538,9 @@
         </p:nvSpPr>
         <p:spPr/>
         <p:txBody>
-          <a:bodyPr/>
+          <a:bodyPr>
+            <a:normAutofit lnSpcReduction="10000"/>
+          </a:bodyPr>
           <a:lstStyle/>
           <a:p>
             <a:r>
@@ -31556,7 +31551,14 @@
           <a:p>
             <a:r>
               <a:rPr lang="en-US" dirty="0"/>
-              <a:t>Compile the code</a:t>
+              <a:t>Clone and compile the code</a:t>
+            </a:r>
+          </a:p>
+          <a:p>
+            <a:pPr lvl="1"/>
+            <a:r>
+              <a:rPr lang="en-US" dirty="0"/>
+              <a:t>Write me if you have problems (wireshrink@gmail.com)</a:t>
             </a:r>
           </a:p>
           <a:p>
@@ -32251,18 +32253,7 @@
             <a:pPr lvl="1"/>
             <a:r>
               <a:rPr lang="en-US" dirty="0"/>
-              <a:t>Custom random numbers generation</a:t>
-            </a:r>
-          </a:p>
-          <a:p>
-            <a:pPr lvl="1"/>
-            <a:r>
-              <a:rPr lang="en-US" dirty="0" err="1"/>
-              <a:t>sgx_read_rand</a:t>
-            </a:r>
-            <a:r>
-              <a:rPr lang="en-US" dirty="0"/>
-              <a:t> uses RDRAND instruction </a:t>
+              <a:t>Custom random numbers generation </a:t>
             </a:r>
           </a:p>
           <a:p>
@@ -32408,15 +32399,33 @@
                                   </p:childTnLst>
                                 </p:cTn>
                               </p:par>
+                            </p:childTnLst>
+                          </p:cTn>
+                        </p:par>
+                      </p:childTnLst>
+                    </p:cTn>
+                  </p:par>
+                  <p:par>
+                    <p:cTn id="9" fill="hold">
+                      <p:stCondLst>
+                        <p:cond delay="indefinite"/>
+                      </p:stCondLst>
+                      <p:childTnLst>
+                        <p:par>
+                          <p:cTn id="10" fill="hold">
+                            <p:stCondLst>
+                              <p:cond delay="0"/>
+                            </p:stCondLst>
+                            <p:childTnLst>
                               <p:par>
-                                <p:cTn id="9" presetID="1" presetClass="entr" presetSubtype="0" fill="hold" nodeType="withEffect">
+                                <p:cTn id="11" presetID="1" presetClass="entr" presetSubtype="0" fill="hold" nodeType="clickEffect">
                                   <p:stCondLst>
                                     <p:cond delay="0"/>
                                   </p:stCondLst>
                                   <p:childTnLst>
                                     <p:set>
                                       <p:cBhvr>
-                                        <p:cTn id="10" dur="1" fill="hold">
+                                        <p:cTn id="12" dur="1" fill="hold">
                                           <p:stCondLst>
                                             <p:cond delay="0"/>
                                           </p:stCondLst>
@@ -32439,26 +32448,8 @@
                                   </p:childTnLst>
                                 </p:cTn>
                               </p:par>
-                            </p:childTnLst>
-                          </p:cTn>
-                        </p:par>
-                      </p:childTnLst>
-                    </p:cTn>
-                  </p:par>
-                  <p:par>
-                    <p:cTn id="11" fill="hold">
-                      <p:stCondLst>
-                        <p:cond delay="indefinite"/>
-                      </p:stCondLst>
-                      <p:childTnLst>
-                        <p:par>
-                          <p:cTn id="12" fill="hold">
-                            <p:stCondLst>
-                              <p:cond delay="0"/>
-                            </p:stCondLst>
-                            <p:childTnLst>
                               <p:par>
-                                <p:cTn id="13" presetID="1" presetClass="entr" presetSubtype="0" fill="hold" nodeType="clickEffect">
+                                <p:cTn id="13" presetID="1" presetClass="entr" presetSubtype="0" fill="hold" nodeType="withEffect">
                                   <p:stCondLst>
                                     <p:cond delay="0"/>
                                   </p:stCondLst>
@@ -32488,15 +32479,33 @@
                                   </p:childTnLst>
                                 </p:cTn>
                               </p:par>
+                            </p:childTnLst>
+                          </p:cTn>
+                        </p:par>
+                      </p:childTnLst>
+                    </p:cTn>
+                  </p:par>
+                  <p:par>
+                    <p:cTn id="15" fill="hold">
+                      <p:stCondLst>
+                        <p:cond delay="indefinite"/>
+                      </p:stCondLst>
+                      <p:childTnLst>
+                        <p:par>
+                          <p:cTn id="16" fill="hold">
+                            <p:stCondLst>
+                              <p:cond delay="0"/>
+                            </p:stCondLst>
+                            <p:childTnLst>
                               <p:par>
-                                <p:cTn id="15" presetID="1" presetClass="entr" presetSubtype="0" fill="hold" nodeType="withEffect">
+                                <p:cTn id="17" presetID="1" presetClass="entr" presetSubtype="0" fill="hold" nodeType="clickEffect">
                                   <p:stCondLst>
                                     <p:cond delay="0"/>
                                   </p:stCondLst>
                                   <p:childTnLst>
                                     <p:set>
                                       <p:cBhvr>
-                                        <p:cTn id="16" dur="1" fill="hold">
+                                        <p:cTn id="18" dur="1" fill="hold">
                                           <p:stCondLst>
                                             <p:cond delay="0"/>
                                           </p:stCondLst>
@@ -32526,26 +32535,26 @@
                     </p:cTn>
                   </p:par>
                   <p:par>
-                    <p:cTn id="17" fill="hold">
+                    <p:cTn id="19" fill="hold">
                       <p:stCondLst>
                         <p:cond delay="indefinite"/>
                       </p:stCondLst>
                       <p:childTnLst>
                         <p:par>
-                          <p:cTn id="18" fill="hold">
+                          <p:cTn id="20" fill="hold">
                             <p:stCondLst>
                               <p:cond delay="0"/>
                             </p:stCondLst>
                             <p:childTnLst>
                               <p:par>
-                                <p:cTn id="19" presetID="1" presetClass="entr" presetSubtype="0" fill="hold" nodeType="clickEffect">
+                                <p:cTn id="21" presetID="1" presetClass="entr" presetSubtype="0" fill="hold" nodeType="clickEffect">
                                   <p:stCondLst>
                                     <p:cond delay="0"/>
                                   </p:stCondLst>
                                   <p:childTnLst>
                                     <p:set>
                                       <p:cBhvr>
-                                        <p:cTn id="20" dur="1" fill="hold">
+                                        <p:cTn id="22" dur="1" fill="hold">
                                           <p:stCondLst>
                                             <p:cond delay="0"/>
                                           </p:stCondLst>
@@ -32554,55 +32563,6 @@
                                           <p:spTgt spid="3">
                                             <p:txEl>
                                               <p:pRg st="5" end="5"/>
-                                            </p:txEl>
-                                          </p:spTgt>
-                                        </p:tgtEl>
-                                        <p:attrNameLst>
-                                          <p:attrName>style.visibility</p:attrName>
-                                        </p:attrNameLst>
-                                      </p:cBhvr>
-                                      <p:to>
-                                        <p:strVal val="visible"/>
-                                      </p:to>
-                                    </p:set>
-                                  </p:childTnLst>
-                                </p:cTn>
-                              </p:par>
-                            </p:childTnLst>
-                          </p:cTn>
-                        </p:par>
-                      </p:childTnLst>
-                    </p:cTn>
-                  </p:par>
-                  <p:par>
-                    <p:cTn id="21" fill="hold">
-                      <p:stCondLst>
-                        <p:cond delay="indefinite"/>
-                      </p:stCondLst>
-                      <p:childTnLst>
-                        <p:par>
-                          <p:cTn id="22" fill="hold">
-                            <p:stCondLst>
-                              <p:cond delay="0"/>
-                            </p:stCondLst>
-                            <p:childTnLst>
-                              <p:par>
-                                <p:cTn id="23" presetID="1" presetClass="entr" presetSubtype="0" fill="hold" nodeType="clickEffect">
-                                  <p:stCondLst>
-                                    <p:cond delay="0"/>
-                                  </p:stCondLst>
-                                  <p:childTnLst>
-                                    <p:set>
-                                      <p:cBhvr>
-                                        <p:cTn id="24" dur="1" fill="hold">
-                                          <p:stCondLst>
-                                            <p:cond delay="0"/>
-                                          </p:stCondLst>
-                                        </p:cTn>
-                                        <p:tgtEl>
-                                          <p:spTgt spid="3">
-                                            <p:txEl>
-                                              <p:pRg st="6" end="6"/>
                                             </p:txEl>
                                           </p:spTgt>
                                         </p:tgtEl>
@@ -34090,13 +34050,13 @@
           <a:p>
             <a:r>
               <a:rPr lang="en-US" dirty="0"/>
-              <a:t>Let’s find secret exfiltration by mistake (used tools – IDA pro)</a:t>
-            </a:r>
-          </a:p>
-          <a:p>
-            <a:r>
-              <a:rPr lang="en-US" dirty="0"/>
-              <a:t>I’d be glad to help you to find all the rest (wireshrink@gmail.com) </a:t>
+              <a:t>Let’s find secret exfiltration by mistake </a:t>
+            </a:r>
+          </a:p>
+          <a:p>
+            <a:r>
+              <a:rPr lang="en-US" dirty="0"/>
+              <a:t>I’d be glad to help you to find all the rest</a:t>
             </a:r>
           </a:p>
           <a:p>
@@ -34448,7 +34408,7 @@
           <a:p>
             <a:r>
               <a:rPr lang="en-US" dirty="0"/>
-              <a:t>Publishing exploits</a:t>
+              <a:t>Publishing walkthrough and exploits </a:t>
             </a:r>
           </a:p>
           <a:p>
@@ -35903,7 +35863,7 @@
           <a:p>
             <a:r>
               <a:rPr lang="en-US" dirty="0"/>
-              <a:t>Enclave is distributed in .</a:t>
+              <a:t>SGX Enclave is distributed in .</a:t>
             </a:r>
             <a:r>
               <a:rPr lang="en-US" dirty="0" err="1"/>

</xml_diff>

<commit_message>
File replay adjustments, problem persists
</commit_message>
<xml_diff>
--- a/docs/SGX Enclave Programming - Common Mistakes.pptx
+++ b/docs/SGX Enclave Programming - Common Mistakes.pptx
@@ -252,7 +252,7 @@
           <a:p>
             <a:fld id="{7A0F84C6-4B66-FC4F-9BD6-6F53B9E68AE3}" type="datetimeFigureOut">
               <a:rPr lang="ru-RU" smtClean="0"/>
-              <a:t>10.06.2017</a:t>
+              <a:t>11.06.2017</a:t>
             </a:fld>
             <a:endParaRPr lang="ru-RU"/>
           </a:p>
@@ -5255,8 +5255,15 @@
           <a:p>
             <a:r>
               <a:rPr lang="en-US" dirty="0"/>
-              <a:t>Some useful links for the concerned fellow citizens</a:t>
-            </a:r>
+              <a:t>If you are reading these presenter notes – thank you very much </a:t>
+            </a:r>
+            <a:r>
+              <a:rPr lang="en-US" dirty="0">
+                <a:sym typeface="Wingdings" panose="05000000000000000000" pitchFamily="2" charset="2"/>
+              </a:rPr>
+              <a:t></a:t>
+            </a:r>
+            <a:endParaRPr lang="en-US" dirty="0"/>
           </a:p>
         </p:txBody>
       </p:sp>
@@ -5277,7 +5284,7 @@
           <a:p>
             <a:fld id="{CD8728AD-2EC3-CF45-89B7-24476471A0CA}" type="slidenum">
               <a:rPr lang="ru-RU" smtClean="0"/>
-              <a:t>46</a:t>
+              <a:t>45</a:t>
             </a:fld>
             <a:endParaRPr lang="ru-RU"/>
           </a:p>
@@ -5286,7 +5293,7 @@
     </p:spTree>
     <p:extLst>
       <p:ext uri="{BB962C8B-B14F-4D97-AF65-F5344CB8AC3E}">
-        <p14:creationId xmlns:p14="http://schemas.microsoft.com/office/powerpoint/2010/main" val="1902725040"/>
+        <p14:creationId xmlns:p14="http://schemas.microsoft.com/office/powerpoint/2010/main" val="2145637075"/>
       </p:ext>
     </p:extLst>
   </p:cSld>
@@ -5315,7 +5322,7 @@
       </p:grpSpPr>
       <p:sp>
         <p:nvSpPr>
-          <p:cNvPr id="2" name="Slide Image Placeholder 1"/>
+          <p:cNvPr id="2" name="מציין מיקום של תמונת שקופית 1"/>
           <p:cNvSpPr>
             <a:spLocks noGrp="1" noRot="1" noChangeAspect="1"/>
           </p:cNvSpPr>
@@ -5327,7 +5334,7 @@
       </p:sp>
       <p:sp>
         <p:nvSpPr>
-          <p:cNvPr id="3" name="Notes Placeholder 2"/>
+          <p:cNvPr id="3" name="מציין מיקום של הערות 2"/>
           <p:cNvSpPr>
             <a:spLocks noGrp="1"/>
           </p:cNvSpPr>
@@ -5342,23 +5349,14 @@
           <a:p>
             <a:r>
               <a:rPr lang="en-US" dirty="0"/>
-              <a:t>One more note</a:t>
-            </a:r>
-            <a:r>
-              <a:rPr lang="en-US" baseline="0" dirty="0"/>
-              <a:t> for history – key derivation material. This table actually shows that each enclave will have its own key, depending on a lot of parameters including debug state, enclave content or enclave certificate and </a:t>
-            </a:r>
-            <a:r>
-              <a:rPr lang="en-US" baseline="0" dirty="0" err="1"/>
-              <a:t>fuzez</a:t>
-            </a:r>
-            <a:endParaRPr lang="en-US" dirty="0"/>
-          </a:p>
-        </p:txBody>
-      </p:sp>
-      <p:sp>
-        <p:nvSpPr>
-          <p:cNvPr id="4" name="Slide Number Placeholder 3"/>
+              <a:t>Some useful links for the concerned fellow citizens</a:t>
+            </a:r>
+          </a:p>
+        </p:txBody>
+      </p:sp>
+      <p:sp>
+        <p:nvSpPr>
+          <p:cNvPr id="4" name="מציין מיקום של מספר שקופית 3"/>
           <p:cNvSpPr>
             <a:spLocks noGrp="1"/>
           </p:cNvSpPr>
@@ -5373,7 +5371,7 @@
           <a:p>
             <a:fld id="{CD8728AD-2EC3-CF45-89B7-24476471A0CA}" type="slidenum">
               <a:rPr lang="ru-RU" smtClean="0"/>
-              <a:t>49</a:t>
+              <a:t>46</a:t>
             </a:fld>
             <a:endParaRPr lang="ru-RU"/>
           </a:p>
@@ -5382,7 +5380,7 @@
     </p:spTree>
     <p:extLst>
       <p:ext uri="{BB962C8B-B14F-4D97-AF65-F5344CB8AC3E}">
-        <p14:creationId xmlns:p14="http://schemas.microsoft.com/office/powerpoint/2010/main" val="41471257"/>
+        <p14:creationId xmlns:p14="http://schemas.microsoft.com/office/powerpoint/2010/main" val="1902725040"/>
       </p:ext>
     </p:extLst>
   </p:cSld>
@@ -5438,6 +5436,102 @@
           <a:p>
             <a:r>
               <a:rPr lang="en-US" dirty="0"/>
+              <a:t>One more note</a:t>
+            </a:r>
+            <a:r>
+              <a:rPr lang="en-US" baseline="0" dirty="0"/>
+              <a:t> for history – key derivation material. This table actually shows that each enclave will have its own key, depending on a lot of parameters including debug state, enclave content or enclave certificate and </a:t>
+            </a:r>
+            <a:r>
+              <a:rPr lang="en-US" baseline="0" dirty="0" err="1"/>
+              <a:t>fuzez</a:t>
+            </a:r>
+            <a:endParaRPr lang="en-US" dirty="0"/>
+          </a:p>
+        </p:txBody>
+      </p:sp>
+      <p:sp>
+        <p:nvSpPr>
+          <p:cNvPr id="4" name="Slide Number Placeholder 3"/>
+          <p:cNvSpPr>
+            <a:spLocks noGrp="1"/>
+          </p:cNvSpPr>
+          <p:nvPr>
+            <p:ph type="sldNum" sz="quarter" idx="10"/>
+          </p:nvPr>
+        </p:nvSpPr>
+        <p:spPr/>
+        <p:txBody>
+          <a:bodyPr/>
+          <a:lstStyle/>
+          <a:p>
+            <a:fld id="{CD8728AD-2EC3-CF45-89B7-24476471A0CA}" type="slidenum">
+              <a:rPr lang="ru-RU" smtClean="0"/>
+              <a:t>49</a:t>
+            </a:fld>
+            <a:endParaRPr lang="ru-RU"/>
+          </a:p>
+        </p:txBody>
+      </p:sp>
+    </p:spTree>
+    <p:extLst>
+      <p:ext uri="{BB962C8B-B14F-4D97-AF65-F5344CB8AC3E}">
+        <p14:creationId xmlns:p14="http://schemas.microsoft.com/office/powerpoint/2010/main" val="41471257"/>
+      </p:ext>
+    </p:extLst>
+  </p:cSld>
+  <p:clrMapOvr>
+    <a:masterClrMapping/>
+  </p:clrMapOvr>
+</p:notes>
+</file>
+
+<file path=ppt/notesSlides/notesSlide47.xml><?xml version="1.0" encoding="utf-8"?>
+<p:notes xmlns:a="http://schemas.openxmlformats.org/drawingml/2006/main" xmlns:r="http://schemas.openxmlformats.org/officeDocument/2006/relationships" xmlns:p="http://schemas.openxmlformats.org/presentationml/2006/main">
+  <p:cSld>
+    <p:spTree>
+      <p:nvGrpSpPr>
+        <p:cNvPr id="1" name=""/>
+        <p:cNvGrpSpPr/>
+        <p:nvPr/>
+      </p:nvGrpSpPr>
+      <p:grpSpPr>
+        <a:xfrm>
+          <a:off x="0" y="0"/>
+          <a:ext cx="0" cy="0"/>
+          <a:chOff x="0" y="0"/>
+          <a:chExt cx="0" cy="0"/>
+        </a:xfrm>
+      </p:grpSpPr>
+      <p:sp>
+        <p:nvSpPr>
+          <p:cNvPr id="2" name="Slide Image Placeholder 1"/>
+          <p:cNvSpPr>
+            <a:spLocks noGrp="1" noRot="1" noChangeAspect="1"/>
+          </p:cNvSpPr>
+          <p:nvPr>
+            <p:ph type="sldImg"/>
+          </p:nvPr>
+        </p:nvSpPr>
+        <p:spPr/>
+      </p:sp>
+      <p:sp>
+        <p:nvSpPr>
+          <p:cNvPr id="3" name="Notes Placeholder 2"/>
+          <p:cNvSpPr>
+            <a:spLocks noGrp="1"/>
+          </p:cNvSpPr>
+          <p:nvPr>
+            <p:ph type="body" idx="1"/>
+          </p:nvPr>
+        </p:nvSpPr>
+        <p:spPr/>
+        <p:txBody>
+          <a:bodyPr/>
+          <a:lstStyle/>
+          <a:p>
+            <a:r>
+              <a:rPr lang="en-US" dirty="0"/>
               <a:t>If we are not speaking about local/remote attestation </a:t>
             </a:r>
             <a:r>
@@ -5496,7 +5590,7 @@
 </p:notes>
 </file>
 
-<file path=ppt/notesSlides/notesSlide47.xml><?xml version="1.0" encoding="utf-8"?>
+<file path=ppt/notesSlides/notesSlide48.xml><?xml version="1.0" encoding="utf-8"?>
 <p:notes xmlns:a="http://schemas.openxmlformats.org/drawingml/2006/main" xmlns:r="http://schemas.openxmlformats.org/officeDocument/2006/relationships" xmlns:p="http://schemas.openxmlformats.org/presentationml/2006/main">
   <p:cSld>
     <p:spTree>
@@ -6247,7 +6341,7 @@
           <a:noFill/>
           <a:extLst>
             <a:ext uri="{909E8E84-426E-40dd-AFC4-6F175D3DCCD1}">
-              <a14:hiddenFill xmlns:a14="http://schemas.microsoft.com/office/drawing/2010/main" xmlns="">
+              <a14:hiddenFill xmlns="" xmlns:a14="http://schemas.microsoft.com/office/drawing/2010/main">
                 <a:solidFill>
                   <a:srgbClr val="FFFFFF"/>
                 </a:solidFill>
@@ -6307,7 +6401,7 @@
             </a:ln>
             <a:extLst>
               <a:ext uri="{91240B29-F687-4f45-9708-019B960494DF}">
-                <a14:hiddenLine xmlns:a14="http://schemas.microsoft.com/office/drawing/2010/main" xmlns="" w="9525">
+                <a14:hiddenLine xmlns="" xmlns:a14="http://schemas.microsoft.com/office/drawing/2010/main" w="9525">
                   <a:solidFill>
                     <a:srgbClr val="000000"/>
                   </a:solidFill>
@@ -6397,7 +6491,7 @@
             </a:ln>
             <a:extLst>
               <a:ext uri="{91240B29-F687-4f45-9708-019B960494DF}">
-                <a14:hiddenLine xmlns:a14="http://schemas.microsoft.com/office/drawing/2010/main" xmlns="" w="9525">
+                <a14:hiddenLine xmlns="" xmlns:a14="http://schemas.microsoft.com/office/drawing/2010/main" w="9525">
                   <a:solidFill>
                     <a:srgbClr val="000000"/>
                   </a:solidFill>
@@ -6487,7 +6581,7 @@
             </a:ln>
             <a:extLst>
               <a:ext uri="{91240B29-F687-4f45-9708-019B960494DF}">
-                <a14:hiddenLine xmlns:a14="http://schemas.microsoft.com/office/drawing/2010/main" xmlns="" w="9525">
+                <a14:hiddenLine xmlns="" xmlns:a14="http://schemas.microsoft.com/office/drawing/2010/main" w="9525">
                   <a:solidFill>
                     <a:srgbClr val="000000"/>
                   </a:solidFill>
@@ -6521,7 +6615,7 @@
             </a:ln>
             <a:extLst>
               <a:ext uri="{91240B29-F687-4f45-9708-019B960494DF}">
-                <a14:hiddenLine xmlns:a14="http://schemas.microsoft.com/office/drawing/2010/main" xmlns="" w="9525">
+                <a14:hiddenLine xmlns="" xmlns:a14="http://schemas.microsoft.com/office/drawing/2010/main" w="9525">
                   <a:solidFill>
                     <a:srgbClr val="000000"/>
                   </a:solidFill>
@@ -6611,7 +6705,7 @@
             </a:ln>
             <a:extLst>
               <a:ext uri="{91240B29-F687-4f45-9708-019B960494DF}">
-                <a14:hiddenLine xmlns:a14="http://schemas.microsoft.com/office/drawing/2010/main" xmlns="" w="9525">
+                <a14:hiddenLine xmlns="" xmlns:a14="http://schemas.microsoft.com/office/drawing/2010/main" w="9525">
                   <a:solidFill>
                     <a:srgbClr val="000000"/>
                   </a:solidFill>
@@ -6673,7 +6767,7 @@
             </a:ln>
             <a:extLst>
               <a:ext uri="{91240B29-F687-4f45-9708-019B960494DF}">
-                <a14:hiddenLine xmlns:a14="http://schemas.microsoft.com/office/drawing/2010/main" xmlns="" w="9525">
+                <a14:hiddenLine xmlns="" xmlns:a14="http://schemas.microsoft.com/office/drawing/2010/main" w="9525">
                   <a:solidFill>
                     <a:srgbClr val="000000"/>
                   </a:solidFill>
@@ -6735,7 +6829,7 @@
             </a:ln>
             <a:extLst>
               <a:ext uri="{91240B29-F687-4f45-9708-019B960494DF}">
-                <a14:hiddenLine xmlns:a14="http://schemas.microsoft.com/office/drawing/2010/main" xmlns="" w="9525">
+                <a14:hiddenLine xmlns="" xmlns:a14="http://schemas.microsoft.com/office/drawing/2010/main" w="9525">
                   <a:solidFill>
                     <a:srgbClr val="000000"/>
                   </a:solidFill>
@@ -6825,7 +6919,7 @@
             </a:ln>
             <a:extLst>
               <a:ext uri="{91240B29-F687-4f45-9708-019B960494DF}">
-                <a14:hiddenLine xmlns:a14="http://schemas.microsoft.com/office/drawing/2010/main" xmlns="" w="9525">
+                <a14:hiddenLine xmlns="" xmlns:a14="http://schemas.microsoft.com/office/drawing/2010/main" w="9525">
                   <a:solidFill>
                     <a:srgbClr val="000000"/>
                   </a:solidFill>
@@ -6887,7 +6981,7 @@
             </a:ln>
             <a:extLst>
               <a:ext uri="{91240B29-F687-4f45-9708-019B960494DF}">
-                <a14:hiddenLine xmlns:a14="http://schemas.microsoft.com/office/drawing/2010/main" xmlns="" w="9525">
+                <a14:hiddenLine xmlns="" xmlns:a14="http://schemas.microsoft.com/office/drawing/2010/main" w="9525">
                   <a:solidFill>
                     <a:srgbClr val="000000"/>
                   </a:solidFill>
@@ -6949,7 +7043,7 @@
             </a:ln>
             <a:extLst>
               <a:ext uri="{91240B29-F687-4f45-9708-019B960494DF}">
-                <a14:hiddenLine xmlns:a14="http://schemas.microsoft.com/office/drawing/2010/main" xmlns="" w="9525">
+                <a14:hiddenLine xmlns="" xmlns:a14="http://schemas.microsoft.com/office/drawing/2010/main" w="9525">
                   <a:solidFill>
                     <a:srgbClr val="000000"/>
                   </a:solidFill>
@@ -7039,7 +7133,7 @@
             </a:ln>
             <a:extLst>
               <a:ext uri="{91240B29-F687-4f45-9708-019B960494DF}">
-                <a14:hiddenLine xmlns:a14="http://schemas.microsoft.com/office/drawing/2010/main" xmlns="" w="9525">
+                <a14:hiddenLine xmlns="" xmlns:a14="http://schemas.microsoft.com/office/drawing/2010/main" w="9525">
                   <a:solidFill>
                     <a:srgbClr val="000000"/>
                   </a:solidFill>
@@ -7129,7 +7223,7 @@
             </a:ln>
             <a:extLst>
               <a:ext uri="{91240B29-F687-4f45-9708-019B960494DF}">
-                <a14:hiddenLine xmlns:a14="http://schemas.microsoft.com/office/drawing/2010/main" xmlns="" w="9525">
+                <a14:hiddenLine xmlns="" xmlns:a14="http://schemas.microsoft.com/office/drawing/2010/main" w="9525">
                   <a:solidFill>
                     <a:srgbClr val="000000"/>
                   </a:solidFill>
@@ -7191,7 +7285,7 @@
             </a:ln>
             <a:extLst>
               <a:ext uri="{91240B29-F687-4f45-9708-019B960494DF}">
-                <a14:hiddenLine xmlns:a14="http://schemas.microsoft.com/office/drawing/2010/main" xmlns="" w="9525">
+                <a14:hiddenLine xmlns="" xmlns:a14="http://schemas.microsoft.com/office/drawing/2010/main" w="9525">
                   <a:solidFill>
                     <a:srgbClr val="000000"/>
                   </a:solidFill>
@@ -7301,7 +7395,7 @@
             </a:ln>
             <a:extLst>
               <a:ext uri="{91240B29-F687-4f45-9708-019B960494DF}">
-                <a14:hiddenLine xmlns:a14="http://schemas.microsoft.com/office/drawing/2010/main" xmlns="" w="9525">
+                <a14:hiddenLine xmlns="" xmlns:a14="http://schemas.microsoft.com/office/drawing/2010/main" w="9525">
                   <a:solidFill>
                     <a:srgbClr val="000000"/>
                   </a:solidFill>
@@ -7363,7 +7457,7 @@
             </a:ln>
             <a:extLst>
               <a:ext uri="{91240B29-F687-4f45-9708-019B960494DF}">
-                <a14:hiddenLine xmlns:a14="http://schemas.microsoft.com/office/drawing/2010/main" xmlns="" w="9525">
+                <a14:hiddenLine xmlns="" xmlns:a14="http://schemas.microsoft.com/office/drawing/2010/main" w="9525">
                   <a:solidFill>
                     <a:srgbClr val="000000"/>
                   </a:solidFill>
@@ -7453,7 +7547,7 @@
             </a:ln>
             <a:extLst>
               <a:ext uri="{91240B29-F687-4f45-9708-019B960494DF}">
-                <a14:hiddenLine xmlns:a14="http://schemas.microsoft.com/office/drawing/2010/main" xmlns="" w="9525">
+                <a14:hiddenLine xmlns="" xmlns:a14="http://schemas.microsoft.com/office/drawing/2010/main" w="9525">
                   <a:solidFill>
                     <a:srgbClr val="000000"/>
                   </a:solidFill>
@@ -7543,7 +7637,7 @@
             </a:ln>
             <a:extLst>
               <a:ext uri="{91240B29-F687-4f45-9708-019B960494DF}">
-                <a14:hiddenLine xmlns:a14="http://schemas.microsoft.com/office/drawing/2010/main" xmlns="" w="9525">
+                <a14:hiddenLine xmlns="" xmlns:a14="http://schemas.microsoft.com/office/drawing/2010/main" w="9525">
                   <a:solidFill>
                     <a:srgbClr val="000000"/>
                   </a:solidFill>
@@ -7605,7 +7699,7 @@
             </a:ln>
             <a:extLst>
               <a:ext uri="{91240B29-F687-4f45-9708-019B960494DF}">
-                <a14:hiddenLine xmlns:a14="http://schemas.microsoft.com/office/drawing/2010/main" xmlns="" w="9525">
+                <a14:hiddenLine xmlns="" xmlns:a14="http://schemas.microsoft.com/office/drawing/2010/main" w="9525">
                   <a:solidFill>
                     <a:srgbClr val="000000"/>
                   </a:solidFill>
@@ -7695,7 +7789,7 @@
             </a:ln>
             <a:extLst>
               <a:ext uri="{91240B29-F687-4f45-9708-019B960494DF}">
-                <a14:hiddenLine xmlns:a14="http://schemas.microsoft.com/office/drawing/2010/main" xmlns="" w="9525">
+                <a14:hiddenLine xmlns="" xmlns:a14="http://schemas.microsoft.com/office/drawing/2010/main" w="9525">
                   <a:solidFill>
                     <a:srgbClr val="000000"/>
                   </a:solidFill>
@@ -7785,7 +7879,7 @@
             </a:ln>
             <a:extLst>
               <a:ext uri="{91240B29-F687-4f45-9708-019B960494DF}">
-                <a14:hiddenLine xmlns:a14="http://schemas.microsoft.com/office/drawing/2010/main" xmlns="" w="9525">
+                <a14:hiddenLine xmlns="" xmlns:a14="http://schemas.microsoft.com/office/drawing/2010/main" w="9525">
                   <a:solidFill>
                     <a:srgbClr val="000000"/>
                   </a:solidFill>
@@ -7841,7 +7935,7 @@
             </a:ln>
             <a:extLst>
               <a:ext uri="{91240B29-F687-4f45-9708-019B960494DF}">
-                <a14:hiddenLine xmlns:a14="http://schemas.microsoft.com/office/drawing/2010/main" xmlns="" w="9525">
+                <a14:hiddenLine xmlns="" xmlns:a14="http://schemas.microsoft.com/office/drawing/2010/main" w="9525">
                   <a:solidFill>
                     <a:srgbClr val="000000"/>
                   </a:solidFill>
@@ -7931,7 +8025,7 @@
             </a:ln>
             <a:extLst>
               <a:ext uri="{91240B29-F687-4f45-9708-019B960494DF}">
-                <a14:hiddenLine xmlns:a14="http://schemas.microsoft.com/office/drawing/2010/main" xmlns="" w="9525">
+                <a14:hiddenLine xmlns="" xmlns:a14="http://schemas.microsoft.com/office/drawing/2010/main" w="9525">
                   <a:solidFill>
                     <a:srgbClr val="000000"/>
                   </a:solidFill>
@@ -7987,7 +8081,7 @@
             </a:ln>
             <a:extLst>
               <a:ext uri="{91240B29-F687-4f45-9708-019B960494DF}">
-                <a14:hiddenLine xmlns:a14="http://schemas.microsoft.com/office/drawing/2010/main" xmlns="" w="9525">
+                <a14:hiddenLine xmlns="" xmlns:a14="http://schemas.microsoft.com/office/drawing/2010/main" w="9525">
                   <a:solidFill>
                     <a:srgbClr val="000000"/>
                   </a:solidFill>
@@ -8077,7 +8171,7 @@
             </a:ln>
             <a:extLst>
               <a:ext uri="{91240B29-F687-4f45-9708-019B960494DF}">
-                <a14:hiddenLine xmlns:a14="http://schemas.microsoft.com/office/drawing/2010/main" xmlns="" w="9525">
+                <a14:hiddenLine xmlns="" xmlns:a14="http://schemas.microsoft.com/office/drawing/2010/main" w="9525">
                   <a:solidFill>
                     <a:srgbClr val="000000"/>
                   </a:solidFill>
@@ -8145,7 +8239,7 @@
             </a:ln>
             <a:extLst>
               <a:ext uri="{91240B29-F687-4f45-9708-019B960494DF}">
-                <a14:hiddenLine xmlns:a14="http://schemas.microsoft.com/office/drawing/2010/main" xmlns="" w="9525">
+                <a14:hiddenLine xmlns="" xmlns:a14="http://schemas.microsoft.com/office/drawing/2010/main" w="9525">
                   <a:solidFill>
                     <a:srgbClr val="000000"/>
                   </a:solidFill>
@@ -8235,7 +8329,7 @@
             </a:ln>
             <a:extLst>
               <a:ext uri="{91240B29-F687-4f45-9708-019B960494DF}">
-                <a14:hiddenLine xmlns:a14="http://schemas.microsoft.com/office/drawing/2010/main" xmlns="" w="9525">
+                <a14:hiddenLine xmlns="" xmlns:a14="http://schemas.microsoft.com/office/drawing/2010/main" w="9525">
                   <a:solidFill>
                     <a:srgbClr val="000000"/>
                   </a:solidFill>
@@ -8303,7 +8397,7 @@
             </a:ln>
             <a:extLst>
               <a:ext uri="{91240B29-F687-4f45-9708-019B960494DF}">
-                <a14:hiddenLine xmlns:a14="http://schemas.microsoft.com/office/drawing/2010/main" xmlns="" w="9525">
+                <a14:hiddenLine xmlns="" xmlns:a14="http://schemas.microsoft.com/office/drawing/2010/main" w="9525">
                   <a:solidFill>
                     <a:srgbClr val="000000"/>
                   </a:solidFill>
@@ -8393,7 +8487,7 @@
             </a:ln>
             <a:extLst>
               <a:ext uri="{91240B29-F687-4f45-9708-019B960494DF}">
-                <a14:hiddenLine xmlns:a14="http://schemas.microsoft.com/office/drawing/2010/main" xmlns="" w="9525">
+                <a14:hiddenLine xmlns="" xmlns:a14="http://schemas.microsoft.com/office/drawing/2010/main" w="9525">
                   <a:solidFill>
                     <a:srgbClr val="000000"/>
                   </a:solidFill>
@@ -8427,7 +8521,7 @@
             </a:ln>
             <a:extLst>
               <a:ext uri="{91240B29-F687-4f45-9708-019B960494DF}">
-                <a14:hiddenLine xmlns:a14="http://schemas.microsoft.com/office/drawing/2010/main" xmlns="" w="9525">
+                <a14:hiddenLine xmlns="" xmlns:a14="http://schemas.microsoft.com/office/drawing/2010/main" w="9525">
                   <a:solidFill>
                     <a:srgbClr val="000000"/>
                   </a:solidFill>
@@ -8517,7 +8611,7 @@
             </a:ln>
             <a:extLst>
               <a:ext uri="{91240B29-F687-4f45-9708-019B960494DF}">
-                <a14:hiddenLine xmlns:a14="http://schemas.microsoft.com/office/drawing/2010/main" xmlns="" w="9525">
+                <a14:hiddenLine xmlns="" xmlns:a14="http://schemas.microsoft.com/office/drawing/2010/main" w="9525">
                   <a:solidFill>
                     <a:srgbClr val="000000"/>
                   </a:solidFill>
@@ -8579,7 +8673,7 @@
             </a:ln>
             <a:extLst>
               <a:ext uri="{91240B29-F687-4f45-9708-019B960494DF}">
-                <a14:hiddenLine xmlns:a14="http://schemas.microsoft.com/office/drawing/2010/main" xmlns="" w="9525">
+                <a14:hiddenLine xmlns="" xmlns:a14="http://schemas.microsoft.com/office/drawing/2010/main" w="9525">
                   <a:solidFill>
                     <a:srgbClr val="000000"/>
                   </a:solidFill>
@@ -8641,7 +8735,7 @@
             </a:ln>
             <a:extLst>
               <a:ext uri="{91240B29-F687-4f45-9708-019B960494DF}">
-                <a14:hiddenLine xmlns:a14="http://schemas.microsoft.com/office/drawing/2010/main" xmlns="" w="9525">
+                <a14:hiddenLine xmlns="" xmlns:a14="http://schemas.microsoft.com/office/drawing/2010/main" w="9525">
                   <a:solidFill>
                     <a:srgbClr val="000000"/>
                   </a:solidFill>
@@ -8731,7 +8825,7 @@
             </a:ln>
             <a:extLst>
               <a:ext uri="{91240B29-F687-4f45-9708-019B960494DF}">
-                <a14:hiddenLine xmlns:a14="http://schemas.microsoft.com/office/drawing/2010/main" xmlns="" w="9525">
+                <a14:hiddenLine xmlns="" xmlns:a14="http://schemas.microsoft.com/office/drawing/2010/main" w="9525">
                   <a:solidFill>
                     <a:srgbClr val="000000"/>
                   </a:solidFill>
@@ -8799,7 +8893,7 @@
             </a:ln>
             <a:extLst>
               <a:ext uri="{91240B29-F687-4f45-9708-019B960494DF}">
-                <a14:hiddenLine xmlns:a14="http://schemas.microsoft.com/office/drawing/2010/main" xmlns="" w="9525">
+                <a14:hiddenLine xmlns="" xmlns:a14="http://schemas.microsoft.com/office/drawing/2010/main" w="9525">
                   <a:solidFill>
                     <a:srgbClr val="000000"/>
                   </a:solidFill>
@@ -8861,7 +8955,7 @@
             </a:ln>
             <a:extLst>
               <a:ext uri="{91240B29-F687-4f45-9708-019B960494DF}">
-                <a14:hiddenLine xmlns:a14="http://schemas.microsoft.com/office/drawing/2010/main" xmlns="" w="9525">
+                <a14:hiddenLine xmlns="" xmlns:a14="http://schemas.microsoft.com/office/drawing/2010/main" w="9525">
                   <a:solidFill>
                     <a:srgbClr val="000000"/>
                   </a:solidFill>
@@ -8951,7 +9045,7 @@
             </a:ln>
             <a:extLst>
               <a:ext uri="{91240B29-F687-4f45-9708-019B960494DF}">
-                <a14:hiddenLine xmlns:a14="http://schemas.microsoft.com/office/drawing/2010/main" xmlns="" w="9525">
+                <a14:hiddenLine xmlns="" xmlns:a14="http://schemas.microsoft.com/office/drawing/2010/main" w="9525">
                   <a:solidFill>
                     <a:srgbClr val="000000"/>
                   </a:solidFill>
@@ -9013,7 +9107,7 @@
             </a:ln>
             <a:extLst>
               <a:ext uri="{91240B29-F687-4f45-9708-019B960494DF}">
-                <a14:hiddenLine xmlns:a14="http://schemas.microsoft.com/office/drawing/2010/main" xmlns="" w="9525">
+                <a14:hiddenLine xmlns="" xmlns:a14="http://schemas.microsoft.com/office/drawing/2010/main" w="9525">
                   <a:solidFill>
                     <a:srgbClr val="000000"/>
                   </a:solidFill>
@@ -9103,7 +9197,7 @@
             </a:ln>
             <a:extLst>
               <a:ext uri="{91240B29-F687-4f45-9708-019B960494DF}">
-                <a14:hiddenLine xmlns:a14="http://schemas.microsoft.com/office/drawing/2010/main" xmlns="" w="9525">
+                <a14:hiddenLine xmlns="" xmlns:a14="http://schemas.microsoft.com/office/drawing/2010/main" w="9525">
                   <a:solidFill>
                     <a:srgbClr val="000000"/>
                   </a:solidFill>
@@ -9165,7 +9259,7 @@
             </a:ln>
             <a:extLst>
               <a:ext uri="{91240B29-F687-4f45-9708-019B960494DF}">
-                <a14:hiddenLine xmlns:a14="http://schemas.microsoft.com/office/drawing/2010/main" xmlns="" w="9525">
+                <a14:hiddenLine xmlns="" xmlns:a14="http://schemas.microsoft.com/office/drawing/2010/main" w="9525">
                   <a:solidFill>
                     <a:srgbClr val="000000"/>
                   </a:solidFill>
@@ -9255,7 +9349,7 @@
             </a:ln>
             <a:extLst>
               <a:ext uri="{91240B29-F687-4f45-9708-019B960494DF}">
-                <a14:hiddenLine xmlns:a14="http://schemas.microsoft.com/office/drawing/2010/main" xmlns="" w="9525">
+                <a14:hiddenLine xmlns="" xmlns:a14="http://schemas.microsoft.com/office/drawing/2010/main" w="9525">
                   <a:solidFill>
                     <a:srgbClr val="000000"/>
                   </a:solidFill>
@@ -9289,7 +9383,7 @@
             </a:ln>
             <a:extLst>
               <a:ext uri="{91240B29-F687-4f45-9708-019B960494DF}">
-                <a14:hiddenLine xmlns:a14="http://schemas.microsoft.com/office/drawing/2010/main" xmlns="" w="9525">
+                <a14:hiddenLine xmlns="" xmlns:a14="http://schemas.microsoft.com/office/drawing/2010/main" w="9525">
                   <a:solidFill>
                     <a:srgbClr val="000000"/>
                   </a:solidFill>
@@ -9354,7 +9448,7 @@
             </a:ln>
             <a:extLst>
               <a:ext uri="{91240B29-F687-4f45-9708-019B960494DF}">
-                <a14:hiddenLine xmlns:a14="http://schemas.microsoft.com/office/drawing/2010/main" xmlns="" w="9525">
+                <a14:hiddenLine xmlns="" xmlns:a14="http://schemas.microsoft.com/office/drawing/2010/main" w="9525">
                   <a:solidFill>
                     <a:srgbClr val="000000"/>
                   </a:solidFill>
@@ -9444,7 +9538,7 @@
             </a:ln>
             <a:extLst>
               <a:ext uri="{91240B29-F687-4f45-9708-019B960494DF}">
-                <a14:hiddenLine xmlns:a14="http://schemas.microsoft.com/office/drawing/2010/main" xmlns="" w="9525">
+                <a14:hiddenLine xmlns="" xmlns:a14="http://schemas.microsoft.com/office/drawing/2010/main" w="9525">
                   <a:solidFill>
                     <a:srgbClr val="000000"/>
                   </a:solidFill>
@@ -9506,7 +9600,7 @@
             </a:ln>
             <a:extLst>
               <a:ext uri="{91240B29-F687-4f45-9708-019B960494DF}">
-                <a14:hiddenLine xmlns:a14="http://schemas.microsoft.com/office/drawing/2010/main" xmlns="" w="9525">
+                <a14:hiddenLine xmlns="" xmlns:a14="http://schemas.microsoft.com/office/drawing/2010/main" w="9525">
                   <a:solidFill>
                     <a:srgbClr val="000000"/>
                   </a:solidFill>
@@ -9596,7 +9690,7 @@
             </a:ln>
             <a:extLst>
               <a:ext uri="{91240B29-F687-4f45-9708-019B960494DF}">
-                <a14:hiddenLine xmlns:a14="http://schemas.microsoft.com/office/drawing/2010/main" xmlns="" w="9525">
+                <a14:hiddenLine xmlns="" xmlns:a14="http://schemas.microsoft.com/office/drawing/2010/main" w="9525">
                   <a:solidFill>
                     <a:srgbClr val="000000"/>
                   </a:solidFill>
@@ -9686,7 +9780,7 @@
             </a:ln>
             <a:extLst>
               <a:ext uri="{91240B29-F687-4f45-9708-019B960494DF}">
-                <a14:hiddenLine xmlns:a14="http://schemas.microsoft.com/office/drawing/2010/main" xmlns="" w="9525">
+                <a14:hiddenLine xmlns="" xmlns:a14="http://schemas.microsoft.com/office/drawing/2010/main" w="9525">
                   <a:solidFill>
                     <a:srgbClr val="000000"/>
                   </a:solidFill>
@@ -9751,7 +9845,7 @@
             </a:ln>
             <a:extLst>
               <a:ext uri="{91240B29-F687-4f45-9708-019B960494DF}">
-                <a14:hiddenLine xmlns:a14="http://schemas.microsoft.com/office/drawing/2010/main" xmlns="" w="9525">
+                <a14:hiddenLine xmlns="" xmlns:a14="http://schemas.microsoft.com/office/drawing/2010/main" w="9525">
                   <a:solidFill>
                     <a:srgbClr val="000000"/>
                   </a:solidFill>
@@ -9813,7 +9907,7 @@
             </a:ln>
             <a:extLst>
               <a:ext uri="{91240B29-F687-4f45-9708-019B960494DF}">
-                <a14:hiddenLine xmlns:a14="http://schemas.microsoft.com/office/drawing/2010/main" xmlns="" w="9525">
+                <a14:hiddenLine xmlns="" xmlns:a14="http://schemas.microsoft.com/office/drawing/2010/main" w="9525">
                   <a:solidFill>
                     <a:srgbClr val="000000"/>
                   </a:solidFill>
@@ -9903,7 +9997,7 @@
             </a:ln>
             <a:extLst>
               <a:ext uri="{91240B29-F687-4f45-9708-019B960494DF}">
-                <a14:hiddenLine xmlns:a14="http://schemas.microsoft.com/office/drawing/2010/main" xmlns="" w="9525">
+                <a14:hiddenLine xmlns="" xmlns:a14="http://schemas.microsoft.com/office/drawing/2010/main" w="9525">
                   <a:solidFill>
                     <a:srgbClr val="000000"/>
                   </a:solidFill>
@@ -9993,7 +10087,7 @@
             </a:ln>
             <a:extLst>
               <a:ext uri="{91240B29-F687-4f45-9708-019B960494DF}">
-                <a14:hiddenLine xmlns:a14="http://schemas.microsoft.com/office/drawing/2010/main" xmlns="" w="9525">
+                <a14:hiddenLine xmlns="" xmlns:a14="http://schemas.microsoft.com/office/drawing/2010/main" w="9525">
                   <a:solidFill>
                     <a:srgbClr val="000000"/>
                   </a:solidFill>
@@ -10055,7 +10149,7 @@
             </a:ln>
             <a:extLst>
               <a:ext uri="{91240B29-F687-4f45-9708-019B960494DF}">
-                <a14:hiddenLine xmlns:a14="http://schemas.microsoft.com/office/drawing/2010/main" xmlns="" w="9525">
+                <a14:hiddenLine xmlns="" xmlns:a14="http://schemas.microsoft.com/office/drawing/2010/main" w="9525">
                   <a:solidFill>
                     <a:srgbClr val="000000"/>
                   </a:solidFill>
@@ -10175,7 +10269,7 @@
             </a:ln>
             <a:extLst>
               <a:ext uri="{91240B29-F687-4f45-9708-019B960494DF}">
-                <a14:hiddenLine xmlns:a14="http://schemas.microsoft.com/office/drawing/2010/main" xmlns="" w="9525">
+                <a14:hiddenLine xmlns="" xmlns:a14="http://schemas.microsoft.com/office/drawing/2010/main" w="9525">
                   <a:solidFill>
                     <a:srgbClr val="000000"/>
                   </a:solidFill>
@@ -10243,7 +10337,7 @@
             </a:ln>
             <a:extLst>
               <a:ext uri="{91240B29-F687-4f45-9708-019B960494DF}">
-                <a14:hiddenLine xmlns:a14="http://schemas.microsoft.com/office/drawing/2010/main" xmlns="" w="9525">
+                <a14:hiddenLine xmlns="" xmlns:a14="http://schemas.microsoft.com/office/drawing/2010/main" w="9525">
                   <a:solidFill>
                     <a:srgbClr val="000000"/>
                   </a:solidFill>
@@ -10333,7 +10427,7 @@
             </a:ln>
             <a:extLst>
               <a:ext uri="{91240B29-F687-4f45-9708-019B960494DF}">
-                <a14:hiddenLine xmlns:a14="http://schemas.microsoft.com/office/drawing/2010/main" xmlns="" w="9525">
+                <a14:hiddenLine xmlns="" xmlns:a14="http://schemas.microsoft.com/office/drawing/2010/main" w="9525">
                   <a:solidFill>
                     <a:srgbClr val="000000"/>
                   </a:solidFill>
@@ -10473,7 +10567,7 @@
           <a:p>
             <a:fld id="{41DCBB70-9A08-4AA5-A271-721B6525CB9F}" type="datetime1">
               <a:rPr lang="en-US" smtClean="0"/>
-              <a:t>6/10/2017</a:t>
+              <a:t>6/11/2017</a:t>
             </a:fld>
             <a:endParaRPr lang="en-US"/>
           </a:p>
@@ -10740,7 +10834,7 @@
           <a:p>
             <a:fld id="{9E661AA1-C993-49F4-84DE-675C7065B200}" type="datetime1">
               <a:rPr lang="en-US" smtClean="0"/>
-              <a:t>6/10/2017</a:t>
+              <a:t>6/11/2017</a:t>
             </a:fld>
             <a:endParaRPr lang="en-US"/>
           </a:p>
@@ -10936,7 +11030,7 @@
           <a:p>
             <a:fld id="{35ED3023-723E-443F-8079-577C9EEE921C}" type="datetime1">
               <a:rPr lang="en-US" smtClean="0"/>
-              <a:t>6/10/2017</a:t>
+              <a:t>6/11/2017</a:t>
             </a:fld>
             <a:endParaRPr lang="en-US"/>
           </a:p>
@@ -11199,7 +11293,7 @@
           <a:p>
             <a:fld id="{6B73FD1C-B51A-48F7-AC02-2F0D97D814F7}" type="datetime1">
               <a:rPr lang="en-US" smtClean="0"/>
-              <a:t>6/10/2017</a:t>
+              <a:t>6/11/2017</a:t>
             </a:fld>
             <a:endParaRPr lang="en-US"/>
           </a:p>
@@ -11633,7 +11727,7 @@
           <a:p>
             <a:fld id="{FB8D9E83-F75A-43AD-B2ED-7E8CAF48F668}" type="datetime1">
               <a:rPr lang="en-US" smtClean="0"/>
-              <a:t>6/10/2017</a:t>
+              <a:t>6/11/2017</a:t>
             </a:fld>
             <a:endParaRPr lang="en-US"/>
           </a:p>
@@ -12179,7 +12273,7 @@
           <a:p>
             <a:fld id="{768A83B0-3BAE-4E53-B5B7-0FF7FE737D64}" type="datetime1">
               <a:rPr lang="en-US" smtClean="0"/>
-              <a:t>6/10/2017</a:t>
+              <a:t>6/11/2017</a:t>
             </a:fld>
             <a:endParaRPr lang="en-US"/>
           </a:p>
@@ -12899,7 +12993,7 @@
           <a:p>
             <a:fld id="{B16730D7-1777-41F9-B918-BBBB96CD566E}" type="datetime1">
               <a:rPr lang="en-US" smtClean="0"/>
-              <a:t>6/10/2017</a:t>
+              <a:t>6/11/2017</a:t>
             </a:fld>
             <a:endParaRPr lang="en-US"/>
           </a:p>
@@ -13069,7 +13163,7 @@
           <a:p>
             <a:fld id="{6D09EAFD-48A8-461E-BE3C-44687419BF39}" type="datetime1">
               <a:rPr lang="en-US" smtClean="0"/>
-              <a:t>6/10/2017</a:t>
+              <a:t>6/11/2017</a:t>
             </a:fld>
             <a:endParaRPr lang="en-US"/>
           </a:p>
@@ -13249,7 +13343,7 @@
           <a:p>
             <a:fld id="{8FD3B498-F311-4C43-B1BB-5A8293E0A9A4}" type="datetime1">
               <a:rPr lang="en-US" smtClean="0"/>
-              <a:t>6/10/2017</a:t>
+              <a:t>6/11/2017</a:t>
             </a:fld>
             <a:endParaRPr lang="en-US"/>
           </a:p>
@@ -13419,7 +13513,7 @@
           <a:p>
             <a:fld id="{883771BF-CA23-432F-8D8B-D4805A2FDC25}" type="datetime1">
               <a:rPr lang="en-US" smtClean="0"/>
-              <a:t>6/10/2017</a:t>
+              <a:t>6/11/2017</a:t>
             </a:fld>
             <a:endParaRPr lang="en-US"/>
           </a:p>
@@ -13669,7 +13763,7 @@
           <a:p>
             <a:fld id="{1D68C36A-6259-4E5A-A049-3DCA1D14583C}" type="datetime1">
               <a:rPr lang="en-US" smtClean="0"/>
-              <a:t>6/10/2017</a:t>
+              <a:t>6/11/2017</a:t>
             </a:fld>
             <a:endParaRPr lang="en-US"/>
           </a:p>
@@ -13901,7 +13995,7 @@
           <a:p>
             <a:fld id="{F34191F4-FB8B-48CA-AE1C-459EE9927C52}" type="datetime1">
               <a:rPr lang="en-US" smtClean="0"/>
-              <a:t>6/10/2017</a:t>
+              <a:t>6/11/2017</a:t>
             </a:fld>
             <a:endParaRPr lang="en-US"/>
           </a:p>
@@ -14282,7 +14376,7 @@
           <a:p>
             <a:fld id="{1A00DB3D-0C93-46F0-85AD-FA7B3F55FC09}" type="datetime1">
               <a:rPr lang="en-US" smtClean="0"/>
-              <a:t>6/10/2017</a:t>
+              <a:t>6/11/2017</a:t>
             </a:fld>
             <a:endParaRPr lang="en-US"/>
           </a:p>
@@ -14400,7 +14494,7 @@
           <a:p>
             <a:fld id="{497B238E-31D3-4B1F-B348-185C972FE44A}" type="datetime1">
               <a:rPr lang="en-US" smtClean="0"/>
-              <a:t>6/10/2017</a:t>
+              <a:t>6/11/2017</a:t>
             </a:fld>
             <a:endParaRPr lang="en-US"/>
           </a:p>
@@ -14495,7 +14589,7 @@
           <a:p>
             <a:fld id="{19582FB6-8FF1-4BD0-8894-95577FB7710C}" type="datetime1">
               <a:rPr lang="en-US" smtClean="0"/>
-              <a:t>6/10/2017</a:t>
+              <a:t>6/11/2017</a:t>
             </a:fld>
             <a:endParaRPr lang="en-US"/>
           </a:p>
@@ -14744,7 +14838,7 @@
           <a:p>
             <a:fld id="{4DA5B7C6-DBC3-44D3-B529-A12A76EAA082}" type="datetime1">
               <a:rPr lang="en-US" smtClean="0"/>
-              <a:t>6/10/2017</a:t>
+              <a:t>6/11/2017</a:t>
             </a:fld>
             <a:endParaRPr lang="en-US"/>
           </a:p>
@@ -15024,7 +15118,7 @@
           <a:p>
             <a:fld id="{A5E04D17-1D2A-4495-A1D2-AEA6C5658C0F}" type="datetime1">
               <a:rPr lang="en-US" smtClean="0"/>
-              <a:t>6/10/2017</a:t>
+              <a:t>6/11/2017</a:t>
             </a:fld>
             <a:endParaRPr lang="en-US"/>
           </a:p>
@@ -15140,7 +15234,7 @@
           <a:noFill/>
           <a:extLst>
             <a:ext uri="{909E8E84-426E-40dd-AFC4-6F175D3DCCD1}">
-              <a14:hiddenFill xmlns:a14="http://schemas.microsoft.com/office/drawing/2010/main" xmlns="">
+              <a14:hiddenFill xmlns="" xmlns:a14="http://schemas.microsoft.com/office/drawing/2010/main">
                 <a:solidFill>
                   <a:srgbClr val="FFFFFF"/>
                 </a:solidFill>
@@ -15214,7 +15308,7 @@
               </a:ln>
               <a:extLst>
                 <a:ext uri="{91240B29-F687-4f45-9708-019B960494DF}">
-                  <a14:hiddenLine xmlns:a14="http://schemas.microsoft.com/office/drawing/2010/main" xmlns="" w="9525">
+                  <a14:hiddenLine xmlns="" xmlns:a14="http://schemas.microsoft.com/office/drawing/2010/main" w="9525">
                     <a:solidFill>
                       <a:srgbClr val="000000"/>
                     </a:solidFill>
@@ -15304,7 +15398,7 @@
               </a:ln>
               <a:extLst>
                 <a:ext uri="{91240B29-F687-4f45-9708-019B960494DF}">
-                  <a14:hiddenLine xmlns:a14="http://schemas.microsoft.com/office/drawing/2010/main" xmlns="" w="9525">
+                  <a14:hiddenLine xmlns="" xmlns:a14="http://schemas.microsoft.com/office/drawing/2010/main" w="9525">
                     <a:solidFill>
                       <a:srgbClr val="000000"/>
                     </a:solidFill>
@@ -15394,7 +15488,7 @@
               </a:ln>
               <a:extLst>
                 <a:ext uri="{91240B29-F687-4f45-9708-019B960494DF}">
-                  <a14:hiddenLine xmlns:a14="http://schemas.microsoft.com/office/drawing/2010/main" xmlns="" w="9525">
+                  <a14:hiddenLine xmlns="" xmlns:a14="http://schemas.microsoft.com/office/drawing/2010/main" w="9525">
                     <a:solidFill>
                       <a:srgbClr val="000000"/>
                     </a:solidFill>
@@ -15456,7 +15550,7 @@
               </a:ln>
               <a:extLst>
                 <a:ext uri="{91240B29-F687-4f45-9708-019B960494DF}">
-                  <a14:hiddenLine xmlns:a14="http://schemas.microsoft.com/office/drawing/2010/main" xmlns="" w="9525">
+                  <a14:hiddenLine xmlns="" xmlns:a14="http://schemas.microsoft.com/office/drawing/2010/main" w="9525">
                     <a:solidFill>
                       <a:srgbClr val="000000"/>
                     </a:solidFill>
@@ -15546,7 +15640,7 @@
               </a:ln>
               <a:extLst>
                 <a:ext uri="{91240B29-F687-4f45-9708-019B960494DF}">
-                  <a14:hiddenLine xmlns:a14="http://schemas.microsoft.com/office/drawing/2010/main" xmlns="" w="9525">
+                  <a14:hiddenLine xmlns="" xmlns:a14="http://schemas.microsoft.com/office/drawing/2010/main" w="9525">
                     <a:solidFill>
                       <a:srgbClr val="000000"/>
                     </a:solidFill>
@@ -15608,7 +15702,7 @@
               </a:ln>
               <a:extLst>
                 <a:ext uri="{91240B29-F687-4f45-9708-019B960494DF}">
-                  <a14:hiddenLine xmlns:a14="http://schemas.microsoft.com/office/drawing/2010/main" xmlns="" w="9525">
+                  <a14:hiddenLine xmlns="" xmlns:a14="http://schemas.microsoft.com/office/drawing/2010/main" w="9525">
                     <a:solidFill>
                       <a:srgbClr val="000000"/>
                     </a:solidFill>
@@ -15670,7 +15764,7 @@
               </a:ln>
               <a:extLst>
                 <a:ext uri="{91240B29-F687-4f45-9708-019B960494DF}">
-                  <a14:hiddenLine xmlns:a14="http://schemas.microsoft.com/office/drawing/2010/main" xmlns="" w="9525">
+                  <a14:hiddenLine xmlns="" xmlns:a14="http://schemas.microsoft.com/office/drawing/2010/main" w="9525">
                     <a:solidFill>
                       <a:srgbClr val="000000"/>
                     </a:solidFill>
@@ -15760,7 +15854,7 @@
               </a:ln>
               <a:extLst>
                 <a:ext uri="{91240B29-F687-4f45-9708-019B960494DF}">
-                  <a14:hiddenLine xmlns:a14="http://schemas.microsoft.com/office/drawing/2010/main" xmlns="" w="9525">
+                  <a14:hiddenLine xmlns="" xmlns:a14="http://schemas.microsoft.com/office/drawing/2010/main" w="9525">
                     <a:solidFill>
                       <a:srgbClr val="000000"/>
                     </a:solidFill>
@@ -15850,7 +15944,7 @@
               </a:ln>
               <a:extLst>
                 <a:ext uri="{91240B29-F687-4f45-9708-019B960494DF}">
-                  <a14:hiddenLine xmlns:a14="http://schemas.microsoft.com/office/drawing/2010/main" xmlns="" w="9525">
+                  <a14:hiddenLine xmlns="" xmlns:a14="http://schemas.microsoft.com/office/drawing/2010/main" w="9525">
                     <a:solidFill>
                       <a:srgbClr val="000000"/>
                     </a:solidFill>
@@ -15912,7 +16006,7 @@
               </a:ln>
               <a:extLst>
                 <a:ext uri="{91240B29-F687-4f45-9708-019B960494DF}">
-                  <a14:hiddenLine xmlns:a14="http://schemas.microsoft.com/office/drawing/2010/main" xmlns="" w="9525">
+                  <a14:hiddenLine xmlns="" xmlns:a14="http://schemas.microsoft.com/office/drawing/2010/main" w="9525">
                     <a:solidFill>
                       <a:srgbClr val="000000"/>
                     </a:solidFill>
@@ -16022,7 +16116,7 @@
               </a:ln>
               <a:extLst>
                 <a:ext uri="{91240B29-F687-4f45-9708-019B960494DF}">
-                  <a14:hiddenLine xmlns:a14="http://schemas.microsoft.com/office/drawing/2010/main" xmlns="" w="9525">
+                  <a14:hiddenLine xmlns="" xmlns:a14="http://schemas.microsoft.com/office/drawing/2010/main" w="9525">
                     <a:solidFill>
                       <a:srgbClr val="000000"/>
                     </a:solidFill>
@@ -16106,7 +16200,7 @@
               </a:ln>
               <a:extLst>
                 <a:ext uri="{91240B29-F687-4f45-9708-019B960494DF}">
-                  <a14:hiddenLine xmlns:a14="http://schemas.microsoft.com/office/drawing/2010/main" xmlns="" w="9525">
+                  <a14:hiddenLine xmlns="" xmlns:a14="http://schemas.microsoft.com/office/drawing/2010/main" w="9525">
                     <a:solidFill>
                       <a:srgbClr val="000000"/>
                     </a:solidFill>
@@ -16168,7 +16262,7 @@
               </a:ln>
               <a:extLst>
                 <a:ext uri="{91240B29-F687-4f45-9708-019B960494DF}">
-                  <a14:hiddenLine xmlns:a14="http://schemas.microsoft.com/office/drawing/2010/main" xmlns="" w="9525">
+                  <a14:hiddenLine xmlns="" xmlns:a14="http://schemas.microsoft.com/office/drawing/2010/main" w="9525">
                     <a:solidFill>
                       <a:srgbClr val="000000"/>
                     </a:solidFill>
@@ -16230,7 +16324,7 @@
               </a:ln>
               <a:extLst>
                 <a:ext uri="{91240B29-F687-4f45-9708-019B960494DF}">
-                  <a14:hiddenLine xmlns:a14="http://schemas.microsoft.com/office/drawing/2010/main" xmlns="" w="9525">
+                  <a14:hiddenLine xmlns="" xmlns:a14="http://schemas.microsoft.com/office/drawing/2010/main" w="9525">
                     <a:solidFill>
                       <a:srgbClr val="000000"/>
                     </a:solidFill>
@@ -16320,7 +16414,7 @@
               </a:ln>
               <a:extLst>
                 <a:ext uri="{91240B29-F687-4f45-9708-019B960494DF}">
-                  <a14:hiddenLine xmlns:a14="http://schemas.microsoft.com/office/drawing/2010/main" xmlns="" w="9525">
+                  <a14:hiddenLine xmlns="" xmlns:a14="http://schemas.microsoft.com/office/drawing/2010/main" w="9525">
                     <a:solidFill>
                       <a:srgbClr val="000000"/>
                     </a:solidFill>
@@ -16354,7 +16448,7 @@
               </a:ln>
               <a:extLst>
                 <a:ext uri="{91240B29-F687-4f45-9708-019B960494DF}">
-                  <a14:hiddenLine xmlns:a14="http://schemas.microsoft.com/office/drawing/2010/main" xmlns="" w="9525">
+                  <a14:hiddenLine xmlns="" xmlns:a14="http://schemas.microsoft.com/office/drawing/2010/main" w="9525">
                     <a:solidFill>
                       <a:srgbClr val="000000"/>
                     </a:solidFill>
@@ -16419,7 +16513,7 @@
               </a:ln>
               <a:extLst>
                 <a:ext uri="{91240B29-F687-4f45-9708-019B960494DF}">
-                  <a14:hiddenLine xmlns:a14="http://schemas.microsoft.com/office/drawing/2010/main" xmlns="" w="9525">
+                  <a14:hiddenLine xmlns="" xmlns:a14="http://schemas.microsoft.com/office/drawing/2010/main" w="9525">
                     <a:solidFill>
                       <a:srgbClr val="000000"/>
                     </a:solidFill>
@@ -16509,7 +16603,7 @@
               </a:ln>
               <a:extLst>
                 <a:ext uri="{91240B29-F687-4f45-9708-019B960494DF}">
-                  <a14:hiddenLine xmlns:a14="http://schemas.microsoft.com/office/drawing/2010/main" xmlns="" w="9525">
+                  <a14:hiddenLine xmlns="" xmlns:a14="http://schemas.microsoft.com/office/drawing/2010/main" w="9525">
                     <a:solidFill>
                       <a:srgbClr val="000000"/>
                     </a:solidFill>
@@ -16571,7 +16665,7 @@
               </a:ln>
               <a:extLst>
                 <a:ext uri="{91240B29-F687-4f45-9708-019B960494DF}">
-                  <a14:hiddenLine xmlns:a14="http://schemas.microsoft.com/office/drawing/2010/main" xmlns="" w="9525">
+                  <a14:hiddenLine xmlns="" xmlns:a14="http://schemas.microsoft.com/office/drawing/2010/main" w="9525">
                     <a:solidFill>
                       <a:srgbClr val="000000"/>
                     </a:solidFill>
@@ -16661,7 +16755,7 @@
               </a:ln>
               <a:extLst>
                 <a:ext uri="{91240B29-F687-4f45-9708-019B960494DF}">
-                  <a14:hiddenLine xmlns:a14="http://schemas.microsoft.com/office/drawing/2010/main" xmlns="" w="9525">
+                  <a14:hiddenLine xmlns="" xmlns:a14="http://schemas.microsoft.com/office/drawing/2010/main" w="9525">
                     <a:solidFill>
                       <a:srgbClr val="000000"/>
                     </a:solidFill>
@@ -16726,7 +16820,7 @@
               </a:ln>
               <a:extLst>
                 <a:ext uri="{91240B29-F687-4f45-9708-019B960494DF}">
-                  <a14:hiddenLine xmlns:a14="http://schemas.microsoft.com/office/drawing/2010/main" xmlns="" w="9525">
+                  <a14:hiddenLine xmlns="" xmlns:a14="http://schemas.microsoft.com/office/drawing/2010/main" w="9525">
                     <a:solidFill>
                       <a:srgbClr val="000000"/>
                     </a:solidFill>
@@ -16788,7 +16882,7 @@
               </a:ln>
               <a:extLst>
                 <a:ext uri="{91240B29-F687-4f45-9708-019B960494DF}">
-                  <a14:hiddenLine xmlns:a14="http://schemas.microsoft.com/office/drawing/2010/main" xmlns="" w="9525">
+                  <a14:hiddenLine xmlns="" xmlns:a14="http://schemas.microsoft.com/office/drawing/2010/main" w="9525">
                     <a:solidFill>
                       <a:srgbClr val="000000"/>
                     </a:solidFill>
@@ -16878,7 +16972,7 @@
               </a:ln>
               <a:extLst>
                 <a:ext uri="{91240B29-F687-4f45-9708-019B960494DF}">
-                  <a14:hiddenLine xmlns:a14="http://schemas.microsoft.com/office/drawing/2010/main" xmlns="" w="9525">
+                  <a14:hiddenLine xmlns="" xmlns:a14="http://schemas.microsoft.com/office/drawing/2010/main" w="9525">
                     <a:solidFill>
                       <a:srgbClr val="000000"/>
                     </a:solidFill>
@@ -16968,7 +17062,7 @@
               </a:ln>
               <a:extLst>
                 <a:ext uri="{91240B29-F687-4f45-9708-019B960494DF}">
-                  <a14:hiddenLine xmlns:a14="http://schemas.microsoft.com/office/drawing/2010/main" xmlns="" w="9525">
+                  <a14:hiddenLine xmlns="" xmlns:a14="http://schemas.microsoft.com/office/drawing/2010/main" w="9525">
                     <a:solidFill>
                       <a:srgbClr val="000000"/>
                     </a:solidFill>
@@ -17033,7 +17127,7 @@
               </a:ln>
               <a:extLst>
                 <a:ext uri="{91240B29-F687-4f45-9708-019B960494DF}">
-                  <a14:hiddenLine xmlns:a14="http://schemas.microsoft.com/office/drawing/2010/main" xmlns="" w="9525">
+                  <a14:hiddenLine xmlns="" xmlns:a14="http://schemas.microsoft.com/office/drawing/2010/main" w="9525">
                     <a:solidFill>
                       <a:srgbClr val="000000"/>
                     </a:solidFill>
@@ -17153,7 +17247,7 @@
               </a:ln>
               <a:extLst>
                 <a:ext uri="{91240B29-F687-4f45-9708-019B960494DF}">
-                  <a14:hiddenLine xmlns:a14="http://schemas.microsoft.com/office/drawing/2010/main" xmlns="" w="9525">
+                  <a14:hiddenLine xmlns="" xmlns:a14="http://schemas.microsoft.com/office/drawing/2010/main" w="9525">
                     <a:solidFill>
                       <a:srgbClr val="000000"/>
                     </a:solidFill>
@@ -17251,7 +17345,7 @@
               </a:ln>
               <a:extLst>
                 <a:ext uri="{91240B29-F687-4f45-9708-019B960494DF}">
-                  <a14:hiddenLine xmlns:a14="http://schemas.microsoft.com/office/drawing/2010/main" xmlns="" w="9525">
+                  <a14:hiddenLine xmlns="" xmlns:a14="http://schemas.microsoft.com/office/drawing/2010/main" w="9525">
                     <a:solidFill>
                       <a:srgbClr val="000000"/>
                     </a:solidFill>
@@ -17366,7 +17460,7 @@
               </a:ln>
               <a:extLst>
                 <a:ext uri="{91240B29-F687-4f45-9708-019B960494DF}">
-                  <a14:hiddenLine xmlns:a14="http://schemas.microsoft.com/office/drawing/2010/main" xmlns="" w="9525">
+                  <a14:hiddenLine xmlns="" xmlns:a14="http://schemas.microsoft.com/office/drawing/2010/main" w="9525">
                     <a:solidFill>
                       <a:srgbClr val="000000"/>
                     </a:solidFill>
@@ -17456,7 +17550,7 @@
               </a:ln>
               <a:extLst>
                 <a:ext uri="{91240B29-F687-4f45-9708-019B960494DF}">
-                  <a14:hiddenLine xmlns:a14="http://schemas.microsoft.com/office/drawing/2010/main" xmlns="" w="9525">
+                  <a14:hiddenLine xmlns="" xmlns:a14="http://schemas.microsoft.com/office/drawing/2010/main" w="9525">
                     <a:solidFill>
                       <a:srgbClr val="000000"/>
                     </a:solidFill>
@@ -17521,7 +17615,7 @@
               </a:ln>
               <a:extLst>
                 <a:ext uri="{91240B29-F687-4f45-9708-019B960494DF}">
-                  <a14:hiddenLine xmlns:a14="http://schemas.microsoft.com/office/drawing/2010/main" xmlns="" w="9525">
+                  <a14:hiddenLine xmlns="" xmlns:a14="http://schemas.microsoft.com/office/drawing/2010/main" w="9525">
                     <a:solidFill>
                       <a:srgbClr val="000000"/>
                     </a:solidFill>
@@ -17611,7 +17705,7 @@
               </a:ln>
               <a:extLst>
                 <a:ext uri="{91240B29-F687-4f45-9708-019B960494DF}">
-                  <a14:hiddenLine xmlns:a14="http://schemas.microsoft.com/office/drawing/2010/main" xmlns="" w="9525">
+                  <a14:hiddenLine xmlns="" xmlns:a14="http://schemas.microsoft.com/office/drawing/2010/main" w="9525">
                     <a:solidFill>
                       <a:srgbClr val="000000"/>
                     </a:solidFill>
@@ -17679,7 +17773,7 @@
               </a:ln>
               <a:extLst>
                 <a:ext uri="{91240B29-F687-4f45-9708-019B960494DF}">
-                  <a14:hiddenLine xmlns:a14="http://schemas.microsoft.com/office/drawing/2010/main" xmlns="" w="9525">
+                  <a14:hiddenLine xmlns="" xmlns:a14="http://schemas.microsoft.com/office/drawing/2010/main" w="9525">
                     <a:solidFill>
                       <a:srgbClr val="000000"/>
                     </a:solidFill>
@@ -17769,7 +17863,7 @@
               </a:ln>
               <a:extLst>
                 <a:ext uri="{91240B29-F687-4f45-9708-019B960494DF}">
-                  <a14:hiddenLine xmlns:a14="http://schemas.microsoft.com/office/drawing/2010/main" xmlns="" w="9525">
+                  <a14:hiddenLine xmlns="" xmlns:a14="http://schemas.microsoft.com/office/drawing/2010/main" w="9525">
                     <a:solidFill>
                       <a:srgbClr val="000000"/>
                     </a:solidFill>
@@ -17837,7 +17931,7 @@
               </a:ln>
               <a:extLst>
                 <a:ext uri="{91240B29-F687-4f45-9708-019B960494DF}">
-                  <a14:hiddenLine xmlns:a14="http://schemas.microsoft.com/office/drawing/2010/main" xmlns="" w="9525">
+                  <a14:hiddenLine xmlns="" xmlns:a14="http://schemas.microsoft.com/office/drawing/2010/main" w="9525">
                     <a:solidFill>
                       <a:srgbClr val="000000"/>
                     </a:solidFill>
@@ -17927,7 +18021,7 @@
               </a:ln>
               <a:extLst>
                 <a:ext uri="{91240B29-F687-4f45-9708-019B960494DF}">
-                  <a14:hiddenLine xmlns:a14="http://schemas.microsoft.com/office/drawing/2010/main" xmlns="" w="9525">
+                  <a14:hiddenLine xmlns="" xmlns:a14="http://schemas.microsoft.com/office/drawing/2010/main" w="9525">
                     <a:solidFill>
                       <a:srgbClr val="000000"/>
                     </a:solidFill>
@@ -17961,7 +18055,7 @@
               </a:ln>
               <a:extLst>
                 <a:ext uri="{91240B29-F687-4f45-9708-019B960494DF}">
-                  <a14:hiddenLine xmlns:a14="http://schemas.microsoft.com/office/drawing/2010/main" xmlns="" w="9525">
+                  <a14:hiddenLine xmlns="" xmlns:a14="http://schemas.microsoft.com/office/drawing/2010/main" w="9525">
                     <a:solidFill>
                       <a:srgbClr val="000000"/>
                     </a:solidFill>
@@ -18101,7 +18195,7 @@
           <a:p>
             <a:fld id="{0780C3C2-E360-4074-89B7-939D42F4D217}" type="datetime1">
               <a:rPr lang="en-US" smtClean="0"/>
-              <a:t>6/10/2017</a:t>
+              <a:t>6/11/2017</a:t>
             </a:fld>
             <a:endParaRPr lang="en-US"/>
           </a:p>
@@ -34524,7 +34618,7 @@
           <a:p>
             <a:r>
               <a:rPr lang="en-US" dirty="0">
-                <a:hlinkClick r:id="rId2"/>
+                <a:hlinkClick r:id="rId3"/>
               </a:rPr>
               <a:t>https://security-center.intel.com/BugBountyProgram.aspx</a:t>
             </a:r>
@@ -35295,7 +35389,7 @@
         <p:spPr/>
         <p:txBody>
           <a:bodyPr>
-            <a:normAutofit fontScale="47500" lnSpcReduction="20000"/>
+            <a:normAutofit fontScale="55000" lnSpcReduction="20000"/>
           </a:bodyPr>
           <a:lstStyle/>
           <a:p>
@@ -35308,36 +35402,54 @@
             <a:endParaRPr lang="en-US" dirty="0"/>
           </a:p>
           <a:p>
+            <a:pPr marL="0" indent="0">
+              <a:buNone/>
+            </a:pPr>
             <a:r>
               <a:rPr lang="en-US" dirty="0"/>
               <a:t>“ In addition, Licensees should:</a:t>
             </a:r>
           </a:p>
           <a:p>
+            <a:pPr marL="0" indent="0">
+              <a:buNone/>
+            </a:pPr>
             <a:r>
               <a:rPr lang="en-US" dirty="0"/>
               <a:t>Observe industry secure coding best practices for software development to avoid vulnerabilities (such practices might include a secure software development framework, coding standards, data input validation, least access possible, secure logging, and so on).</a:t>
             </a:r>
           </a:p>
           <a:p>
+            <a:pPr marL="0" indent="0">
+              <a:buNone/>
+            </a:pPr>
             <a:r>
               <a:rPr lang="en-US" dirty="0"/>
               <a:t>Address and fix significant security vulnerabilities within a reasonable time, or within a time frame established under existing disclosure arrangements between Intel and the Licensee, after becoming aware of the vulnerability.</a:t>
             </a:r>
           </a:p>
           <a:p>
+            <a:pPr marL="0" indent="0">
+              <a:buNone/>
+            </a:pPr>
             <a:r>
               <a:rPr lang="en-US" dirty="0"/>
               <a:t>Ensure that the licensed application installer, or the operating environment in which the application resides, includes the most current Platform Software (PSW) Installer for Intel SGX.</a:t>
             </a:r>
           </a:p>
           <a:p>
+            <a:pPr marL="0" indent="0">
+              <a:buNone/>
+            </a:pPr>
             <a:r>
               <a:rPr lang="en-US" dirty="0"/>
               <a:t>Ensure that end-users receive PSW updates via application update mechanism, or via the operating environment in which the application resides.</a:t>
             </a:r>
           </a:p>
           <a:p>
+            <a:pPr marL="0" indent="0">
+              <a:buNone/>
+            </a:pPr>
             <a:r>
               <a:rPr lang="en-US" dirty="0"/>
               <a:t>Observe best industry practices to: (</a:t>
@@ -35364,6 +35476,9 @@
             </a:r>
           </a:p>
           <a:p>
+            <a:pPr marL="0" indent="0">
+              <a:buNone/>
+            </a:pPr>
             <a:r>
               <a:rPr lang="en-US" dirty="0"/>
               <a:t>Construct Licensed Software Applications to enable complete removal on end user request, including removal of any sealed data.”</a:t>

</xml_diff>

<commit_message>
Fixes - enclave destroy and timing ocall
</commit_message>
<xml_diff>
--- a/docs/SGX Enclave Programming - Common Mistakes.pptx
+++ b/docs/SGX Enclave Programming - Common Mistakes.pptx
@@ -4742,15 +4742,7 @@
             </a:r>
             <a:r>
               <a:rPr lang="en-US" dirty="0"/>
-              <a:t>” </a:t>
-            </a:r>
-            <a:r>
-              <a:rPr lang="en-US" dirty="0" err="1"/>
-              <a:t>excersises</a:t>
-            </a:r>
-            <a:r>
-              <a:rPr lang="en-US" dirty="0"/>
-              <a:t> </a:t>
+              <a:t>” exercises </a:t>
             </a:r>
           </a:p>
           <a:p>
@@ -6341,7 +6333,7 @@
           <a:noFill/>
           <a:extLst>
             <a:ext uri="{909E8E84-426E-40dd-AFC4-6F175D3DCCD1}">
-              <a14:hiddenFill xmlns="" xmlns:a14="http://schemas.microsoft.com/office/drawing/2010/main">
+              <a14:hiddenFill xmlns:a14="http://schemas.microsoft.com/office/drawing/2010/main" xmlns="">
                 <a:solidFill>
                   <a:srgbClr val="FFFFFF"/>
                 </a:solidFill>
@@ -6401,7 +6393,7 @@
             </a:ln>
             <a:extLst>
               <a:ext uri="{91240B29-F687-4f45-9708-019B960494DF}">
-                <a14:hiddenLine xmlns="" xmlns:a14="http://schemas.microsoft.com/office/drawing/2010/main" w="9525">
+                <a14:hiddenLine xmlns:a14="http://schemas.microsoft.com/office/drawing/2010/main" xmlns="" w="9525">
                   <a:solidFill>
                     <a:srgbClr val="000000"/>
                   </a:solidFill>
@@ -6491,7 +6483,7 @@
             </a:ln>
             <a:extLst>
               <a:ext uri="{91240B29-F687-4f45-9708-019B960494DF}">
-                <a14:hiddenLine xmlns="" xmlns:a14="http://schemas.microsoft.com/office/drawing/2010/main" w="9525">
+                <a14:hiddenLine xmlns:a14="http://schemas.microsoft.com/office/drawing/2010/main" xmlns="" w="9525">
                   <a:solidFill>
                     <a:srgbClr val="000000"/>
                   </a:solidFill>
@@ -6581,7 +6573,7 @@
             </a:ln>
             <a:extLst>
               <a:ext uri="{91240B29-F687-4f45-9708-019B960494DF}">
-                <a14:hiddenLine xmlns="" xmlns:a14="http://schemas.microsoft.com/office/drawing/2010/main" w="9525">
+                <a14:hiddenLine xmlns:a14="http://schemas.microsoft.com/office/drawing/2010/main" xmlns="" w="9525">
                   <a:solidFill>
                     <a:srgbClr val="000000"/>
                   </a:solidFill>
@@ -6615,7 +6607,7 @@
             </a:ln>
             <a:extLst>
               <a:ext uri="{91240B29-F687-4f45-9708-019B960494DF}">
-                <a14:hiddenLine xmlns="" xmlns:a14="http://schemas.microsoft.com/office/drawing/2010/main" w="9525">
+                <a14:hiddenLine xmlns:a14="http://schemas.microsoft.com/office/drawing/2010/main" xmlns="" w="9525">
                   <a:solidFill>
                     <a:srgbClr val="000000"/>
                   </a:solidFill>
@@ -6705,7 +6697,7 @@
             </a:ln>
             <a:extLst>
               <a:ext uri="{91240B29-F687-4f45-9708-019B960494DF}">
-                <a14:hiddenLine xmlns="" xmlns:a14="http://schemas.microsoft.com/office/drawing/2010/main" w="9525">
+                <a14:hiddenLine xmlns:a14="http://schemas.microsoft.com/office/drawing/2010/main" xmlns="" w="9525">
                   <a:solidFill>
                     <a:srgbClr val="000000"/>
                   </a:solidFill>
@@ -6767,7 +6759,7 @@
             </a:ln>
             <a:extLst>
               <a:ext uri="{91240B29-F687-4f45-9708-019B960494DF}">
-                <a14:hiddenLine xmlns="" xmlns:a14="http://schemas.microsoft.com/office/drawing/2010/main" w="9525">
+                <a14:hiddenLine xmlns:a14="http://schemas.microsoft.com/office/drawing/2010/main" xmlns="" w="9525">
                   <a:solidFill>
                     <a:srgbClr val="000000"/>
                   </a:solidFill>
@@ -6829,7 +6821,7 @@
             </a:ln>
             <a:extLst>
               <a:ext uri="{91240B29-F687-4f45-9708-019B960494DF}">
-                <a14:hiddenLine xmlns="" xmlns:a14="http://schemas.microsoft.com/office/drawing/2010/main" w="9525">
+                <a14:hiddenLine xmlns:a14="http://schemas.microsoft.com/office/drawing/2010/main" xmlns="" w="9525">
                   <a:solidFill>
                     <a:srgbClr val="000000"/>
                   </a:solidFill>
@@ -6919,7 +6911,7 @@
             </a:ln>
             <a:extLst>
               <a:ext uri="{91240B29-F687-4f45-9708-019B960494DF}">
-                <a14:hiddenLine xmlns="" xmlns:a14="http://schemas.microsoft.com/office/drawing/2010/main" w="9525">
+                <a14:hiddenLine xmlns:a14="http://schemas.microsoft.com/office/drawing/2010/main" xmlns="" w="9525">
                   <a:solidFill>
                     <a:srgbClr val="000000"/>
                   </a:solidFill>
@@ -6981,7 +6973,7 @@
             </a:ln>
             <a:extLst>
               <a:ext uri="{91240B29-F687-4f45-9708-019B960494DF}">
-                <a14:hiddenLine xmlns="" xmlns:a14="http://schemas.microsoft.com/office/drawing/2010/main" w="9525">
+                <a14:hiddenLine xmlns:a14="http://schemas.microsoft.com/office/drawing/2010/main" xmlns="" w="9525">
                   <a:solidFill>
                     <a:srgbClr val="000000"/>
                   </a:solidFill>
@@ -7043,7 +7035,7 @@
             </a:ln>
             <a:extLst>
               <a:ext uri="{91240B29-F687-4f45-9708-019B960494DF}">
-                <a14:hiddenLine xmlns="" xmlns:a14="http://schemas.microsoft.com/office/drawing/2010/main" w="9525">
+                <a14:hiddenLine xmlns:a14="http://schemas.microsoft.com/office/drawing/2010/main" xmlns="" w="9525">
                   <a:solidFill>
                     <a:srgbClr val="000000"/>
                   </a:solidFill>
@@ -7133,7 +7125,7 @@
             </a:ln>
             <a:extLst>
               <a:ext uri="{91240B29-F687-4f45-9708-019B960494DF}">
-                <a14:hiddenLine xmlns="" xmlns:a14="http://schemas.microsoft.com/office/drawing/2010/main" w="9525">
+                <a14:hiddenLine xmlns:a14="http://schemas.microsoft.com/office/drawing/2010/main" xmlns="" w="9525">
                   <a:solidFill>
                     <a:srgbClr val="000000"/>
                   </a:solidFill>
@@ -7223,7 +7215,7 @@
             </a:ln>
             <a:extLst>
               <a:ext uri="{91240B29-F687-4f45-9708-019B960494DF}">
-                <a14:hiddenLine xmlns="" xmlns:a14="http://schemas.microsoft.com/office/drawing/2010/main" w="9525">
+                <a14:hiddenLine xmlns:a14="http://schemas.microsoft.com/office/drawing/2010/main" xmlns="" w="9525">
                   <a:solidFill>
                     <a:srgbClr val="000000"/>
                   </a:solidFill>
@@ -7285,7 +7277,7 @@
             </a:ln>
             <a:extLst>
               <a:ext uri="{91240B29-F687-4f45-9708-019B960494DF}">
-                <a14:hiddenLine xmlns="" xmlns:a14="http://schemas.microsoft.com/office/drawing/2010/main" w="9525">
+                <a14:hiddenLine xmlns:a14="http://schemas.microsoft.com/office/drawing/2010/main" xmlns="" w="9525">
                   <a:solidFill>
                     <a:srgbClr val="000000"/>
                   </a:solidFill>
@@ -7395,7 +7387,7 @@
             </a:ln>
             <a:extLst>
               <a:ext uri="{91240B29-F687-4f45-9708-019B960494DF}">
-                <a14:hiddenLine xmlns="" xmlns:a14="http://schemas.microsoft.com/office/drawing/2010/main" w="9525">
+                <a14:hiddenLine xmlns:a14="http://schemas.microsoft.com/office/drawing/2010/main" xmlns="" w="9525">
                   <a:solidFill>
                     <a:srgbClr val="000000"/>
                   </a:solidFill>
@@ -7457,7 +7449,7 @@
             </a:ln>
             <a:extLst>
               <a:ext uri="{91240B29-F687-4f45-9708-019B960494DF}">
-                <a14:hiddenLine xmlns="" xmlns:a14="http://schemas.microsoft.com/office/drawing/2010/main" w="9525">
+                <a14:hiddenLine xmlns:a14="http://schemas.microsoft.com/office/drawing/2010/main" xmlns="" w="9525">
                   <a:solidFill>
                     <a:srgbClr val="000000"/>
                   </a:solidFill>
@@ -7547,7 +7539,7 @@
             </a:ln>
             <a:extLst>
               <a:ext uri="{91240B29-F687-4f45-9708-019B960494DF}">
-                <a14:hiddenLine xmlns="" xmlns:a14="http://schemas.microsoft.com/office/drawing/2010/main" w="9525">
+                <a14:hiddenLine xmlns:a14="http://schemas.microsoft.com/office/drawing/2010/main" xmlns="" w="9525">
                   <a:solidFill>
                     <a:srgbClr val="000000"/>
                   </a:solidFill>
@@ -7637,7 +7629,7 @@
             </a:ln>
             <a:extLst>
               <a:ext uri="{91240B29-F687-4f45-9708-019B960494DF}">
-                <a14:hiddenLine xmlns="" xmlns:a14="http://schemas.microsoft.com/office/drawing/2010/main" w="9525">
+                <a14:hiddenLine xmlns:a14="http://schemas.microsoft.com/office/drawing/2010/main" xmlns="" w="9525">
                   <a:solidFill>
                     <a:srgbClr val="000000"/>
                   </a:solidFill>
@@ -7699,7 +7691,7 @@
             </a:ln>
             <a:extLst>
               <a:ext uri="{91240B29-F687-4f45-9708-019B960494DF}">
-                <a14:hiddenLine xmlns="" xmlns:a14="http://schemas.microsoft.com/office/drawing/2010/main" w="9525">
+                <a14:hiddenLine xmlns:a14="http://schemas.microsoft.com/office/drawing/2010/main" xmlns="" w="9525">
                   <a:solidFill>
                     <a:srgbClr val="000000"/>
                   </a:solidFill>
@@ -7789,7 +7781,7 @@
             </a:ln>
             <a:extLst>
               <a:ext uri="{91240B29-F687-4f45-9708-019B960494DF}">
-                <a14:hiddenLine xmlns="" xmlns:a14="http://schemas.microsoft.com/office/drawing/2010/main" w="9525">
+                <a14:hiddenLine xmlns:a14="http://schemas.microsoft.com/office/drawing/2010/main" xmlns="" w="9525">
                   <a:solidFill>
                     <a:srgbClr val="000000"/>
                   </a:solidFill>
@@ -7879,7 +7871,7 @@
             </a:ln>
             <a:extLst>
               <a:ext uri="{91240B29-F687-4f45-9708-019B960494DF}">
-                <a14:hiddenLine xmlns="" xmlns:a14="http://schemas.microsoft.com/office/drawing/2010/main" w="9525">
+                <a14:hiddenLine xmlns:a14="http://schemas.microsoft.com/office/drawing/2010/main" xmlns="" w="9525">
                   <a:solidFill>
                     <a:srgbClr val="000000"/>
                   </a:solidFill>
@@ -7935,7 +7927,7 @@
             </a:ln>
             <a:extLst>
               <a:ext uri="{91240B29-F687-4f45-9708-019B960494DF}">
-                <a14:hiddenLine xmlns="" xmlns:a14="http://schemas.microsoft.com/office/drawing/2010/main" w="9525">
+                <a14:hiddenLine xmlns:a14="http://schemas.microsoft.com/office/drawing/2010/main" xmlns="" w="9525">
                   <a:solidFill>
                     <a:srgbClr val="000000"/>
                   </a:solidFill>
@@ -8025,7 +8017,7 @@
             </a:ln>
             <a:extLst>
               <a:ext uri="{91240B29-F687-4f45-9708-019B960494DF}">
-                <a14:hiddenLine xmlns="" xmlns:a14="http://schemas.microsoft.com/office/drawing/2010/main" w="9525">
+                <a14:hiddenLine xmlns:a14="http://schemas.microsoft.com/office/drawing/2010/main" xmlns="" w="9525">
                   <a:solidFill>
                     <a:srgbClr val="000000"/>
                   </a:solidFill>
@@ -8081,7 +8073,7 @@
             </a:ln>
             <a:extLst>
               <a:ext uri="{91240B29-F687-4f45-9708-019B960494DF}">
-                <a14:hiddenLine xmlns="" xmlns:a14="http://schemas.microsoft.com/office/drawing/2010/main" w="9525">
+                <a14:hiddenLine xmlns:a14="http://schemas.microsoft.com/office/drawing/2010/main" xmlns="" w="9525">
                   <a:solidFill>
                     <a:srgbClr val="000000"/>
                   </a:solidFill>
@@ -8171,7 +8163,7 @@
             </a:ln>
             <a:extLst>
               <a:ext uri="{91240B29-F687-4f45-9708-019B960494DF}">
-                <a14:hiddenLine xmlns="" xmlns:a14="http://schemas.microsoft.com/office/drawing/2010/main" w="9525">
+                <a14:hiddenLine xmlns:a14="http://schemas.microsoft.com/office/drawing/2010/main" xmlns="" w="9525">
                   <a:solidFill>
                     <a:srgbClr val="000000"/>
                   </a:solidFill>
@@ -8239,7 +8231,7 @@
             </a:ln>
             <a:extLst>
               <a:ext uri="{91240B29-F687-4f45-9708-019B960494DF}">
-                <a14:hiddenLine xmlns="" xmlns:a14="http://schemas.microsoft.com/office/drawing/2010/main" w="9525">
+                <a14:hiddenLine xmlns:a14="http://schemas.microsoft.com/office/drawing/2010/main" xmlns="" w="9525">
                   <a:solidFill>
                     <a:srgbClr val="000000"/>
                   </a:solidFill>
@@ -8329,7 +8321,7 @@
             </a:ln>
             <a:extLst>
               <a:ext uri="{91240B29-F687-4f45-9708-019B960494DF}">
-                <a14:hiddenLine xmlns="" xmlns:a14="http://schemas.microsoft.com/office/drawing/2010/main" w="9525">
+                <a14:hiddenLine xmlns:a14="http://schemas.microsoft.com/office/drawing/2010/main" xmlns="" w="9525">
                   <a:solidFill>
                     <a:srgbClr val="000000"/>
                   </a:solidFill>
@@ -8397,7 +8389,7 @@
             </a:ln>
             <a:extLst>
               <a:ext uri="{91240B29-F687-4f45-9708-019B960494DF}">
-                <a14:hiddenLine xmlns="" xmlns:a14="http://schemas.microsoft.com/office/drawing/2010/main" w="9525">
+                <a14:hiddenLine xmlns:a14="http://schemas.microsoft.com/office/drawing/2010/main" xmlns="" w="9525">
                   <a:solidFill>
                     <a:srgbClr val="000000"/>
                   </a:solidFill>
@@ -8487,7 +8479,7 @@
             </a:ln>
             <a:extLst>
               <a:ext uri="{91240B29-F687-4f45-9708-019B960494DF}">
-                <a14:hiddenLine xmlns="" xmlns:a14="http://schemas.microsoft.com/office/drawing/2010/main" w="9525">
+                <a14:hiddenLine xmlns:a14="http://schemas.microsoft.com/office/drawing/2010/main" xmlns="" w="9525">
                   <a:solidFill>
                     <a:srgbClr val="000000"/>
                   </a:solidFill>
@@ -8521,7 +8513,7 @@
             </a:ln>
             <a:extLst>
               <a:ext uri="{91240B29-F687-4f45-9708-019B960494DF}">
-                <a14:hiddenLine xmlns="" xmlns:a14="http://schemas.microsoft.com/office/drawing/2010/main" w="9525">
+                <a14:hiddenLine xmlns:a14="http://schemas.microsoft.com/office/drawing/2010/main" xmlns="" w="9525">
                   <a:solidFill>
                     <a:srgbClr val="000000"/>
                   </a:solidFill>
@@ -8611,7 +8603,7 @@
             </a:ln>
             <a:extLst>
               <a:ext uri="{91240B29-F687-4f45-9708-019B960494DF}">
-                <a14:hiddenLine xmlns="" xmlns:a14="http://schemas.microsoft.com/office/drawing/2010/main" w="9525">
+                <a14:hiddenLine xmlns:a14="http://schemas.microsoft.com/office/drawing/2010/main" xmlns="" w="9525">
                   <a:solidFill>
                     <a:srgbClr val="000000"/>
                   </a:solidFill>
@@ -8673,7 +8665,7 @@
             </a:ln>
             <a:extLst>
               <a:ext uri="{91240B29-F687-4f45-9708-019B960494DF}">
-                <a14:hiddenLine xmlns="" xmlns:a14="http://schemas.microsoft.com/office/drawing/2010/main" w="9525">
+                <a14:hiddenLine xmlns:a14="http://schemas.microsoft.com/office/drawing/2010/main" xmlns="" w="9525">
                   <a:solidFill>
                     <a:srgbClr val="000000"/>
                   </a:solidFill>
@@ -8735,7 +8727,7 @@
             </a:ln>
             <a:extLst>
               <a:ext uri="{91240B29-F687-4f45-9708-019B960494DF}">
-                <a14:hiddenLine xmlns="" xmlns:a14="http://schemas.microsoft.com/office/drawing/2010/main" w="9525">
+                <a14:hiddenLine xmlns:a14="http://schemas.microsoft.com/office/drawing/2010/main" xmlns="" w="9525">
                   <a:solidFill>
                     <a:srgbClr val="000000"/>
                   </a:solidFill>
@@ -8825,7 +8817,7 @@
             </a:ln>
             <a:extLst>
               <a:ext uri="{91240B29-F687-4f45-9708-019B960494DF}">
-                <a14:hiddenLine xmlns="" xmlns:a14="http://schemas.microsoft.com/office/drawing/2010/main" w="9525">
+                <a14:hiddenLine xmlns:a14="http://schemas.microsoft.com/office/drawing/2010/main" xmlns="" w="9525">
                   <a:solidFill>
                     <a:srgbClr val="000000"/>
                   </a:solidFill>
@@ -8893,7 +8885,7 @@
             </a:ln>
             <a:extLst>
               <a:ext uri="{91240B29-F687-4f45-9708-019B960494DF}">
-                <a14:hiddenLine xmlns="" xmlns:a14="http://schemas.microsoft.com/office/drawing/2010/main" w="9525">
+                <a14:hiddenLine xmlns:a14="http://schemas.microsoft.com/office/drawing/2010/main" xmlns="" w="9525">
                   <a:solidFill>
                     <a:srgbClr val="000000"/>
                   </a:solidFill>
@@ -8955,7 +8947,7 @@
             </a:ln>
             <a:extLst>
               <a:ext uri="{91240B29-F687-4f45-9708-019B960494DF}">
-                <a14:hiddenLine xmlns="" xmlns:a14="http://schemas.microsoft.com/office/drawing/2010/main" w="9525">
+                <a14:hiddenLine xmlns:a14="http://schemas.microsoft.com/office/drawing/2010/main" xmlns="" w="9525">
                   <a:solidFill>
                     <a:srgbClr val="000000"/>
                   </a:solidFill>
@@ -9045,7 +9037,7 @@
             </a:ln>
             <a:extLst>
               <a:ext uri="{91240B29-F687-4f45-9708-019B960494DF}">
-                <a14:hiddenLine xmlns="" xmlns:a14="http://schemas.microsoft.com/office/drawing/2010/main" w="9525">
+                <a14:hiddenLine xmlns:a14="http://schemas.microsoft.com/office/drawing/2010/main" xmlns="" w="9525">
                   <a:solidFill>
                     <a:srgbClr val="000000"/>
                   </a:solidFill>
@@ -9107,7 +9099,7 @@
             </a:ln>
             <a:extLst>
               <a:ext uri="{91240B29-F687-4f45-9708-019B960494DF}">
-                <a14:hiddenLine xmlns="" xmlns:a14="http://schemas.microsoft.com/office/drawing/2010/main" w="9525">
+                <a14:hiddenLine xmlns:a14="http://schemas.microsoft.com/office/drawing/2010/main" xmlns="" w="9525">
                   <a:solidFill>
                     <a:srgbClr val="000000"/>
                   </a:solidFill>
@@ -9197,7 +9189,7 @@
             </a:ln>
             <a:extLst>
               <a:ext uri="{91240B29-F687-4f45-9708-019B960494DF}">
-                <a14:hiddenLine xmlns="" xmlns:a14="http://schemas.microsoft.com/office/drawing/2010/main" w="9525">
+                <a14:hiddenLine xmlns:a14="http://schemas.microsoft.com/office/drawing/2010/main" xmlns="" w="9525">
                   <a:solidFill>
                     <a:srgbClr val="000000"/>
                   </a:solidFill>
@@ -9259,7 +9251,7 @@
             </a:ln>
             <a:extLst>
               <a:ext uri="{91240B29-F687-4f45-9708-019B960494DF}">
-                <a14:hiddenLine xmlns="" xmlns:a14="http://schemas.microsoft.com/office/drawing/2010/main" w="9525">
+                <a14:hiddenLine xmlns:a14="http://schemas.microsoft.com/office/drawing/2010/main" xmlns="" w="9525">
                   <a:solidFill>
                     <a:srgbClr val="000000"/>
                   </a:solidFill>
@@ -9349,7 +9341,7 @@
             </a:ln>
             <a:extLst>
               <a:ext uri="{91240B29-F687-4f45-9708-019B960494DF}">
-                <a14:hiddenLine xmlns="" xmlns:a14="http://schemas.microsoft.com/office/drawing/2010/main" w="9525">
+                <a14:hiddenLine xmlns:a14="http://schemas.microsoft.com/office/drawing/2010/main" xmlns="" w="9525">
                   <a:solidFill>
                     <a:srgbClr val="000000"/>
                   </a:solidFill>
@@ -9383,7 +9375,7 @@
             </a:ln>
             <a:extLst>
               <a:ext uri="{91240B29-F687-4f45-9708-019B960494DF}">
-                <a14:hiddenLine xmlns="" xmlns:a14="http://schemas.microsoft.com/office/drawing/2010/main" w="9525">
+                <a14:hiddenLine xmlns:a14="http://schemas.microsoft.com/office/drawing/2010/main" xmlns="" w="9525">
                   <a:solidFill>
                     <a:srgbClr val="000000"/>
                   </a:solidFill>
@@ -9448,7 +9440,7 @@
             </a:ln>
             <a:extLst>
               <a:ext uri="{91240B29-F687-4f45-9708-019B960494DF}">
-                <a14:hiddenLine xmlns="" xmlns:a14="http://schemas.microsoft.com/office/drawing/2010/main" w="9525">
+                <a14:hiddenLine xmlns:a14="http://schemas.microsoft.com/office/drawing/2010/main" xmlns="" w="9525">
                   <a:solidFill>
                     <a:srgbClr val="000000"/>
                   </a:solidFill>
@@ -9538,7 +9530,7 @@
             </a:ln>
             <a:extLst>
               <a:ext uri="{91240B29-F687-4f45-9708-019B960494DF}">
-                <a14:hiddenLine xmlns="" xmlns:a14="http://schemas.microsoft.com/office/drawing/2010/main" w="9525">
+                <a14:hiddenLine xmlns:a14="http://schemas.microsoft.com/office/drawing/2010/main" xmlns="" w="9525">
                   <a:solidFill>
                     <a:srgbClr val="000000"/>
                   </a:solidFill>
@@ -9600,7 +9592,7 @@
             </a:ln>
             <a:extLst>
               <a:ext uri="{91240B29-F687-4f45-9708-019B960494DF}">
-                <a14:hiddenLine xmlns="" xmlns:a14="http://schemas.microsoft.com/office/drawing/2010/main" w="9525">
+                <a14:hiddenLine xmlns:a14="http://schemas.microsoft.com/office/drawing/2010/main" xmlns="" w="9525">
                   <a:solidFill>
                     <a:srgbClr val="000000"/>
                   </a:solidFill>
@@ -9690,7 +9682,7 @@
             </a:ln>
             <a:extLst>
               <a:ext uri="{91240B29-F687-4f45-9708-019B960494DF}">
-                <a14:hiddenLine xmlns="" xmlns:a14="http://schemas.microsoft.com/office/drawing/2010/main" w="9525">
+                <a14:hiddenLine xmlns:a14="http://schemas.microsoft.com/office/drawing/2010/main" xmlns="" w="9525">
                   <a:solidFill>
                     <a:srgbClr val="000000"/>
                   </a:solidFill>
@@ -9780,7 +9772,7 @@
             </a:ln>
             <a:extLst>
               <a:ext uri="{91240B29-F687-4f45-9708-019B960494DF}">
-                <a14:hiddenLine xmlns="" xmlns:a14="http://schemas.microsoft.com/office/drawing/2010/main" w="9525">
+                <a14:hiddenLine xmlns:a14="http://schemas.microsoft.com/office/drawing/2010/main" xmlns="" w="9525">
                   <a:solidFill>
                     <a:srgbClr val="000000"/>
                   </a:solidFill>
@@ -9845,7 +9837,7 @@
             </a:ln>
             <a:extLst>
               <a:ext uri="{91240B29-F687-4f45-9708-019B960494DF}">
-                <a14:hiddenLine xmlns="" xmlns:a14="http://schemas.microsoft.com/office/drawing/2010/main" w="9525">
+                <a14:hiddenLine xmlns:a14="http://schemas.microsoft.com/office/drawing/2010/main" xmlns="" w="9525">
                   <a:solidFill>
                     <a:srgbClr val="000000"/>
                   </a:solidFill>
@@ -9907,7 +9899,7 @@
             </a:ln>
             <a:extLst>
               <a:ext uri="{91240B29-F687-4f45-9708-019B960494DF}">
-                <a14:hiddenLine xmlns="" xmlns:a14="http://schemas.microsoft.com/office/drawing/2010/main" w="9525">
+                <a14:hiddenLine xmlns:a14="http://schemas.microsoft.com/office/drawing/2010/main" xmlns="" w="9525">
                   <a:solidFill>
                     <a:srgbClr val="000000"/>
                   </a:solidFill>
@@ -9997,7 +9989,7 @@
             </a:ln>
             <a:extLst>
               <a:ext uri="{91240B29-F687-4f45-9708-019B960494DF}">
-                <a14:hiddenLine xmlns="" xmlns:a14="http://schemas.microsoft.com/office/drawing/2010/main" w="9525">
+                <a14:hiddenLine xmlns:a14="http://schemas.microsoft.com/office/drawing/2010/main" xmlns="" w="9525">
                   <a:solidFill>
                     <a:srgbClr val="000000"/>
                   </a:solidFill>
@@ -10087,7 +10079,7 @@
             </a:ln>
             <a:extLst>
               <a:ext uri="{91240B29-F687-4f45-9708-019B960494DF}">
-                <a14:hiddenLine xmlns="" xmlns:a14="http://schemas.microsoft.com/office/drawing/2010/main" w="9525">
+                <a14:hiddenLine xmlns:a14="http://schemas.microsoft.com/office/drawing/2010/main" xmlns="" w="9525">
                   <a:solidFill>
                     <a:srgbClr val="000000"/>
                   </a:solidFill>
@@ -10149,7 +10141,7 @@
             </a:ln>
             <a:extLst>
               <a:ext uri="{91240B29-F687-4f45-9708-019B960494DF}">
-                <a14:hiddenLine xmlns="" xmlns:a14="http://schemas.microsoft.com/office/drawing/2010/main" w="9525">
+                <a14:hiddenLine xmlns:a14="http://schemas.microsoft.com/office/drawing/2010/main" xmlns="" w="9525">
                   <a:solidFill>
                     <a:srgbClr val="000000"/>
                   </a:solidFill>
@@ -10269,7 +10261,7 @@
             </a:ln>
             <a:extLst>
               <a:ext uri="{91240B29-F687-4f45-9708-019B960494DF}">
-                <a14:hiddenLine xmlns="" xmlns:a14="http://schemas.microsoft.com/office/drawing/2010/main" w="9525">
+                <a14:hiddenLine xmlns:a14="http://schemas.microsoft.com/office/drawing/2010/main" xmlns="" w="9525">
                   <a:solidFill>
                     <a:srgbClr val="000000"/>
                   </a:solidFill>
@@ -10337,7 +10329,7 @@
             </a:ln>
             <a:extLst>
               <a:ext uri="{91240B29-F687-4f45-9708-019B960494DF}">
-                <a14:hiddenLine xmlns="" xmlns:a14="http://schemas.microsoft.com/office/drawing/2010/main" w="9525">
+                <a14:hiddenLine xmlns:a14="http://schemas.microsoft.com/office/drawing/2010/main" xmlns="" w="9525">
                   <a:solidFill>
                     <a:srgbClr val="000000"/>
                   </a:solidFill>
@@ -10427,7 +10419,7 @@
             </a:ln>
             <a:extLst>
               <a:ext uri="{91240B29-F687-4f45-9708-019B960494DF}">
-                <a14:hiddenLine xmlns="" xmlns:a14="http://schemas.microsoft.com/office/drawing/2010/main" w="9525">
+                <a14:hiddenLine xmlns:a14="http://schemas.microsoft.com/office/drawing/2010/main" xmlns="" w="9525">
                   <a:solidFill>
                     <a:srgbClr val="000000"/>
                   </a:solidFill>
@@ -15234,7 +15226,7 @@
           <a:noFill/>
           <a:extLst>
             <a:ext uri="{909E8E84-426E-40dd-AFC4-6F175D3DCCD1}">
-              <a14:hiddenFill xmlns="" xmlns:a14="http://schemas.microsoft.com/office/drawing/2010/main">
+              <a14:hiddenFill xmlns:a14="http://schemas.microsoft.com/office/drawing/2010/main" xmlns="">
                 <a:solidFill>
                   <a:srgbClr val="FFFFFF"/>
                 </a:solidFill>
@@ -15308,7 +15300,7 @@
               </a:ln>
               <a:extLst>
                 <a:ext uri="{91240B29-F687-4f45-9708-019B960494DF}">
-                  <a14:hiddenLine xmlns="" xmlns:a14="http://schemas.microsoft.com/office/drawing/2010/main" w="9525">
+                  <a14:hiddenLine xmlns:a14="http://schemas.microsoft.com/office/drawing/2010/main" xmlns="" w="9525">
                     <a:solidFill>
                       <a:srgbClr val="000000"/>
                     </a:solidFill>
@@ -15398,7 +15390,7 @@
               </a:ln>
               <a:extLst>
                 <a:ext uri="{91240B29-F687-4f45-9708-019B960494DF}">
-                  <a14:hiddenLine xmlns="" xmlns:a14="http://schemas.microsoft.com/office/drawing/2010/main" w="9525">
+                  <a14:hiddenLine xmlns:a14="http://schemas.microsoft.com/office/drawing/2010/main" xmlns="" w="9525">
                     <a:solidFill>
                       <a:srgbClr val="000000"/>
                     </a:solidFill>
@@ -15488,7 +15480,7 @@
               </a:ln>
               <a:extLst>
                 <a:ext uri="{91240B29-F687-4f45-9708-019B960494DF}">
-                  <a14:hiddenLine xmlns="" xmlns:a14="http://schemas.microsoft.com/office/drawing/2010/main" w="9525">
+                  <a14:hiddenLine xmlns:a14="http://schemas.microsoft.com/office/drawing/2010/main" xmlns="" w="9525">
                     <a:solidFill>
                       <a:srgbClr val="000000"/>
                     </a:solidFill>
@@ -15550,7 +15542,7 @@
               </a:ln>
               <a:extLst>
                 <a:ext uri="{91240B29-F687-4f45-9708-019B960494DF}">
-                  <a14:hiddenLine xmlns="" xmlns:a14="http://schemas.microsoft.com/office/drawing/2010/main" w="9525">
+                  <a14:hiddenLine xmlns:a14="http://schemas.microsoft.com/office/drawing/2010/main" xmlns="" w="9525">
                     <a:solidFill>
                       <a:srgbClr val="000000"/>
                     </a:solidFill>
@@ -15640,7 +15632,7 @@
               </a:ln>
               <a:extLst>
                 <a:ext uri="{91240B29-F687-4f45-9708-019B960494DF}">
-                  <a14:hiddenLine xmlns="" xmlns:a14="http://schemas.microsoft.com/office/drawing/2010/main" w="9525">
+                  <a14:hiddenLine xmlns:a14="http://schemas.microsoft.com/office/drawing/2010/main" xmlns="" w="9525">
                     <a:solidFill>
                       <a:srgbClr val="000000"/>
                     </a:solidFill>
@@ -15702,7 +15694,7 @@
               </a:ln>
               <a:extLst>
                 <a:ext uri="{91240B29-F687-4f45-9708-019B960494DF}">
-                  <a14:hiddenLine xmlns="" xmlns:a14="http://schemas.microsoft.com/office/drawing/2010/main" w="9525">
+                  <a14:hiddenLine xmlns:a14="http://schemas.microsoft.com/office/drawing/2010/main" xmlns="" w="9525">
                     <a:solidFill>
                       <a:srgbClr val="000000"/>
                     </a:solidFill>
@@ -15764,7 +15756,7 @@
               </a:ln>
               <a:extLst>
                 <a:ext uri="{91240B29-F687-4f45-9708-019B960494DF}">
-                  <a14:hiddenLine xmlns="" xmlns:a14="http://schemas.microsoft.com/office/drawing/2010/main" w="9525">
+                  <a14:hiddenLine xmlns:a14="http://schemas.microsoft.com/office/drawing/2010/main" xmlns="" w="9525">
                     <a:solidFill>
                       <a:srgbClr val="000000"/>
                     </a:solidFill>
@@ -15854,7 +15846,7 @@
               </a:ln>
               <a:extLst>
                 <a:ext uri="{91240B29-F687-4f45-9708-019B960494DF}">
-                  <a14:hiddenLine xmlns="" xmlns:a14="http://schemas.microsoft.com/office/drawing/2010/main" w="9525">
+                  <a14:hiddenLine xmlns:a14="http://schemas.microsoft.com/office/drawing/2010/main" xmlns="" w="9525">
                     <a:solidFill>
                       <a:srgbClr val="000000"/>
                     </a:solidFill>
@@ -15944,7 +15936,7 @@
               </a:ln>
               <a:extLst>
                 <a:ext uri="{91240B29-F687-4f45-9708-019B960494DF}">
-                  <a14:hiddenLine xmlns="" xmlns:a14="http://schemas.microsoft.com/office/drawing/2010/main" w="9525">
+                  <a14:hiddenLine xmlns:a14="http://schemas.microsoft.com/office/drawing/2010/main" xmlns="" w="9525">
                     <a:solidFill>
                       <a:srgbClr val="000000"/>
                     </a:solidFill>
@@ -16006,7 +15998,7 @@
               </a:ln>
               <a:extLst>
                 <a:ext uri="{91240B29-F687-4f45-9708-019B960494DF}">
-                  <a14:hiddenLine xmlns="" xmlns:a14="http://schemas.microsoft.com/office/drawing/2010/main" w="9525">
+                  <a14:hiddenLine xmlns:a14="http://schemas.microsoft.com/office/drawing/2010/main" xmlns="" w="9525">
                     <a:solidFill>
                       <a:srgbClr val="000000"/>
                     </a:solidFill>
@@ -16116,7 +16108,7 @@
               </a:ln>
               <a:extLst>
                 <a:ext uri="{91240B29-F687-4f45-9708-019B960494DF}">
-                  <a14:hiddenLine xmlns="" xmlns:a14="http://schemas.microsoft.com/office/drawing/2010/main" w="9525">
+                  <a14:hiddenLine xmlns:a14="http://schemas.microsoft.com/office/drawing/2010/main" xmlns="" w="9525">
                     <a:solidFill>
                       <a:srgbClr val="000000"/>
                     </a:solidFill>
@@ -16200,7 +16192,7 @@
               </a:ln>
               <a:extLst>
                 <a:ext uri="{91240B29-F687-4f45-9708-019B960494DF}">
-                  <a14:hiddenLine xmlns="" xmlns:a14="http://schemas.microsoft.com/office/drawing/2010/main" w="9525">
+                  <a14:hiddenLine xmlns:a14="http://schemas.microsoft.com/office/drawing/2010/main" xmlns="" w="9525">
                     <a:solidFill>
                       <a:srgbClr val="000000"/>
                     </a:solidFill>
@@ -16262,7 +16254,7 @@
               </a:ln>
               <a:extLst>
                 <a:ext uri="{91240B29-F687-4f45-9708-019B960494DF}">
-                  <a14:hiddenLine xmlns="" xmlns:a14="http://schemas.microsoft.com/office/drawing/2010/main" w="9525">
+                  <a14:hiddenLine xmlns:a14="http://schemas.microsoft.com/office/drawing/2010/main" xmlns="" w="9525">
                     <a:solidFill>
                       <a:srgbClr val="000000"/>
                     </a:solidFill>
@@ -16324,7 +16316,7 @@
               </a:ln>
               <a:extLst>
                 <a:ext uri="{91240B29-F687-4f45-9708-019B960494DF}">
-                  <a14:hiddenLine xmlns="" xmlns:a14="http://schemas.microsoft.com/office/drawing/2010/main" w="9525">
+                  <a14:hiddenLine xmlns:a14="http://schemas.microsoft.com/office/drawing/2010/main" xmlns="" w="9525">
                     <a:solidFill>
                       <a:srgbClr val="000000"/>
                     </a:solidFill>
@@ -16414,7 +16406,7 @@
               </a:ln>
               <a:extLst>
                 <a:ext uri="{91240B29-F687-4f45-9708-019B960494DF}">
-                  <a14:hiddenLine xmlns="" xmlns:a14="http://schemas.microsoft.com/office/drawing/2010/main" w="9525">
+                  <a14:hiddenLine xmlns:a14="http://schemas.microsoft.com/office/drawing/2010/main" xmlns="" w="9525">
                     <a:solidFill>
                       <a:srgbClr val="000000"/>
                     </a:solidFill>
@@ -16448,7 +16440,7 @@
               </a:ln>
               <a:extLst>
                 <a:ext uri="{91240B29-F687-4f45-9708-019B960494DF}">
-                  <a14:hiddenLine xmlns="" xmlns:a14="http://schemas.microsoft.com/office/drawing/2010/main" w="9525">
+                  <a14:hiddenLine xmlns:a14="http://schemas.microsoft.com/office/drawing/2010/main" xmlns="" w="9525">
                     <a:solidFill>
                       <a:srgbClr val="000000"/>
                     </a:solidFill>
@@ -16513,7 +16505,7 @@
               </a:ln>
               <a:extLst>
                 <a:ext uri="{91240B29-F687-4f45-9708-019B960494DF}">
-                  <a14:hiddenLine xmlns="" xmlns:a14="http://schemas.microsoft.com/office/drawing/2010/main" w="9525">
+                  <a14:hiddenLine xmlns:a14="http://schemas.microsoft.com/office/drawing/2010/main" xmlns="" w="9525">
                     <a:solidFill>
                       <a:srgbClr val="000000"/>
                     </a:solidFill>
@@ -16603,7 +16595,7 @@
               </a:ln>
               <a:extLst>
                 <a:ext uri="{91240B29-F687-4f45-9708-019B960494DF}">
-                  <a14:hiddenLine xmlns="" xmlns:a14="http://schemas.microsoft.com/office/drawing/2010/main" w="9525">
+                  <a14:hiddenLine xmlns:a14="http://schemas.microsoft.com/office/drawing/2010/main" xmlns="" w="9525">
                     <a:solidFill>
                       <a:srgbClr val="000000"/>
                     </a:solidFill>
@@ -16665,7 +16657,7 @@
               </a:ln>
               <a:extLst>
                 <a:ext uri="{91240B29-F687-4f45-9708-019B960494DF}">
-                  <a14:hiddenLine xmlns="" xmlns:a14="http://schemas.microsoft.com/office/drawing/2010/main" w="9525">
+                  <a14:hiddenLine xmlns:a14="http://schemas.microsoft.com/office/drawing/2010/main" xmlns="" w="9525">
                     <a:solidFill>
                       <a:srgbClr val="000000"/>
                     </a:solidFill>
@@ -16755,7 +16747,7 @@
               </a:ln>
               <a:extLst>
                 <a:ext uri="{91240B29-F687-4f45-9708-019B960494DF}">
-                  <a14:hiddenLine xmlns="" xmlns:a14="http://schemas.microsoft.com/office/drawing/2010/main" w="9525">
+                  <a14:hiddenLine xmlns:a14="http://schemas.microsoft.com/office/drawing/2010/main" xmlns="" w="9525">
                     <a:solidFill>
                       <a:srgbClr val="000000"/>
                     </a:solidFill>
@@ -16820,7 +16812,7 @@
               </a:ln>
               <a:extLst>
                 <a:ext uri="{91240B29-F687-4f45-9708-019B960494DF}">
-                  <a14:hiddenLine xmlns="" xmlns:a14="http://schemas.microsoft.com/office/drawing/2010/main" w="9525">
+                  <a14:hiddenLine xmlns:a14="http://schemas.microsoft.com/office/drawing/2010/main" xmlns="" w="9525">
                     <a:solidFill>
                       <a:srgbClr val="000000"/>
                     </a:solidFill>
@@ -16882,7 +16874,7 @@
               </a:ln>
               <a:extLst>
                 <a:ext uri="{91240B29-F687-4f45-9708-019B960494DF}">
-                  <a14:hiddenLine xmlns="" xmlns:a14="http://schemas.microsoft.com/office/drawing/2010/main" w="9525">
+                  <a14:hiddenLine xmlns:a14="http://schemas.microsoft.com/office/drawing/2010/main" xmlns="" w="9525">
                     <a:solidFill>
                       <a:srgbClr val="000000"/>
                     </a:solidFill>
@@ -16972,7 +16964,7 @@
               </a:ln>
               <a:extLst>
                 <a:ext uri="{91240B29-F687-4f45-9708-019B960494DF}">
-                  <a14:hiddenLine xmlns="" xmlns:a14="http://schemas.microsoft.com/office/drawing/2010/main" w="9525">
+                  <a14:hiddenLine xmlns:a14="http://schemas.microsoft.com/office/drawing/2010/main" xmlns="" w="9525">
                     <a:solidFill>
                       <a:srgbClr val="000000"/>
                     </a:solidFill>
@@ -17062,7 +17054,7 @@
               </a:ln>
               <a:extLst>
                 <a:ext uri="{91240B29-F687-4f45-9708-019B960494DF}">
-                  <a14:hiddenLine xmlns="" xmlns:a14="http://schemas.microsoft.com/office/drawing/2010/main" w="9525">
+                  <a14:hiddenLine xmlns:a14="http://schemas.microsoft.com/office/drawing/2010/main" xmlns="" w="9525">
                     <a:solidFill>
                       <a:srgbClr val="000000"/>
                     </a:solidFill>
@@ -17127,7 +17119,7 @@
               </a:ln>
               <a:extLst>
                 <a:ext uri="{91240B29-F687-4f45-9708-019B960494DF}">
-                  <a14:hiddenLine xmlns="" xmlns:a14="http://schemas.microsoft.com/office/drawing/2010/main" w="9525">
+                  <a14:hiddenLine xmlns:a14="http://schemas.microsoft.com/office/drawing/2010/main" xmlns="" w="9525">
                     <a:solidFill>
                       <a:srgbClr val="000000"/>
                     </a:solidFill>
@@ -17247,7 +17239,7 @@
               </a:ln>
               <a:extLst>
                 <a:ext uri="{91240B29-F687-4f45-9708-019B960494DF}">
-                  <a14:hiddenLine xmlns="" xmlns:a14="http://schemas.microsoft.com/office/drawing/2010/main" w="9525">
+                  <a14:hiddenLine xmlns:a14="http://schemas.microsoft.com/office/drawing/2010/main" xmlns="" w="9525">
                     <a:solidFill>
                       <a:srgbClr val="000000"/>
                     </a:solidFill>
@@ -17345,7 +17337,7 @@
               </a:ln>
               <a:extLst>
                 <a:ext uri="{91240B29-F687-4f45-9708-019B960494DF}">
-                  <a14:hiddenLine xmlns="" xmlns:a14="http://schemas.microsoft.com/office/drawing/2010/main" w="9525">
+                  <a14:hiddenLine xmlns:a14="http://schemas.microsoft.com/office/drawing/2010/main" xmlns="" w="9525">
                     <a:solidFill>
                       <a:srgbClr val="000000"/>
                     </a:solidFill>
@@ -17460,7 +17452,7 @@
               </a:ln>
               <a:extLst>
                 <a:ext uri="{91240B29-F687-4f45-9708-019B960494DF}">
-                  <a14:hiddenLine xmlns="" xmlns:a14="http://schemas.microsoft.com/office/drawing/2010/main" w="9525">
+                  <a14:hiddenLine xmlns:a14="http://schemas.microsoft.com/office/drawing/2010/main" xmlns="" w="9525">
                     <a:solidFill>
                       <a:srgbClr val="000000"/>
                     </a:solidFill>
@@ -17550,7 +17542,7 @@
               </a:ln>
               <a:extLst>
                 <a:ext uri="{91240B29-F687-4f45-9708-019B960494DF}">
-                  <a14:hiddenLine xmlns="" xmlns:a14="http://schemas.microsoft.com/office/drawing/2010/main" w="9525">
+                  <a14:hiddenLine xmlns:a14="http://schemas.microsoft.com/office/drawing/2010/main" xmlns="" w="9525">
                     <a:solidFill>
                       <a:srgbClr val="000000"/>
                     </a:solidFill>
@@ -17615,7 +17607,7 @@
               </a:ln>
               <a:extLst>
                 <a:ext uri="{91240B29-F687-4f45-9708-019B960494DF}">
-                  <a14:hiddenLine xmlns="" xmlns:a14="http://schemas.microsoft.com/office/drawing/2010/main" w="9525">
+                  <a14:hiddenLine xmlns:a14="http://schemas.microsoft.com/office/drawing/2010/main" xmlns="" w="9525">
                     <a:solidFill>
                       <a:srgbClr val="000000"/>
                     </a:solidFill>
@@ -17705,7 +17697,7 @@
               </a:ln>
               <a:extLst>
                 <a:ext uri="{91240B29-F687-4f45-9708-019B960494DF}">
-                  <a14:hiddenLine xmlns="" xmlns:a14="http://schemas.microsoft.com/office/drawing/2010/main" w="9525">
+                  <a14:hiddenLine xmlns:a14="http://schemas.microsoft.com/office/drawing/2010/main" xmlns="" w="9525">
                     <a:solidFill>
                       <a:srgbClr val="000000"/>
                     </a:solidFill>
@@ -17773,7 +17765,7 @@
               </a:ln>
               <a:extLst>
                 <a:ext uri="{91240B29-F687-4f45-9708-019B960494DF}">
-                  <a14:hiddenLine xmlns="" xmlns:a14="http://schemas.microsoft.com/office/drawing/2010/main" w="9525">
+                  <a14:hiddenLine xmlns:a14="http://schemas.microsoft.com/office/drawing/2010/main" xmlns="" w="9525">
                     <a:solidFill>
                       <a:srgbClr val="000000"/>
                     </a:solidFill>
@@ -17863,7 +17855,7 @@
               </a:ln>
               <a:extLst>
                 <a:ext uri="{91240B29-F687-4f45-9708-019B960494DF}">
-                  <a14:hiddenLine xmlns="" xmlns:a14="http://schemas.microsoft.com/office/drawing/2010/main" w="9525">
+                  <a14:hiddenLine xmlns:a14="http://schemas.microsoft.com/office/drawing/2010/main" xmlns="" w="9525">
                     <a:solidFill>
                       <a:srgbClr val="000000"/>
                     </a:solidFill>
@@ -17931,7 +17923,7 @@
               </a:ln>
               <a:extLst>
                 <a:ext uri="{91240B29-F687-4f45-9708-019B960494DF}">
-                  <a14:hiddenLine xmlns="" xmlns:a14="http://schemas.microsoft.com/office/drawing/2010/main" w="9525">
+                  <a14:hiddenLine xmlns:a14="http://schemas.microsoft.com/office/drawing/2010/main" xmlns="" w="9525">
                     <a:solidFill>
                       <a:srgbClr val="000000"/>
                     </a:solidFill>
@@ -18021,7 +18013,7 @@
               </a:ln>
               <a:extLst>
                 <a:ext uri="{91240B29-F687-4f45-9708-019B960494DF}">
-                  <a14:hiddenLine xmlns="" xmlns:a14="http://schemas.microsoft.com/office/drawing/2010/main" w="9525">
+                  <a14:hiddenLine xmlns:a14="http://schemas.microsoft.com/office/drawing/2010/main" xmlns="" w="9525">
                     <a:solidFill>
                       <a:srgbClr val="000000"/>
                     </a:solidFill>
@@ -18055,7 +18047,7 @@
               </a:ln>
               <a:extLst>
                 <a:ext uri="{91240B29-F687-4f45-9708-019B960494DF}">
-                  <a14:hiddenLine xmlns="" xmlns:a14="http://schemas.microsoft.com/office/drawing/2010/main" w="9525">
+                  <a14:hiddenLine xmlns:a14="http://schemas.microsoft.com/office/drawing/2010/main" xmlns="" w="9525">
                     <a:solidFill>
                       <a:srgbClr val="000000"/>
                     </a:solidFill>
@@ -33889,6 +33881,16 @@
             </a:r>
           </a:p>
           <a:p>
+            <a:r>
+              <a:rPr lang="en-US" dirty="0"/>
+              <a:t>Note: most of really interesting things almost can not be found dynamically</a:t>
+            </a:r>
+          </a:p>
+          <a:p>
+            <a:pPr lvl="1"/>
+            <a:endParaRPr lang="en-US" dirty="0"/>
+          </a:p>
+          <a:p>
             <a:endParaRPr lang="en-US" dirty="0"/>
           </a:p>
         </p:txBody>
@@ -34057,6 +34059,37 @@
                                   </p:childTnLst>
                                 </p:cTn>
                               </p:par>
+                              <p:par>
+                                <p:cTn id="13" presetID="1" presetClass="entr" presetSubtype="0" fill="hold" nodeType="withEffect">
+                                  <p:stCondLst>
+                                    <p:cond delay="0"/>
+                                  </p:stCondLst>
+                                  <p:childTnLst>
+                                    <p:set>
+                                      <p:cBhvr>
+                                        <p:cTn id="14" dur="1" fill="hold">
+                                          <p:stCondLst>
+                                            <p:cond delay="0"/>
+                                          </p:stCondLst>
+                                        </p:cTn>
+                                        <p:tgtEl>
+                                          <p:spTgt spid="3">
+                                            <p:txEl>
+                                              <p:pRg st="3" end="3"/>
+                                            </p:txEl>
+                                          </p:spTgt>
+                                        </p:tgtEl>
+                                        <p:attrNameLst>
+                                          <p:attrName>style.visibility</p:attrName>
+                                        </p:attrNameLst>
+                                      </p:cBhvr>
+                                      <p:to>
+                                        <p:strVal val="visible"/>
+                                      </p:to>
+                                    </p:set>
+                                  </p:childTnLst>
+                                </p:cTn>
+                              </p:par>
                             </p:childTnLst>
                           </p:cTn>
                         </p:par>
@@ -34468,8 +34501,13 @@
           <a:p>
             <a:r>
               <a:rPr lang="en-US" dirty="0"/>
-              <a:t>Future work</a:t>
-            </a:r>
+              <a:t>Future work (</a:t>
+            </a:r>
+            <a:r>
+              <a:rPr lang="en-US"/>
+              <a:t>order doesn’t matter)</a:t>
+            </a:r>
+            <a:endParaRPr lang="en-US" dirty="0"/>
           </a:p>
         </p:txBody>
       </p:sp>
@@ -34496,7 +34534,7 @@
           <a:p>
             <a:r>
               <a:rPr lang="en-US" dirty="0"/>
-              <a:t>Porting it to Linux</a:t>
+              <a:t>Porting DVSE to Linux</a:t>
             </a:r>
           </a:p>
           <a:p>
@@ -34509,6 +34547,12 @@
             <a:r>
               <a:rPr lang="en-US" dirty="0"/>
               <a:t>Automatic deduction of the enclave ECALLs/OCALLs from binary analysis</a:t>
+            </a:r>
+          </a:p>
+          <a:p>
+            <a:r>
+              <a:rPr lang="en-US" dirty="0"/>
+              <a:t>Abstract interpretation and/or symbolic execution for fuzzing (again, enclave is small)</a:t>
             </a:r>
           </a:p>
         </p:txBody>

</xml_diff>

<commit_message>
Presentation and licensing, part 1
</commit_message>
<xml_diff>
--- a/docs/SGX Enclave Programming - Common Mistakes.pptx
+++ b/docs/SGX Enclave Programming - Common Mistakes.pptx
@@ -5,7 +5,7 @@
     <p:sldMasterId id="2147483696" r:id="rId1"/>
   </p:sldMasterIdLst>
   <p:notesMasterIdLst>
-    <p:notesMasterId r:id="rId54"/>
+    <p:notesMasterId r:id="rId55"/>
   </p:notesMasterIdLst>
   <p:sldIdLst>
     <p:sldId id="256" r:id="rId2"/>
@@ -55,11 +55,12 @@
     <p:sldId id="284" r:id="rId46"/>
     <p:sldId id="261" r:id="rId47"/>
     <p:sldId id="282" r:id="rId48"/>
-    <p:sldId id="307" r:id="rId49"/>
-    <p:sldId id="291" r:id="rId50"/>
-    <p:sldId id="315" r:id="rId51"/>
-    <p:sldId id="269" r:id="rId52"/>
-    <p:sldId id="265" r:id="rId53"/>
+    <p:sldId id="317" r:id="rId49"/>
+    <p:sldId id="307" r:id="rId50"/>
+    <p:sldId id="291" r:id="rId51"/>
+    <p:sldId id="315" r:id="rId52"/>
+    <p:sldId id="269" r:id="rId53"/>
+    <p:sldId id="265" r:id="rId54"/>
   </p:sldIdLst>
   <p:sldSz cx="12192000" cy="6858000"/>
   <p:notesSz cx="6858000" cy="9144000"/>
@@ -3921,7 +3922,7 @@
           <a:p>
             <a:pPr lvl="1"/>
             <a:r>
-              <a:rPr lang="en-US"/>
+              <a:rPr lang="en-US" dirty="0"/>
               <a:t>SSL with self-signed certificates (sha1 of the certificate is checked inside the enclave)</a:t>
             </a:r>
           </a:p>
@@ -4012,7 +4013,7 @@
           <a:p>
             <a:r>
               <a:rPr lang="en-US" dirty="0"/>
-              <a:t>So here you can see a general usage instructions: install components, compile the code including the enclave in pre-release mode, add media to the media folder as wrote in the readme file, run client on the local machine.</a:t>
+              <a:t>So here you can see a general usage instructions: install components, compile the code including the enclave, run server and client on the local machine as wrote in readme.md. </a:t>
             </a:r>
           </a:p>
           <a:p>
@@ -4124,7 +4125,10 @@
             </a:r>
           </a:p>
           <a:p>
-            <a:endParaRPr lang="en-US" dirty="0"/>
+            <a:r>
+              <a:rPr lang="en-US" dirty="0"/>
+              <a:t>We speaking about:</a:t>
+            </a:r>
           </a:p>
           <a:p>
             <a:r>
@@ -4369,13 +4373,13 @@
             </a:r>
             <a:r>
               <a:rPr lang="en-US" dirty="0"/>
-              <a:t> and then we’ll use it only for sealing”</a:t>
-            </a:r>
-          </a:p>
-          <a:p>
-            <a:r>
-              <a:rPr lang="en-US" dirty="0"/>
-              <a:t>After taking this unfortunate decision the responsibility on this is your alone.</a:t>
+              <a:t> and then we’ll use it only for random number seeding”</a:t>
+            </a:r>
+          </a:p>
+          <a:p>
+            <a:r>
+              <a:rPr lang="en-US" dirty="0"/>
+              <a:t>After taking this unfortunate decision the responsibility on this is yours alone.</a:t>
             </a:r>
           </a:p>
           <a:p>
@@ -4519,17 +4523,6 @@
             </a:r>
           </a:p>
           <a:p>
-            <a:pPr lvl="1"/>
-            <a:r>
-              <a:rPr lang="en-US" dirty="0" err="1"/>
-              <a:t>Usercheck</a:t>
-            </a:r>
-            <a:r>
-              <a:rPr lang="en-US" dirty="0"/>
-              <a:t> modifiers in then EDL</a:t>
-            </a:r>
-          </a:p>
-          <a:p>
             <a:r>
               <a:rPr lang="en-US" dirty="0"/>
               <a:t>Well known vulnerabilities such as not checked inputs or buffer overflows(enclave will not make your code secure if it has mistakes inside )</a:t>
@@ -4714,7 +4707,7 @@
             <a:pPr lvl="1"/>
             <a:r>
               <a:rPr lang="en-US" dirty="0"/>
-              <a:t>I’d seen some of custom implementations of this idea, none of them made sense.</a:t>
+              <a:t>I’d seen some of custom implementations of this idea, none of them made sense, and all of them ended badly.</a:t>
             </a:r>
           </a:p>
           <a:p>
@@ -5041,12 +5034,152 @@
           <a:p>
             <a:r>
               <a:rPr lang="en-US" dirty="0"/>
-              <a:t>Intended vulnerability – will be under #ifdef – not checked index of the</a:t>
+              <a:t>Intended vulnerability – not checked index of the</a:t>
             </a:r>
             <a:r>
               <a:rPr lang="en-US" baseline="0" dirty="0"/>
-              <a:t> read buffer</a:t>
-            </a:r>
+              <a:t> read buffer which leads to the data exfiltration (which was stored in the enclave for all the enclave life time)</a:t>
+            </a:r>
+          </a:p>
+          <a:p>
+            <a:r>
+              <a:rPr lang="en-US" baseline="0" dirty="0"/>
+              <a:t>This vulnerability is easy to find manually, and I’ll show it to you.</a:t>
+            </a:r>
+          </a:p>
+          <a:p>
+            <a:r>
+              <a:rPr lang="en-US" baseline="0" dirty="0"/>
+              <a:t>1 – Run server, show config files(</a:t>
+            </a:r>
+            <a:r>
+              <a:rPr lang="en-US" baseline="0" dirty="0" err="1"/>
+              <a:t>epg</a:t>
+            </a:r>
+            <a:r>
+              <a:rPr lang="en-US" baseline="0" dirty="0"/>
+              <a:t> and coupons)</a:t>
+            </a:r>
+          </a:p>
+          <a:p>
+            <a:r>
+              <a:rPr lang="en-US" baseline="0" dirty="0"/>
+              <a:t>2 – Run client</a:t>
+            </a:r>
+          </a:p>
+          <a:p>
+            <a:r>
+              <a:rPr lang="en-US" baseline="0" dirty="0"/>
+              <a:t>3 – Mention coupons. Add library folder and </a:t>
+            </a:r>
+            <a:r>
+              <a:rPr lang="en-US" baseline="0" dirty="0" err="1"/>
+              <a:t>init</a:t>
+            </a:r>
+            <a:r>
+              <a:rPr lang="en-US" baseline="0" dirty="0"/>
+              <a:t> user</a:t>
+            </a:r>
+          </a:p>
+          <a:p>
+            <a:r>
+              <a:rPr lang="en-US" baseline="0" dirty="0"/>
+              <a:t>4 – Show the EPG</a:t>
+            </a:r>
+          </a:p>
+          <a:p>
+            <a:r>
+              <a:rPr lang="en-US" baseline="0" dirty="0"/>
+              <a:t>5 – Run the free cartoon and stop</a:t>
+            </a:r>
+          </a:p>
+          <a:p>
+            <a:endParaRPr lang="en-US" baseline="0" dirty="0"/>
+          </a:p>
+          <a:p>
+            <a:r>
+              <a:rPr lang="en-US" baseline="0" dirty="0"/>
+              <a:t>6 – Show where EPG is got in Visual Studio (app) and IDA (enclave)</a:t>
+            </a:r>
+          </a:p>
+          <a:p>
+            <a:r>
+              <a:rPr lang="en-US" baseline="0" dirty="0"/>
+              <a:t>7 – Read through the code</a:t>
+            </a:r>
+          </a:p>
+          <a:p>
+            <a:r>
+              <a:rPr lang="en-US" baseline="0" dirty="0"/>
+              <a:t>8 – Show the </a:t>
+            </a:r>
+            <a:r>
+              <a:rPr lang="en-US" baseline="0" dirty="0" err="1"/>
+              <a:t>memcpy</a:t>
+            </a:r>
+            <a:r>
+              <a:rPr lang="en-US" baseline="0" dirty="0"/>
+              <a:t> </a:t>
+            </a:r>
+          </a:p>
+          <a:p>
+            <a:r>
+              <a:rPr lang="en-US" baseline="0" dirty="0"/>
+              <a:t>9 – Show the enclave test</a:t>
+            </a:r>
+          </a:p>
+          <a:p>
+            <a:r>
+              <a:rPr lang="en-US" baseline="0" dirty="0"/>
+              <a:t>10  - Run it</a:t>
+            </a:r>
+          </a:p>
+          <a:p>
+            <a:r>
+              <a:rPr lang="en-US" baseline="0" dirty="0"/>
+              <a:t>11 – Show found coupons</a:t>
+            </a:r>
+          </a:p>
+          <a:p>
+            <a:r>
+              <a:rPr lang="en-US" baseline="0" dirty="0"/>
+              <a:t>12 – Show certificate details</a:t>
+            </a:r>
+          </a:p>
+          <a:p>
+            <a:endParaRPr lang="en-US" baseline="0" dirty="0"/>
+          </a:p>
+          <a:p>
+            <a:r>
+              <a:rPr lang="en-US" baseline="0" dirty="0"/>
+              <a:t>Note: revealing this vulnerability is easy, but it illustrates the following WKMs:</a:t>
+            </a:r>
+          </a:p>
+          <a:p>
+            <a:endParaRPr lang="en-US" baseline="0" dirty="0"/>
+          </a:p>
+          <a:p>
+            <a:r>
+              <a:rPr lang="en-US" baseline="0" dirty="0"/>
+              <a:t>1 – leaving secrets unattended and thus very bad design (secrets should be cleared immediately after usage, just for defense in depth – and enclave didn’t help us in anything)</a:t>
+            </a:r>
+          </a:p>
+          <a:p>
+            <a:r>
+              <a:rPr lang="en-US" baseline="0" dirty="0"/>
+              <a:t>2 – Standard vulnerabilities (and it can be found by fuzzing)</a:t>
+            </a:r>
+          </a:p>
+          <a:p>
+            <a:endParaRPr lang="en-US" baseline="0" dirty="0"/>
+          </a:p>
+          <a:p>
+            <a:endParaRPr lang="en-US" baseline="0" dirty="0"/>
+          </a:p>
+          <a:p>
+            <a:endParaRPr lang="en-US" baseline="0" dirty="0"/>
+          </a:p>
+          <a:p>
             <a:endParaRPr lang="en-US" dirty="0"/>
           </a:p>
         </p:txBody>
@@ -5525,7 +5658,7 @@
           <a:p>
             <a:fld id="{CD8728AD-2EC3-CF45-89B7-24476471A0CA}" type="slidenum">
               <a:rPr lang="ru-RU" smtClean="0"/>
-              <a:t>49</a:t>
+              <a:t>50</a:t>
             </a:fld>
             <a:endParaRPr lang="ru-RU"/>
           </a:p>
@@ -5629,7 +5762,7 @@
           <a:p>
             <a:fld id="{CD8728AD-2EC3-CF45-89B7-24476471A0CA}" type="slidenum">
               <a:rPr lang="ru-RU" smtClean="0"/>
-              <a:t>51</a:t>
+              <a:t>52</a:t>
             </a:fld>
             <a:endParaRPr lang="ru-RU"/>
           </a:p>
@@ -5723,7 +5856,7 @@
           <a:p>
             <a:fld id="{CD8728AD-2EC3-CF45-89B7-24476471A0CA}" type="slidenum">
               <a:rPr lang="ru-RU" smtClean="0"/>
-              <a:t>52</a:t>
+              <a:t>53</a:t>
             </a:fld>
             <a:endParaRPr lang="ru-RU"/>
           </a:p>
@@ -32829,17 +32962,6 @@
             </a:r>
           </a:p>
           <a:p>
-            <a:pPr lvl="1"/>
-            <a:r>
-              <a:rPr lang="en-US" dirty="0" err="1"/>
-              <a:t>Usercheck</a:t>
-            </a:r>
-            <a:r>
-              <a:rPr lang="en-US" dirty="0"/>
-              <a:t> modifiers in then EDL</a:t>
-            </a:r>
-          </a:p>
-          <a:p>
             <a:r>
               <a:rPr lang="en-US" dirty="0"/>
               <a:t>Well known vulnerabilities such as not checked inputs or buffer overflows(enclave will not make your code secure if it has mistakes inside )</a:t>
@@ -32975,15 +33097,33 @@
                                   </p:childTnLst>
                                 </p:cTn>
                               </p:par>
+                            </p:childTnLst>
+                          </p:cTn>
+                        </p:par>
+                      </p:childTnLst>
+                    </p:cTn>
+                  </p:par>
+                  <p:par>
+                    <p:cTn id="9" fill="hold">
+                      <p:stCondLst>
+                        <p:cond delay="indefinite"/>
+                      </p:stCondLst>
+                      <p:childTnLst>
+                        <p:par>
+                          <p:cTn id="10" fill="hold">
+                            <p:stCondLst>
+                              <p:cond delay="0"/>
+                            </p:stCondLst>
+                            <p:childTnLst>
                               <p:par>
-                                <p:cTn id="9" presetID="1" presetClass="entr" presetSubtype="0" fill="hold" nodeType="withEffect">
+                                <p:cTn id="11" presetID="1" presetClass="entr" presetSubtype="0" fill="hold" nodeType="clickEffect">
                                   <p:stCondLst>
                                     <p:cond delay="0"/>
                                   </p:stCondLst>
                                   <p:childTnLst>
                                     <p:set>
                                       <p:cBhvr>
-                                        <p:cTn id="10" dur="1" fill="hold">
+                                        <p:cTn id="12" dur="1" fill="hold">
                                           <p:stCondLst>
                                             <p:cond delay="0"/>
                                           </p:stCondLst>
@@ -33006,26 +33146,8 @@
                                   </p:childTnLst>
                                 </p:cTn>
                               </p:par>
-                            </p:childTnLst>
-                          </p:cTn>
-                        </p:par>
-                      </p:childTnLst>
-                    </p:cTn>
-                  </p:par>
-                  <p:par>
-                    <p:cTn id="11" fill="hold">
-                      <p:stCondLst>
-                        <p:cond delay="indefinite"/>
-                      </p:stCondLst>
-                      <p:childTnLst>
-                        <p:par>
-                          <p:cTn id="12" fill="hold">
-                            <p:stCondLst>
-                              <p:cond delay="0"/>
-                            </p:stCondLst>
-                            <p:childTnLst>
                               <p:par>
-                                <p:cTn id="13" presetID="1" presetClass="entr" presetSubtype="0" fill="hold" nodeType="clickEffect">
+                                <p:cTn id="13" presetID="1" presetClass="entr" presetSubtype="0" fill="hold" nodeType="withEffect">
                                   <p:stCondLst>
                                     <p:cond delay="0"/>
                                   </p:stCondLst>
@@ -33055,15 +33177,33 @@
                                   </p:childTnLst>
                                 </p:cTn>
                               </p:par>
+                            </p:childTnLst>
+                          </p:cTn>
+                        </p:par>
+                      </p:childTnLst>
+                    </p:cTn>
+                  </p:par>
+                  <p:par>
+                    <p:cTn id="15" fill="hold">
+                      <p:stCondLst>
+                        <p:cond delay="indefinite"/>
+                      </p:stCondLst>
+                      <p:childTnLst>
+                        <p:par>
+                          <p:cTn id="16" fill="hold">
+                            <p:stCondLst>
+                              <p:cond delay="0"/>
+                            </p:stCondLst>
+                            <p:childTnLst>
                               <p:par>
-                                <p:cTn id="15" presetID="1" presetClass="entr" presetSubtype="0" fill="hold" nodeType="withEffect">
+                                <p:cTn id="17" presetID="1" presetClass="entr" presetSubtype="0" fill="hold" nodeType="clickEffect">
                                   <p:stCondLst>
                                     <p:cond delay="0"/>
                                   </p:stCondLst>
                                   <p:childTnLst>
                                     <p:set>
                                       <p:cBhvr>
-                                        <p:cTn id="16" dur="1" fill="hold">
+                                        <p:cTn id="18" dur="1" fill="hold">
                                           <p:stCondLst>
                                             <p:cond delay="0"/>
                                           </p:stCondLst>
@@ -33072,55 +33212,6 @@
                                           <p:spTgt spid="3">
                                             <p:txEl>
                                               <p:pRg st="4" end="4"/>
-                                            </p:txEl>
-                                          </p:spTgt>
-                                        </p:tgtEl>
-                                        <p:attrNameLst>
-                                          <p:attrName>style.visibility</p:attrName>
-                                        </p:attrNameLst>
-                                      </p:cBhvr>
-                                      <p:to>
-                                        <p:strVal val="visible"/>
-                                      </p:to>
-                                    </p:set>
-                                  </p:childTnLst>
-                                </p:cTn>
-                              </p:par>
-                            </p:childTnLst>
-                          </p:cTn>
-                        </p:par>
-                      </p:childTnLst>
-                    </p:cTn>
-                  </p:par>
-                  <p:par>
-                    <p:cTn id="17" fill="hold">
-                      <p:stCondLst>
-                        <p:cond delay="indefinite"/>
-                      </p:stCondLst>
-                      <p:childTnLst>
-                        <p:par>
-                          <p:cTn id="18" fill="hold">
-                            <p:stCondLst>
-                              <p:cond delay="0"/>
-                            </p:stCondLst>
-                            <p:childTnLst>
-                              <p:par>
-                                <p:cTn id="19" presetID="1" presetClass="entr" presetSubtype="0" fill="hold" nodeType="clickEffect">
-                                  <p:stCondLst>
-                                    <p:cond delay="0"/>
-                                  </p:stCondLst>
-                                  <p:childTnLst>
-                                    <p:set>
-                                      <p:cBhvr>
-                                        <p:cTn id="20" dur="1" fill="hold">
-                                          <p:stCondLst>
-                                            <p:cond delay="0"/>
-                                          </p:stCondLst>
-                                        </p:cTn>
-                                        <p:tgtEl>
-                                          <p:spTgt spid="3">
-                                            <p:txEl>
-                                              <p:pRg st="5" end="5"/>
                                             </p:txEl>
                                           </p:spTgt>
                                         </p:tgtEl>
@@ -35107,7 +35198,13 @@
       </p:grpSpPr>
       <p:sp>
         <p:nvSpPr>
-          <p:cNvPr id="2" name="Title 1"/>
+          <p:cNvPr id="2" name="כותרת 1">
+            <a:extLst>
+              <a:ext uri="{FF2B5EF4-FFF2-40B4-BE49-F238E27FC236}">
+                <a16:creationId xmlns:a16="http://schemas.microsoft.com/office/drawing/2014/main" id="{E85A3F79-B5FD-453E-87B1-16E7A0A22C98}"/>
+              </a:ext>
+            </a:extLst>
+          </p:cNvPr>
           <p:cNvSpPr>
             <a:spLocks noGrp="1"/>
           </p:cNvSpPr>
@@ -35122,14 +35219,27 @@
           <a:p>
             <a:r>
               <a:rPr lang="en-US" dirty="0"/>
-              <a:t>backup</a:t>
-            </a:r>
-          </a:p>
-        </p:txBody>
-      </p:sp>
-      <p:sp>
-        <p:nvSpPr>
-          <p:cNvPr id="3" name="Content Placeholder 2"/>
+              <a:t>Thanks for watching </a:t>
+            </a:r>
+            <a:r>
+              <a:rPr lang="en-US" dirty="0">
+                <a:sym typeface="Wingdings" panose="05000000000000000000" pitchFamily="2" charset="2"/>
+              </a:rPr>
+              <a:t></a:t>
+            </a:r>
+            <a:endParaRPr lang="en-US" dirty="0"/>
+          </a:p>
+        </p:txBody>
+      </p:sp>
+      <p:sp>
+        <p:nvSpPr>
+          <p:cNvPr id="3" name="מציין מיקום תוכן 2">
+            <a:extLst>
+              <a:ext uri="{FF2B5EF4-FFF2-40B4-BE49-F238E27FC236}">
+                <a16:creationId xmlns:a16="http://schemas.microsoft.com/office/drawing/2014/main" id="{E296E813-5662-455A-8B30-6B4B8556C8BB}"/>
+              </a:ext>
+            </a:extLst>
+          </p:cNvPr>
           <p:cNvSpPr>
             <a:spLocks noGrp="1"/>
           </p:cNvSpPr>
@@ -35142,13 +35252,61 @@
           <a:bodyPr/>
           <a:lstStyle/>
           <a:p>
-            <a:endParaRPr lang="en-US"/>
-          </a:p>
-        </p:txBody>
-      </p:sp>
-      <p:sp>
-        <p:nvSpPr>
-          <p:cNvPr id="4" name="מציין מיקום של מספר שקופית 3"/>
+            <a:r>
+              <a:rPr lang="en-US" dirty="0"/>
+              <a:t>Feel free to contact me </a:t>
+            </a:r>
+          </a:p>
+          <a:p>
+            <a:pPr lvl="1"/>
+            <a:r>
+              <a:rPr lang="en-US" dirty="0">
+                <a:hlinkClick r:id="rId2"/>
+              </a:rPr>
+              <a:t>wireshrink@gmail.com</a:t>
+            </a:r>
+            <a:endParaRPr lang="en-US" dirty="0">
+              <a:hlinkClick r:id="rId3"/>
+            </a:endParaRPr>
+          </a:p>
+          <a:p>
+            <a:pPr lvl="1"/>
+            <a:r>
+              <a:rPr lang="en-US" dirty="0">
+                <a:hlinkClick r:id="rId3"/>
+              </a:rPr>
+              <a:t>@</a:t>
+            </a:r>
+            <a:r>
+              <a:rPr lang="en-US" dirty="0" err="1">
+                <a:hlinkClick r:id="rId3"/>
+              </a:rPr>
+              <a:t>wireshrink</a:t>
+            </a:r>
+            <a:r>
+              <a:rPr lang="en-US" dirty="0"/>
+              <a:t> (I’m not writing there, but you </a:t>
+            </a:r>
+            <a:r>
+              <a:rPr lang="en-US"/>
+              <a:t>can send PM</a:t>
+            </a:r>
+            <a:r>
+              <a:rPr lang="en-US" dirty="0"/>
+              <a:t>)</a:t>
+            </a:r>
+          </a:p>
+        </p:txBody>
+      </p:sp>
+      <p:sp>
+        <p:nvSpPr>
+          <p:cNvPr id="4" name="מציין מיקום של מספר שקופית 3">
+            <a:extLst>
+              <a:ext uri="{FF2B5EF4-FFF2-40B4-BE49-F238E27FC236}">
+                <a16:creationId xmlns:a16="http://schemas.microsoft.com/office/drawing/2014/main" id="{E56584D9-68B2-425F-9636-C9626FB3477A}"/>
+              </a:ext>
+            </a:extLst>
+          </p:cNvPr>
           <p:cNvSpPr>
             <a:spLocks noGrp="1"/>
           </p:cNvSpPr>
@@ -35172,7 +35330,7 @@
     </p:spTree>
     <p:extLst>
       <p:ext uri="{BB962C8B-B14F-4D97-AF65-F5344CB8AC3E}">
-        <p14:creationId xmlns:p14="http://schemas.microsoft.com/office/powerpoint/2010/main" val="811180702"/>
+        <p14:creationId xmlns:p14="http://schemas.microsoft.com/office/powerpoint/2010/main" val="1697630835"/>
       </p:ext>
     </p:extLst>
   </p:cSld>
@@ -35201,7 +35359,7 @@
       </p:grpSpPr>
       <p:sp>
         <p:nvSpPr>
-          <p:cNvPr id="2" name="Заголовок 1"/>
+          <p:cNvPr id="2" name="Title 1"/>
           <p:cNvSpPr>
             <a:spLocks noGrp="1"/>
           </p:cNvSpPr>
@@ -35216,96 +35374,33 @@
           <a:p>
             <a:r>
               <a:rPr lang="en-US" dirty="0"/>
-              <a:t>Note on SGX sealing key derivation material</a:t>
-            </a:r>
-            <a:endParaRPr lang="ru-RU" dirty="0"/>
-          </a:p>
-        </p:txBody>
-      </p:sp>
-      <p:pic>
-        <p:nvPicPr>
-          <p:cNvPr id="5" name="Рисунок 4"/>
-          <p:cNvPicPr>
-            <a:picLocks noChangeAspect="1"/>
-          </p:cNvPicPr>
-          <p:nvPr/>
-        </p:nvPicPr>
-        <p:blipFill rotWithShape="1">
-          <a:blip r:embed="rId3"/>
-          <a:srcRect l="20086" t="38769" r="24273" b="24513"/>
-          <a:stretch/>
-        </p:blipFill>
-        <p:spPr>
-          <a:xfrm>
-            <a:off x="684212" y="2128104"/>
-            <a:ext cx="8534400" cy="3615267"/>
-          </a:xfrm>
-          <a:prstGeom prst="rect">
-            <a:avLst/>
-          </a:prstGeom>
-        </p:spPr>
-      </p:pic>
-      <p:sp>
-        <p:nvSpPr>
-          <p:cNvPr id="6" name="TextBox 5"/>
-          <p:cNvSpPr txBox="1"/>
-          <p:nvPr/>
-        </p:nvSpPr>
-        <p:spPr>
-          <a:xfrm>
-            <a:off x="9556749" y="2249487"/>
-            <a:ext cx="2489982" cy="2585323"/>
-          </a:xfrm>
-          <a:prstGeom prst="rect">
-            <a:avLst/>
-          </a:prstGeom>
-          <a:noFill/>
-        </p:spPr>
-        <p:txBody>
-          <a:bodyPr wrap="square" rtlCol="0">
-            <a:spAutoFit/>
-          </a:bodyPr>
-          <a:lstStyle/>
-          <a:p>
-            <a:pPr marL="285750" indent="-285750">
-              <a:buFont typeface="Arial" charset="0"/>
-              <a:buChar char="•"/>
-            </a:pPr>
-            <a:r>
-              <a:rPr lang="en-US" dirty="0"/>
-              <a:t>+ Fuses, of course (CR_SEAL_FUSES in terms of SDM, the screenshot is from there)</a:t>
-            </a:r>
-          </a:p>
-          <a:p>
-            <a:pPr marL="285750" indent="-285750">
-              <a:buFont typeface="Arial" charset="0"/>
-              <a:buChar char="•"/>
-            </a:pPr>
-            <a:r>
-              <a:rPr lang="en-US" dirty="0"/>
-              <a:t>Note Sealing key </a:t>
-            </a:r>
-            <a:r>
-              <a:rPr lang="mr-IN" dirty="0"/>
-              <a:t>–</a:t>
-            </a:r>
-            <a:r>
-              <a:rPr lang="en-US" dirty="0"/>
-              <a:t> it is enclave or signer specific</a:t>
-            </a:r>
-          </a:p>
-          <a:p>
-            <a:pPr marL="285750" indent="-285750">
-              <a:buFont typeface="Arial" charset="0"/>
-              <a:buChar char="•"/>
-            </a:pPr>
-            <a:endParaRPr lang="ru-RU" dirty="0"/>
-          </a:p>
-        </p:txBody>
-      </p:sp>
-      <p:sp>
-        <p:nvSpPr>
-          <p:cNvPr id="3" name="מציין מיקום של מספר שקופית 2"/>
+              <a:t>backup</a:t>
+            </a:r>
+          </a:p>
+        </p:txBody>
+      </p:sp>
+      <p:sp>
+        <p:nvSpPr>
+          <p:cNvPr id="3" name="Content Placeholder 2"/>
+          <p:cNvSpPr>
+            <a:spLocks noGrp="1"/>
+          </p:cNvSpPr>
+          <p:nvPr>
+            <p:ph idx="1"/>
+          </p:nvPr>
+        </p:nvSpPr>
+        <p:spPr/>
+        <p:txBody>
+          <a:bodyPr/>
+          <a:lstStyle/>
+          <a:p>
+            <a:endParaRPr lang="en-US"/>
+          </a:p>
+        </p:txBody>
+      </p:sp>
+      <p:sp>
+        <p:nvSpPr>
+          <p:cNvPr id="4" name="מציין מיקום של מספר שקופית 3"/>
           <p:cNvSpPr>
             <a:spLocks noGrp="1"/>
           </p:cNvSpPr>
@@ -35329,7 +35424,7 @@
     </p:spTree>
     <p:extLst>
       <p:ext uri="{BB962C8B-B14F-4D97-AF65-F5344CB8AC3E}">
-        <p14:creationId xmlns:p14="http://schemas.microsoft.com/office/powerpoint/2010/main" val="1130062494"/>
+        <p14:creationId xmlns:p14="http://schemas.microsoft.com/office/powerpoint/2010/main" val="811180702"/>
       </p:ext>
     </p:extLst>
   </p:cSld>
@@ -35461,7 +35556,7 @@
       </p:grpSpPr>
       <p:sp>
         <p:nvSpPr>
-          <p:cNvPr id="2" name="כותרת 1"/>
+          <p:cNvPr id="2" name="Заголовок 1"/>
           <p:cNvSpPr>
             <a:spLocks noGrp="1"/>
           </p:cNvSpPr>
@@ -35476,127 +35571,96 @@
           <a:p>
             <a:r>
               <a:rPr lang="en-US" dirty="0"/>
-              <a:t>Why can’t I sign it myself</a:t>
-            </a:r>
-          </a:p>
-        </p:txBody>
-      </p:sp>
-      <p:sp>
-        <p:nvSpPr>
-          <p:cNvPr id="3" name="מציין מיקום תוכן 2"/>
-          <p:cNvSpPr>
-            <a:spLocks noGrp="1"/>
-          </p:cNvSpPr>
-          <p:nvPr>
-            <p:ph idx="1"/>
-          </p:nvPr>
-        </p:nvSpPr>
-        <p:spPr/>
-        <p:txBody>
-          <a:bodyPr>
-            <a:normAutofit fontScale="55000" lnSpcReduction="20000"/>
+              <a:t>Note on SGX sealing key derivation material</a:t>
+            </a:r>
+            <a:endParaRPr lang="ru-RU" dirty="0"/>
+          </a:p>
+        </p:txBody>
+      </p:sp>
+      <p:pic>
+        <p:nvPicPr>
+          <p:cNvPr id="5" name="Рисунок 4"/>
+          <p:cNvPicPr>
+            <a:picLocks noChangeAspect="1"/>
+          </p:cNvPicPr>
+          <p:nvPr/>
+        </p:nvPicPr>
+        <p:blipFill rotWithShape="1">
+          <a:blip r:embed="rId3"/>
+          <a:srcRect l="20086" t="38769" r="24273" b="24513"/>
+          <a:stretch/>
+        </p:blipFill>
+        <p:spPr>
+          <a:xfrm>
+            <a:off x="684212" y="2128104"/>
+            <a:ext cx="8534400" cy="3615267"/>
+          </a:xfrm>
+          <a:prstGeom prst="rect">
+            <a:avLst/>
+          </a:prstGeom>
+        </p:spPr>
+      </p:pic>
+      <p:sp>
+        <p:nvSpPr>
+          <p:cNvPr id="6" name="TextBox 5"/>
+          <p:cNvSpPr txBox="1"/>
+          <p:nvPr/>
+        </p:nvSpPr>
+        <p:spPr>
+          <a:xfrm>
+            <a:off x="9556749" y="2249487"/>
+            <a:ext cx="2489982" cy="2585323"/>
+          </a:xfrm>
+          <a:prstGeom prst="rect">
+            <a:avLst/>
+          </a:prstGeom>
+          <a:noFill/>
+        </p:spPr>
+        <p:txBody>
+          <a:bodyPr wrap="square" rtlCol="0">
+            <a:spAutoFit/>
           </a:bodyPr>
           <a:lstStyle/>
           <a:p>
-            <a:r>
-              <a:rPr lang="en-US" dirty="0">
-                <a:hlinkClick r:id="rId2"/>
-              </a:rPr>
-              <a:t>https://software.intel.com/en-us/license/intel-software-guard-extensions-licensee-guide</a:t>
-            </a:r>
-            <a:endParaRPr lang="en-US" dirty="0"/>
-          </a:p>
-          <a:p>
-            <a:pPr marL="0" indent="0">
-              <a:buNone/>
+            <a:pPr marL="285750" indent="-285750">
+              <a:buFont typeface="Arial" charset="0"/>
+              <a:buChar char="•"/>
             </a:pPr>
             <a:r>
               <a:rPr lang="en-US" dirty="0"/>
-              <a:t>“ In addition, Licensees should:</a:t>
-            </a:r>
-          </a:p>
-          <a:p>
-            <a:pPr marL="0" indent="0">
-              <a:buNone/>
+              <a:t>+ Fuses, of course (CR_SEAL_FUSES in terms of SDM, the screenshot is from there)</a:t>
+            </a:r>
+          </a:p>
+          <a:p>
+            <a:pPr marL="285750" indent="-285750">
+              <a:buFont typeface="Arial" charset="0"/>
+              <a:buChar char="•"/>
             </a:pPr>
             <a:r>
               <a:rPr lang="en-US" dirty="0"/>
-              <a:t>Observe industry secure coding best practices for software development to avoid vulnerabilities (such practices might include a secure software development framework, coding standards, data input validation, least access possible, secure logging, and so on).</a:t>
-            </a:r>
-          </a:p>
-          <a:p>
-            <a:pPr marL="0" indent="0">
-              <a:buNone/>
+              <a:t>Note Sealing key </a:t>
+            </a:r>
+            <a:r>
+              <a:rPr lang="mr-IN" dirty="0"/>
+              <a:t>–</a:t>
+            </a:r>
+            <a:r>
+              <a:rPr lang="en-US" dirty="0"/>
+              <a:t> it is enclave or signer specific</a:t>
+            </a:r>
+          </a:p>
+          <a:p>
+            <a:pPr marL="285750" indent="-285750">
+              <a:buFont typeface="Arial" charset="0"/>
+              <a:buChar char="•"/>
             </a:pPr>
-            <a:r>
-              <a:rPr lang="en-US" dirty="0"/>
-              <a:t>Address and fix significant security vulnerabilities within a reasonable time, or within a time frame established under existing disclosure arrangements between Intel and the Licensee, after becoming aware of the vulnerability.</a:t>
-            </a:r>
-          </a:p>
-          <a:p>
-            <a:pPr marL="0" indent="0">
-              <a:buNone/>
-            </a:pPr>
-            <a:r>
-              <a:rPr lang="en-US" dirty="0"/>
-              <a:t>Ensure that the licensed application installer, or the operating environment in which the application resides, includes the most current Platform Software (PSW) Installer for Intel SGX.</a:t>
-            </a:r>
-          </a:p>
-          <a:p>
-            <a:pPr marL="0" indent="0">
-              <a:buNone/>
-            </a:pPr>
-            <a:r>
-              <a:rPr lang="en-US" dirty="0"/>
-              <a:t>Ensure that end-users receive PSW updates via application update mechanism, or via the operating environment in which the application resides.</a:t>
-            </a:r>
-          </a:p>
-          <a:p>
-            <a:pPr marL="0" indent="0">
-              <a:buNone/>
-            </a:pPr>
-            <a:r>
-              <a:rPr lang="en-US" dirty="0"/>
-              <a:t>Observe best industry practices to: (</a:t>
-            </a:r>
-            <a:r>
-              <a:rPr lang="en-US" dirty="0" err="1"/>
-              <a:t>i</a:t>
-            </a:r>
-            <a:r>
-              <a:rPr lang="en-US" dirty="0"/>
-              <a:t>) not write malware, spyware or other nuisance software; (ii) </a:t>
-            </a:r>
-            <a:r>
-              <a:rPr lang="en-US" b="1" u="sng" dirty="0">
-                <a:solidFill>
-                  <a:srgbClr val="FF0000"/>
-                </a:solidFill>
-              </a:rPr>
-              <a:t>not write poorly designed software that contains significant security vulnerabilities or that fails to deliver its security promise</a:t>
-            </a:r>
-            <a:r>
-              <a:rPr lang="en-US" dirty="0"/>
-              <a:t>.</a:t>
-            </a:r>
-          </a:p>
-          <a:p>
-            <a:pPr marL="0" indent="0">
-              <a:buNone/>
-            </a:pPr>
-            <a:r>
-              <a:rPr lang="en-US" dirty="0"/>
-              <a:t>Construct Licensed Software Applications to enable complete removal on end user request, including removal of any sealed data.”</a:t>
-            </a:r>
-          </a:p>
-          <a:p>
-            <a:endParaRPr lang="en-US" dirty="0"/>
-          </a:p>
-        </p:txBody>
-      </p:sp>
-      <p:sp>
-        <p:nvSpPr>
-          <p:cNvPr id="4" name="מציין מיקום של מספר שקופית 3"/>
+            <a:endParaRPr lang="ru-RU" dirty="0"/>
+          </a:p>
+        </p:txBody>
+      </p:sp>
+      <p:sp>
+        <p:nvSpPr>
+          <p:cNvPr id="3" name="מציין מיקום של מספר שקופית 2"/>
           <p:cNvSpPr>
             <a:spLocks noGrp="1"/>
           </p:cNvSpPr>
@@ -35620,7 +35684,7 @@
     </p:spTree>
     <p:extLst>
       <p:ext uri="{BB962C8B-B14F-4D97-AF65-F5344CB8AC3E}">
-        <p14:creationId xmlns:p14="http://schemas.microsoft.com/office/powerpoint/2010/main" val="994950159"/>
+        <p14:creationId xmlns:p14="http://schemas.microsoft.com/office/powerpoint/2010/main" val="1130062494"/>
       </p:ext>
     </p:extLst>
   </p:cSld>
@@ -35649,7 +35713,7 @@
       </p:grpSpPr>
       <p:sp>
         <p:nvSpPr>
-          <p:cNvPr id="2" name="Title 1"/>
+          <p:cNvPr id="2" name="כותרת 1"/>
           <p:cNvSpPr>
             <a:spLocks noGrp="1"/>
           </p:cNvSpPr>
@@ -35664,14 +35728,14 @@
           <a:p>
             <a:r>
               <a:rPr lang="en-US" dirty="0"/>
-              <a:t>Note on involved crypto</a:t>
-            </a:r>
-          </a:p>
-        </p:txBody>
-      </p:sp>
-      <p:sp>
-        <p:nvSpPr>
-          <p:cNvPr id="3" name="Content Placeholder 2"/>
+              <a:t>Why can’t I sign it myself</a:t>
+            </a:r>
+          </a:p>
+        </p:txBody>
+      </p:sp>
+      <p:sp>
+        <p:nvSpPr>
+          <p:cNvPr id="3" name="מציין מיקום תוכן 2"/>
           <p:cNvSpPr>
             <a:spLocks noGrp="1"/>
           </p:cNvSpPr>
@@ -35681,19 +35745,104 @@
         </p:nvSpPr>
         <p:spPr/>
         <p:txBody>
-          <a:bodyPr/>
-          <a:lstStyle/>
-          <a:p>
-            <a:r>
-              <a:rPr lang="en-US" dirty="0"/>
-              <a:t>AES GCM is used for sealing data</a:t>
-            </a:r>
-          </a:p>
-          <a:p>
-            <a:r>
-              <a:rPr lang="en-US" dirty="0"/>
-              <a:t>EPID and other things are out of scope</a:t>
-            </a:r>
+          <a:bodyPr>
+            <a:normAutofit fontScale="55000" lnSpcReduction="20000"/>
+          </a:bodyPr>
+          <a:lstStyle/>
+          <a:p>
+            <a:r>
+              <a:rPr lang="en-US" dirty="0">
+                <a:hlinkClick r:id="rId2"/>
+              </a:rPr>
+              <a:t>https://software.intel.com/en-us/license/intel-software-guard-extensions-licensee-guide</a:t>
+            </a:r>
+            <a:endParaRPr lang="en-US" dirty="0"/>
+          </a:p>
+          <a:p>
+            <a:pPr marL="0" indent="0">
+              <a:buNone/>
+            </a:pPr>
+            <a:r>
+              <a:rPr lang="en-US" dirty="0"/>
+              <a:t>“ In addition, Licensees should:</a:t>
+            </a:r>
+          </a:p>
+          <a:p>
+            <a:pPr marL="0" indent="0">
+              <a:buNone/>
+            </a:pPr>
+            <a:r>
+              <a:rPr lang="en-US" dirty="0"/>
+              <a:t>Observe industry secure coding best practices for software development to avoid vulnerabilities (such practices might include a secure software development framework, coding standards, data input validation, least access possible, secure logging, and so on).</a:t>
+            </a:r>
+          </a:p>
+          <a:p>
+            <a:pPr marL="0" indent="0">
+              <a:buNone/>
+            </a:pPr>
+            <a:r>
+              <a:rPr lang="en-US" dirty="0"/>
+              <a:t>Address and fix significant security vulnerabilities within a reasonable time, or within a time frame established under existing disclosure arrangements between Intel and the Licensee, after becoming aware of the vulnerability.</a:t>
+            </a:r>
+          </a:p>
+          <a:p>
+            <a:pPr marL="0" indent="0">
+              <a:buNone/>
+            </a:pPr>
+            <a:r>
+              <a:rPr lang="en-US" dirty="0"/>
+              <a:t>Ensure that the licensed application installer, or the operating environment in which the application resides, includes the most current Platform Software (PSW) Installer for Intel SGX.</a:t>
+            </a:r>
+          </a:p>
+          <a:p>
+            <a:pPr marL="0" indent="0">
+              <a:buNone/>
+            </a:pPr>
+            <a:r>
+              <a:rPr lang="en-US" dirty="0"/>
+              <a:t>Ensure that end-users receive PSW updates via application update mechanism, or via the operating environment in which the application resides.</a:t>
+            </a:r>
+          </a:p>
+          <a:p>
+            <a:pPr marL="0" indent="0">
+              <a:buNone/>
+            </a:pPr>
+            <a:r>
+              <a:rPr lang="en-US" dirty="0"/>
+              <a:t>Observe best industry practices to: (</a:t>
+            </a:r>
+            <a:r>
+              <a:rPr lang="en-US" dirty="0" err="1"/>
+              <a:t>i</a:t>
+            </a:r>
+            <a:r>
+              <a:rPr lang="en-US" dirty="0"/>
+              <a:t>) not write malware, spyware or other nuisance software; (ii) </a:t>
+            </a:r>
+            <a:r>
+              <a:rPr lang="en-US" b="1" u="sng" dirty="0">
+                <a:solidFill>
+                  <a:srgbClr val="FF0000"/>
+                </a:solidFill>
+              </a:rPr>
+              <a:t>not write poorly designed software that contains significant security vulnerabilities or that fails to deliver its security promise</a:t>
+            </a:r>
+            <a:r>
+              <a:rPr lang="en-US" dirty="0"/>
+              <a:t>.</a:t>
+            </a:r>
+          </a:p>
+          <a:p>
+            <a:pPr marL="0" indent="0">
+              <a:buNone/>
+            </a:pPr>
+            <a:r>
+              <a:rPr lang="en-US" dirty="0"/>
+              <a:t>Construct Licensed Software Applications to enable complete removal on end user request, including removal of any sealed data.”</a:t>
+            </a:r>
+          </a:p>
+          <a:p>
+            <a:endParaRPr lang="en-US" dirty="0"/>
           </a:p>
         </p:txBody>
       </p:sp>
@@ -35723,7 +35872,7 @@
     </p:spTree>
     <p:extLst>
       <p:ext uri="{BB962C8B-B14F-4D97-AF65-F5344CB8AC3E}">
-        <p14:creationId xmlns:p14="http://schemas.microsoft.com/office/powerpoint/2010/main" val="2498105173"/>
+        <p14:creationId xmlns:p14="http://schemas.microsoft.com/office/powerpoint/2010/main" val="994950159"/>
       </p:ext>
     </p:extLst>
   </p:cSld>
@@ -35767,6 +35916,109 @@
           <a:p>
             <a:r>
               <a:rPr lang="en-US" dirty="0"/>
+              <a:t>Note on involved crypto</a:t>
+            </a:r>
+          </a:p>
+        </p:txBody>
+      </p:sp>
+      <p:sp>
+        <p:nvSpPr>
+          <p:cNvPr id="3" name="Content Placeholder 2"/>
+          <p:cNvSpPr>
+            <a:spLocks noGrp="1"/>
+          </p:cNvSpPr>
+          <p:nvPr>
+            <p:ph idx="1"/>
+          </p:nvPr>
+        </p:nvSpPr>
+        <p:spPr/>
+        <p:txBody>
+          <a:bodyPr/>
+          <a:lstStyle/>
+          <a:p>
+            <a:r>
+              <a:rPr lang="en-US" dirty="0"/>
+              <a:t>AES GCM is used for sealing data</a:t>
+            </a:r>
+          </a:p>
+          <a:p>
+            <a:r>
+              <a:rPr lang="en-US" dirty="0"/>
+              <a:t>EPID and other things are out of scope</a:t>
+            </a:r>
+          </a:p>
+        </p:txBody>
+      </p:sp>
+      <p:sp>
+        <p:nvSpPr>
+          <p:cNvPr id="4" name="מציין מיקום של מספר שקופית 3"/>
+          <p:cNvSpPr>
+            <a:spLocks noGrp="1"/>
+          </p:cNvSpPr>
+          <p:nvPr>
+            <p:ph type="sldNum" sz="quarter" idx="12"/>
+          </p:nvPr>
+        </p:nvSpPr>
+        <p:spPr/>
+        <p:txBody>
+          <a:bodyPr/>
+          <a:lstStyle/>
+          <a:p>
+            <a:fld id="{E49B20E1-BFBC-4C97-821D-580820242ED4}" type="slidenum">
+              <a:rPr lang="en-US" smtClean="0"/>
+              <a:t>52</a:t>
+            </a:fld>
+            <a:endParaRPr lang="en-US"/>
+          </a:p>
+        </p:txBody>
+      </p:sp>
+    </p:spTree>
+    <p:extLst>
+      <p:ext uri="{BB962C8B-B14F-4D97-AF65-F5344CB8AC3E}">
+        <p14:creationId xmlns:p14="http://schemas.microsoft.com/office/powerpoint/2010/main" val="2498105173"/>
+      </p:ext>
+    </p:extLst>
+  </p:cSld>
+  <p:clrMapOvr>
+    <a:masterClrMapping/>
+  </p:clrMapOvr>
+</p:sld>
+</file>
+
+<file path=ppt/slides/slide53.xml><?xml version="1.0" encoding="utf-8"?>
+<p:sld xmlns:a="http://schemas.openxmlformats.org/drawingml/2006/main" xmlns:r="http://schemas.openxmlformats.org/officeDocument/2006/relationships" xmlns:p="http://schemas.openxmlformats.org/presentationml/2006/main">
+  <p:cSld>
+    <p:spTree>
+      <p:nvGrpSpPr>
+        <p:cNvPr id="1" name=""/>
+        <p:cNvGrpSpPr/>
+        <p:nvPr/>
+      </p:nvGrpSpPr>
+      <p:grpSpPr>
+        <a:xfrm>
+          <a:off x="0" y="0"/>
+          <a:ext cx="0" cy="0"/>
+          <a:chOff x="0" y="0"/>
+          <a:chExt cx="0" cy="0"/>
+        </a:xfrm>
+      </p:grpSpPr>
+      <p:sp>
+        <p:nvSpPr>
+          <p:cNvPr id="2" name="Title 1"/>
+          <p:cNvSpPr>
+            <a:spLocks noGrp="1"/>
+          </p:cNvSpPr>
+          <p:nvPr>
+            <p:ph type="title"/>
+          </p:nvPr>
+        </p:nvSpPr>
+        <p:spPr/>
+        <p:txBody>
+          <a:bodyPr/>
+          <a:lstStyle/>
+          <a:p>
+            <a:r>
+              <a:rPr lang="en-US" dirty="0"/>
               <a:t>SGX instructions</a:t>
             </a:r>
           </a:p>
@@ -35982,7 +36234,7 @@
           <a:p>
             <a:fld id="{E49B20E1-BFBC-4C97-821D-580820242ED4}" type="slidenum">
               <a:rPr lang="en-US" smtClean="0"/>
-              <a:t>52</a:t>
+              <a:t>53</a:t>
             </a:fld>
             <a:endParaRPr lang="en-US"/>
           </a:p>

</xml_diff>

<commit_message>
Presentation updates and misspelling example
</commit_message>
<xml_diff>
--- a/docs/SGX Enclave Programming - Common Mistakes.pptx
+++ b/docs/SGX Enclave Programming - Common Mistakes.pptx
@@ -50,10 +50,10 @@
     <p:sldId id="296" r:id="rId41"/>
     <p:sldId id="280" r:id="rId42"/>
     <p:sldId id="281" r:id="rId43"/>
-    <p:sldId id="283" r:id="rId44"/>
+    <p:sldId id="284" r:id="rId44"/>
     <p:sldId id="316" r:id="rId45"/>
-    <p:sldId id="284" r:id="rId46"/>
-    <p:sldId id="261" r:id="rId47"/>
+    <p:sldId id="261" r:id="rId46"/>
+    <p:sldId id="283" r:id="rId47"/>
     <p:sldId id="282" r:id="rId48"/>
     <p:sldId id="317" r:id="rId49"/>
     <p:sldId id="307" r:id="rId50"/>
@@ -253,7 +253,7 @@
           <a:p>
             <a:fld id="{7A0F84C6-4B66-FC4F-9BD6-6F53B9E68AE3}" type="datetimeFigureOut">
               <a:rPr lang="ru-RU" smtClean="0"/>
-              <a:t>11.06.2017</a:t>
+              <a:t>14.06.17</a:t>
             </a:fld>
             <a:endParaRPr lang="ru-RU"/>
           </a:p>
@@ -5161,8 +5161,21 @@
           <a:p>
             <a:r>
               <a:rPr lang="en-US" baseline="0" dirty="0"/>
-              <a:t>1 – leaving secrets unattended and thus very bad design (secrets should be cleared immediately after usage, just for defense in depth – and enclave didn’t help us in anything)</a:t>
-            </a:r>
+              <a:t>1 – leaving secrets unattended and thus very bad design (secrets should be cleared immediately after usage, just for defense in depth – and enclave didn’t help us in anything</a:t>
+            </a:r>
+            <a:r>
+              <a:rPr lang="en-US" baseline="0" dirty="0" smtClean="0"/>
+              <a:t>). Here you have a </a:t>
+            </a:r>
+            <a:r>
+              <a:rPr lang="en-US" baseline="0" dirty="0" err="1" smtClean="0"/>
+              <a:t>ot</a:t>
+            </a:r>
+            <a:r>
+              <a:rPr lang="en-US" baseline="0" dirty="0" smtClean="0"/>
+              <a:t> of them.</a:t>
+            </a:r>
+            <a:endParaRPr lang="en-US" baseline="0" dirty="0"/>
           </a:p>
           <a:p>
             <a:r>
@@ -5171,6 +5184,99 @@
             </a:r>
           </a:p>
           <a:p>
+            <a:endParaRPr lang="en-US" baseline="0" dirty="0" smtClean="0"/>
+          </a:p>
+          <a:p>
+            <a:r>
+              <a:rPr lang="en-US" baseline="0" dirty="0" smtClean="0"/>
+              <a:t>This vulnerability probably looks a bit artificial, but I have a really good reason for showing it:</a:t>
+            </a:r>
+          </a:p>
+          <a:p>
+            <a:endParaRPr lang="en-US" baseline="0" dirty="0" smtClean="0"/>
+          </a:p>
+          <a:p>
+            <a:r>
+              <a:rPr lang="en-US" baseline="0" dirty="0" smtClean="0"/>
+              <a:t>1 </a:t>
+            </a:r>
+            <a:r>
+              <a:rPr lang="mr-IN" baseline="0" dirty="0" smtClean="0"/>
+              <a:t>–</a:t>
+            </a:r>
+            <a:r>
+              <a:rPr lang="en-US" baseline="0" dirty="0" smtClean="0"/>
+              <a:t> As an example of how small and harmless issue can undermine all the security model </a:t>
+            </a:r>
+          </a:p>
+          <a:p>
+            <a:r>
+              <a:rPr lang="en-US" baseline="0" dirty="0" smtClean="0"/>
+              <a:t>	There is a proverb in Russian, “don’t put all the eggs to the same basket”, with very clear meaning: don’t place all of your valuables at the same place.</a:t>
+            </a:r>
+          </a:p>
+          <a:p>
+            <a:r>
+              <a:rPr lang="en-US" baseline="0" dirty="0" smtClean="0"/>
+              <a:t>	In the boundaries of this analogy any kind of secure enclave, and it </a:t>
+            </a:r>
+            <a:r>
+              <a:rPr lang="en-US" baseline="0" dirty="0" err="1" smtClean="0"/>
+              <a:t>doesn</a:t>
+            </a:r>
+            <a:r>
+              <a:rPr lang="mr-IN" baseline="0" dirty="0" smtClean="0"/>
+              <a:t>’</a:t>
+            </a:r>
+            <a:r>
+              <a:rPr lang="en-US" baseline="0" dirty="0" smtClean="0"/>
+              <a:t>t matter how exactly it is implemented, is a basket with eggs. </a:t>
+            </a:r>
+          </a:p>
+          <a:p>
+            <a:r>
+              <a:rPr lang="en-US" baseline="0" dirty="0" smtClean="0"/>
+              <a:t>	Once you drop it </a:t>
+            </a:r>
+            <a:r>
+              <a:rPr lang="mr-IN" baseline="0" dirty="0" smtClean="0"/>
+              <a:t>–</a:t>
+            </a:r>
+            <a:r>
+              <a:rPr lang="en-US" baseline="0" dirty="0" smtClean="0"/>
+              <a:t> you break everything.</a:t>
+            </a:r>
+          </a:p>
+          <a:p>
+            <a:r>
+              <a:rPr lang="en-US" baseline="0" dirty="0" smtClean="0"/>
+              <a:t>2 </a:t>
+            </a:r>
+            <a:r>
+              <a:rPr lang="mr-IN" baseline="0" dirty="0" smtClean="0"/>
+              <a:t>–</a:t>
+            </a:r>
+            <a:r>
+              <a:rPr lang="en-US" baseline="0" dirty="0" smtClean="0"/>
+              <a:t> I had seen similar things in real life enclaves. They were a bit more complicated, but it is an </a:t>
+            </a:r>
+            <a:r>
+              <a:rPr lang="en-US" baseline="0" dirty="0" err="1" smtClean="0"/>
+              <a:t>exsercise</a:t>
+            </a:r>
+            <a:r>
+              <a:rPr lang="en-US" baseline="0" dirty="0" smtClean="0"/>
+              <a:t>, after all.</a:t>
+            </a:r>
+          </a:p>
+          <a:p>
+            <a:endParaRPr lang="en-US" baseline="0" dirty="0" smtClean="0"/>
+          </a:p>
+          <a:p>
+            <a:r>
+              <a:rPr lang="en-US" baseline="0" dirty="0" smtClean="0"/>
+              <a:t>	</a:t>
+            </a:r>
             <a:endParaRPr lang="en-US" baseline="0" dirty="0"/>
           </a:p>
           <a:p>
@@ -5265,9 +5371,114 @@
           <a:lstStyle/>
           <a:p>
             <a:r>
-              <a:rPr lang="en-US" dirty="0"/>
-              <a:t>Nothing new here except of old good and dumb enclave fuzzing – there are no tools that allow to use something more complicated.</a:t>
-            </a:r>
+              <a:rPr lang="en-US" dirty="0" smtClean="0"/>
+              <a:t>Automatic</a:t>
+            </a:r>
+            <a:r>
+              <a:rPr lang="en-US" baseline="0" dirty="0" smtClean="0"/>
+              <a:t> code analysis </a:t>
+            </a:r>
+            <a:r>
+              <a:rPr lang="mr-IN" baseline="0" dirty="0" smtClean="0"/>
+              <a:t>–</a:t>
+            </a:r>
+            <a:r>
+              <a:rPr lang="en-US" baseline="0" dirty="0" smtClean="0"/>
+              <a:t> such as </a:t>
+            </a:r>
+            <a:r>
+              <a:rPr lang="en-US" baseline="0" dirty="0" err="1" smtClean="0"/>
+              <a:t>Klocwork</a:t>
+            </a:r>
+            <a:r>
+              <a:rPr lang="en-US" baseline="0" dirty="0" smtClean="0"/>
+              <a:t>. It may give a good result if used with nightly builds every day.</a:t>
+            </a:r>
+          </a:p>
+          <a:p>
+            <a:r>
+              <a:rPr lang="en-US" baseline="0" dirty="0" smtClean="0"/>
+              <a:t>Manual review of all possible things gives best results </a:t>
+            </a:r>
+            <a:r>
+              <a:rPr lang="mr-IN" baseline="0" dirty="0" smtClean="0"/>
+              <a:t>–</a:t>
+            </a:r>
+            <a:r>
+              <a:rPr lang="en-US" baseline="0" dirty="0" smtClean="0"/>
+              <a:t> but with the results we have a problem:</a:t>
+            </a:r>
+          </a:p>
+          <a:p>
+            <a:r>
+              <a:rPr lang="en-US" baseline="0" dirty="0" smtClean="0"/>
+              <a:t> - the review should be conducted by very much qualified people</a:t>
+            </a:r>
+          </a:p>
+          <a:p>
+            <a:r>
+              <a:rPr lang="en-US" baseline="0" dirty="0" smtClean="0"/>
+              <a:t> - It is still probabilistic process, and something will always be overlooked</a:t>
+            </a:r>
+            <a:endParaRPr lang="en-US" dirty="0" smtClean="0"/>
+          </a:p>
+          <a:p>
+            <a:endParaRPr lang="en-US" dirty="0" smtClean="0"/>
+          </a:p>
+          <a:p>
+            <a:r>
+              <a:rPr lang="en-US" dirty="0" smtClean="0"/>
+              <a:t>Nothing </a:t>
+            </a:r>
+            <a:r>
+              <a:rPr lang="en-US" dirty="0"/>
+              <a:t>new here except of old good and dumb enclave fuzzing – there are no tools that allow to use something more complicated</a:t>
+            </a:r>
+            <a:r>
+              <a:rPr lang="en-US" dirty="0" smtClean="0"/>
+              <a:t>.</a:t>
+            </a:r>
+          </a:p>
+          <a:p>
+            <a:r>
+              <a:rPr lang="en-US" dirty="0" smtClean="0"/>
+              <a:t>The only hope here is that good enclave is small</a:t>
+            </a:r>
+            <a:r>
+              <a:rPr lang="en-US" baseline="0" dirty="0" smtClean="0"/>
+              <a:t> </a:t>
+            </a:r>
+            <a:r>
+              <a:rPr lang="mr-IN" baseline="0" dirty="0" smtClean="0"/>
+              <a:t>–</a:t>
+            </a:r>
+            <a:r>
+              <a:rPr lang="en-US" baseline="0" dirty="0" smtClean="0"/>
+              <a:t> and missing information can </a:t>
+            </a:r>
+            <a:r>
+              <a:rPr lang="en-US" baseline="0" smtClean="0"/>
+              <a:t>be obtained by code review. </a:t>
+            </a:r>
+            <a:endParaRPr lang="en-US" dirty="0" smtClean="0"/>
+          </a:p>
+          <a:p>
+            <a:endParaRPr lang="en-US" dirty="0" smtClean="0"/>
+          </a:p>
+          <a:p>
+            <a:r>
+              <a:rPr lang="en-US" dirty="0" smtClean="0"/>
+              <a:t>Somebody mentioned yesterday “Bad design guard” </a:t>
+            </a:r>
+            <a:r>
+              <a:rPr lang="mr-IN" dirty="0" smtClean="0"/>
+              <a:t>…</a:t>
+            </a:r>
+            <a:r>
+              <a:rPr lang="en-US" dirty="0" smtClean="0"/>
+              <a:t> We definitely need it here.</a:t>
+            </a:r>
+            <a:endParaRPr lang="en-US" dirty="0"/>
           </a:p>
           <a:p>
             <a:r>
@@ -5332,7 +5543,7 @@
       </p:grpSpPr>
       <p:sp>
         <p:nvSpPr>
-          <p:cNvPr id="2" name="Slide Image Placeholder 1"/>
+          <p:cNvPr id="2" name="מציין מיקום של תמונת שקופית 1"/>
           <p:cNvSpPr>
             <a:spLocks noGrp="1" noRot="1" noChangeAspect="1"/>
           </p:cNvSpPr>
@@ -5344,7 +5555,7 @@
       </p:sp>
       <p:sp>
         <p:nvSpPr>
-          <p:cNvPr id="3" name="Notes Placeholder 2"/>
+          <p:cNvPr id="3" name="מציין מיקום של הערות 2"/>
           <p:cNvSpPr>
             <a:spLocks noGrp="1"/>
           </p:cNvSpPr>
@@ -5359,14 +5570,21 @@
           <a:p>
             <a:r>
               <a:rPr lang="en-US" dirty="0"/>
-              <a:t>Special thanks : as in list.</a:t>
-            </a:r>
-          </a:p>
-        </p:txBody>
-      </p:sp>
-      <p:sp>
-        <p:nvSpPr>
-          <p:cNvPr id="4" name="Slide Number Placeholder 3"/>
+              <a:t>If you are reading these presenter notes – thank you very much </a:t>
+            </a:r>
+            <a:r>
+              <a:rPr lang="en-US" dirty="0">
+                <a:sym typeface="Wingdings" panose="05000000000000000000" pitchFamily="2" charset="2"/>
+              </a:rPr>
+              <a:t></a:t>
+            </a:r>
+            <a:endParaRPr lang="en-US" dirty="0"/>
+          </a:p>
+        </p:txBody>
+      </p:sp>
+      <p:sp>
+        <p:nvSpPr>
+          <p:cNvPr id="4" name="מציין מיקום של מספר שקופית 3"/>
           <p:cNvSpPr>
             <a:spLocks noGrp="1"/>
           </p:cNvSpPr>
@@ -5390,7 +5608,7 @@
     </p:spTree>
     <p:extLst>
       <p:ext uri="{BB962C8B-B14F-4D97-AF65-F5344CB8AC3E}">
-        <p14:creationId xmlns:p14="http://schemas.microsoft.com/office/powerpoint/2010/main" val="2457236627"/>
+        <p14:creationId xmlns:p14="http://schemas.microsoft.com/office/powerpoint/2010/main" val="2145637075"/>
       </p:ext>
     </p:extLst>
   </p:cSld>
@@ -5446,15 +5664,8 @@
           <a:p>
             <a:r>
               <a:rPr lang="en-US" dirty="0"/>
-              <a:t>If you are reading these presenter notes – thank you very much </a:t>
-            </a:r>
-            <a:r>
-              <a:rPr lang="en-US" dirty="0">
-                <a:sym typeface="Wingdings" panose="05000000000000000000" pitchFamily="2" charset="2"/>
-              </a:rPr>
-              <a:t></a:t>
-            </a:r>
-            <a:endParaRPr lang="en-US" dirty="0"/>
+              <a:t>Some useful links for the concerned fellow citizens</a:t>
+            </a:r>
           </a:p>
         </p:txBody>
       </p:sp>
@@ -5484,7 +5695,7 @@
     </p:spTree>
     <p:extLst>
       <p:ext uri="{BB962C8B-B14F-4D97-AF65-F5344CB8AC3E}">
-        <p14:creationId xmlns:p14="http://schemas.microsoft.com/office/powerpoint/2010/main" val="2145637075"/>
+        <p14:creationId xmlns:p14="http://schemas.microsoft.com/office/powerpoint/2010/main" val="1902725040"/>
       </p:ext>
     </p:extLst>
   </p:cSld>
@@ -5513,7 +5724,7 @@
       </p:grpSpPr>
       <p:sp>
         <p:nvSpPr>
-          <p:cNvPr id="2" name="מציין מיקום של תמונת שקופית 1"/>
+          <p:cNvPr id="2" name="Slide Image Placeholder 1"/>
           <p:cNvSpPr>
             <a:spLocks noGrp="1" noRot="1" noChangeAspect="1"/>
           </p:cNvSpPr>
@@ -5525,7 +5736,7 @@
       </p:sp>
       <p:sp>
         <p:nvSpPr>
-          <p:cNvPr id="3" name="מציין מיקום של הערות 2"/>
+          <p:cNvPr id="3" name="Notes Placeholder 2"/>
           <p:cNvSpPr>
             <a:spLocks noGrp="1"/>
           </p:cNvSpPr>
@@ -5540,14 +5751,14 @@
           <a:p>
             <a:r>
               <a:rPr lang="en-US" dirty="0"/>
-              <a:t>Some useful links for the concerned fellow citizens</a:t>
-            </a:r>
-          </a:p>
-        </p:txBody>
-      </p:sp>
-      <p:sp>
-        <p:nvSpPr>
-          <p:cNvPr id="4" name="מציין מיקום של מספר שקופית 3"/>
+              <a:t>Special thanks : as in list.</a:t>
+            </a:r>
+          </a:p>
+        </p:txBody>
+      </p:sp>
+      <p:sp>
+        <p:nvSpPr>
+          <p:cNvPr id="4" name="Slide Number Placeholder 3"/>
           <p:cNvSpPr>
             <a:spLocks noGrp="1"/>
           </p:cNvSpPr>
@@ -5571,7 +5782,7 @@
     </p:spTree>
     <p:extLst>
       <p:ext uri="{BB962C8B-B14F-4D97-AF65-F5344CB8AC3E}">
-        <p14:creationId xmlns:p14="http://schemas.microsoft.com/office/powerpoint/2010/main" val="1902725040"/>
+        <p14:creationId xmlns:p14="http://schemas.microsoft.com/office/powerpoint/2010/main" val="2457236627"/>
       </p:ext>
     </p:extLst>
   </p:cSld>
@@ -6532,7 +6743,7 @@
           <a:noFill/>
           <a:extLst>
             <a:ext uri="{909E8E84-426E-40dd-AFC4-6F175D3DCCD1}">
-              <a14:hiddenFill xmlns:a14="http://schemas.microsoft.com/office/drawing/2010/main" xmlns="">
+              <a14:hiddenFill xmlns="" xmlns:a14="http://schemas.microsoft.com/office/drawing/2010/main">
                 <a:solidFill>
                   <a:srgbClr val="FFFFFF"/>
                 </a:solidFill>
@@ -6592,7 +6803,7 @@
             </a:ln>
             <a:extLst>
               <a:ext uri="{91240B29-F687-4f45-9708-019B960494DF}">
-                <a14:hiddenLine xmlns:a14="http://schemas.microsoft.com/office/drawing/2010/main" xmlns="" w="9525">
+                <a14:hiddenLine xmlns="" xmlns:a14="http://schemas.microsoft.com/office/drawing/2010/main" w="9525">
                   <a:solidFill>
                     <a:srgbClr val="000000"/>
                   </a:solidFill>
@@ -6682,7 +6893,7 @@
             </a:ln>
             <a:extLst>
               <a:ext uri="{91240B29-F687-4f45-9708-019B960494DF}">
-                <a14:hiddenLine xmlns:a14="http://schemas.microsoft.com/office/drawing/2010/main" xmlns="" w="9525">
+                <a14:hiddenLine xmlns="" xmlns:a14="http://schemas.microsoft.com/office/drawing/2010/main" w="9525">
                   <a:solidFill>
                     <a:srgbClr val="000000"/>
                   </a:solidFill>
@@ -6772,7 +6983,7 @@
             </a:ln>
             <a:extLst>
               <a:ext uri="{91240B29-F687-4f45-9708-019B960494DF}">
-                <a14:hiddenLine xmlns:a14="http://schemas.microsoft.com/office/drawing/2010/main" xmlns="" w="9525">
+                <a14:hiddenLine xmlns="" xmlns:a14="http://schemas.microsoft.com/office/drawing/2010/main" w="9525">
                   <a:solidFill>
                     <a:srgbClr val="000000"/>
                   </a:solidFill>
@@ -6806,7 +7017,7 @@
             </a:ln>
             <a:extLst>
               <a:ext uri="{91240B29-F687-4f45-9708-019B960494DF}">
-                <a14:hiddenLine xmlns:a14="http://schemas.microsoft.com/office/drawing/2010/main" xmlns="" w="9525">
+                <a14:hiddenLine xmlns="" xmlns:a14="http://schemas.microsoft.com/office/drawing/2010/main" w="9525">
                   <a:solidFill>
                     <a:srgbClr val="000000"/>
                   </a:solidFill>
@@ -6896,7 +7107,7 @@
             </a:ln>
             <a:extLst>
               <a:ext uri="{91240B29-F687-4f45-9708-019B960494DF}">
-                <a14:hiddenLine xmlns:a14="http://schemas.microsoft.com/office/drawing/2010/main" xmlns="" w="9525">
+                <a14:hiddenLine xmlns="" xmlns:a14="http://schemas.microsoft.com/office/drawing/2010/main" w="9525">
                   <a:solidFill>
                     <a:srgbClr val="000000"/>
                   </a:solidFill>
@@ -6958,7 +7169,7 @@
             </a:ln>
             <a:extLst>
               <a:ext uri="{91240B29-F687-4f45-9708-019B960494DF}">
-                <a14:hiddenLine xmlns:a14="http://schemas.microsoft.com/office/drawing/2010/main" xmlns="" w="9525">
+                <a14:hiddenLine xmlns="" xmlns:a14="http://schemas.microsoft.com/office/drawing/2010/main" w="9525">
                   <a:solidFill>
                     <a:srgbClr val="000000"/>
                   </a:solidFill>
@@ -7020,7 +7231,7 @@
             </a:ln>
             <a:extLst>
               <a:ext uri="{91240B29-F687-4f45-9708-019B960494DF}">
-                <a14:hiddenLine xmlns:a14="http://schemas.microsoft.com/office/drawing/2010/main" xmlns="" w="9525">
+                <a14:hiddenLine xmlns="" xmlns:a14="http://schemas.microsoft.com/office/drawing/2010/main" w="9525">
                   <a:solidFill>
                     <a:srgbClr val="000000"/>
                   </a:solidFill>
@@ -7110,7 +7321,7 @@
             </a:ln>
             <a:extLst>
               <a:ext uri="{91240B29-F687-4f45-9708-019B960494DF}">
-                <a14:hiddenLine xmlns:a14="http://schemas.microsoft.com/office/drawing/2010/main" xmlns="" w="9525">
+                <a14:hiddenLine xmlns="" xmlns:a14="http://schemas.microsoft.com/office/drawing/2010/main" w="9525">
                   <a:solidFill>
                     <a:srgbClr val="000000"/>
                   </a:solidFill>
@@ -7172,7 +7383,7 @@
             </a:ln>
             <a:extLst>
               <a:ext uri="{91240B29-F687-4f45-9708-019B960494DF}">
-                <a14:hiddenLine xmlns:a14="http://schemas.microsoft.com/office/drawing/2010/main" xmlns="" w="9525">
+                <a14:hiddenLine xmlns="" xmlns:a14="http://schemas.microsoft.com/office/drawing/2010/main" w="9525">
                   <a:solidFill>
                     <a:srgbClr val="000000"/>
                   </a:solidFill>
@@ -7234,7 +7445,7 @@
             </a:ln>
             <a:extLst>
               <a:ext uri="{91240B29-F687-4f45-9708-019B960494DF}">
-                <a14:hiddenLine xmlns:a14="http://schemas.microsoft.com/office/drawing/2010/main" xmlns="" w="9525">
+                <a14:hiddenLine xmlns="" xmlns:a14="http://schemas.microsoft.com/office/drawing/2010/main" w="9525">
                   <a:solidFill>
                     <a:srgbClr val="000000"/>
                   </a:solidFill>
@@ -7324,7 +7535,7 @@
             </a:ln>
             <a:extLst>
               <a:ext uri="{91240B29-F687-4f45-9708-019B960494DF}">
-                <a14:hiddenLine xmlns:a14="http://schemas.microsoft.com/office/drawing/2010/main" xmlns="" w="9525">
+                <a14:hiddenLine xmlns="" xmlns:a14="http://schemas.microsoft.com/office/drawing/2010/main" w="9525">
                   <a:solidFill>
                     <a:srgbClr val="000000"/>
                   </a:solidFill>
@@ -7414,7 +7625,7 @@
             </a:ln>
             <a:extLst>
               <a:ext uri="{91240B29-F687-4f45-9708-019B960494DF}">
-                <a14:hiddenLine xmlns:a14="http://schemas.microsoft.com/office/drawing/2010/main" xmlns="" w="9525">
+                <a14:hiddenLine xmlns="" xmlns:a14="http://schemas.microsoft.com/office/drawing/2010/main" w="9525">
                   <a:solidFill>
                     <a:srgbClr val="000000"/>
                   </a:solidFill>
@@ -7476,7 +7687,7 @@
             </a:ln>
             <a:extLst>
               <a:ext uri="{91240B29-F687-4f45-9708-019B960494DF}">
-                <a14:hiddenLine xmlns:a14="http://schemas.microsoft.com/office/drawing/2010/main" xmlns="" w="9525">
+                <a14:hiddenLine xmlns="" xmlns:a14="http://schemas.microsoft.com/office/drawing/2010/main" w="9525">
                   <a:solidFill>
                     <a:srgbClr val="000000"/>
                   </a:solidFill>
@@ -7586,7 +7797,7 @@
             </a:ln>
             <a:extLst>
               <a:ext uri="{91240B29-F687-4f45-9708-019B960494DF}">
-                <a14:hiddenLine xmlns:a14="http://schemas.microsoft.com/office/drawing/2010/main" xmlns="" w="9525">
+                <a14:hiddenLine xmlns="" xmlns:a14="http://schemas.microsoft.com/office/drawing/2010/main" w="9525">
                   <a:solidFill>
                     <a:srgbClr val="000000"/>
                   </a:solidFill>
@@ -7648,7 +7859,7 @@
             </a:ln>
             <a:extLst>
               <a:ext uri="{91240B29-F687-4f45-9708-019B960494DF}">
-                <a14:hiddenLine xmlns:a14="http://schemas.microsoft.com/office/drawing/2010/main" xmlns="" w="9525">
+                <a14:hiddenLine xmlns="" xmlns:a14="http://schemas.microsoft.com/office/drawing/2010/main" w="9525">
                   <a:solidFill>
                     <a:srgbClr val="000000"/>
                   </a:solidFill>
@@ -7738,7 +7949,7 @@
             </a:ln>
             <a:extLst>
               <a:ext uri="{91240B29-F687-4f45-9708-019B960494DF}">
-                <a14:hiddenLine xmlns:a14="http://schemas.microsoft.com/office/drawing/2010/main" xmlns="" w="9525">
+                <a14:hiddenLine xmlns="" xmlns:a14="http://schemas.microsoft.com/office/drawing/2010/main" w="9525">
                   <a:solidFill>
                     <a:srgbClr val="000000"/>
                   </a:solidFill>
@@ -7828,7 +8039,7 @@
             </a:ln>
             <a:extLst>
               <a:ext uri="{91240B29-F687-4f45-9708-019B960494DF}">
-                <a14:hiddenLine xmlns:a14="http://schemas.microsoft.com/office/drawing/2010/main" xmlns="" w="9525">
+                <a14:hiddenLine xmlns="" xmlns:a14="http://schemas.microsoft.com/office/drawing/2010/main" w="9525">
                   <a:solidFill>
                     <a:srgbClr val="000000"/>
                   </a:solidFill>
@@ -7890,7 +8101,7 @@
             </a:ln>
             <a:extLst>
               <a:ext uri="{91240B29-F687-4f45-9708-019B960494DF}">
-                <a14:hiddenLine xmlns:a14="http://schemas.microsoft.com/office/drawing/2010/main" xmlns="" w="9525">
+                <a14:hiddenLine xmlns="" xmlns:a14="http://schemas.microsoft.com/office/drawing/2010/main" w="9525">
                   <a:solidFill>
                     <a:srgbClr val="000000"/>
                   </a:solidFill>
@@ -7980,7 +8191,7 @@
             </a:ln>
             <a:extLst>
               <a:ext uri="{91240B29-F687-4f45-9708-019B960494DF}">
-                <a14:hiddenLine xmlns:a14="http://schemas.microsoft.com/office/drawing/2010/main" xmlns="" w="9525">
+                <a14:hiddenLine xmlns="" xmlns:a14="http://schemas.microsoft.com/office/drawing/2010/main" w="9525">
                   <a:solidFill>
                     <a:srgbClr val="000000"/>
                   </a:solidFill>
@@ -8070,7 +8281,7 @@
             </a:ln>
             <a:extLst>
               <a:ext uri="{91240B29-F687-4f45-9708-019B960494DF}">
-                <a14:hiddenLine xmlns:a14="http://schemas.microsoft.com/office/drawing/2010/main" xmlns="" w="9525">
+                <a14:hiddenLine xmlns="" xmlns:a14="http://schemas.microsoft.com/office/drawing/2010/main" w="9525">
                   <a:solidFill>
                     <a:srgbClr val="000000"/>
                   </a:solidFill>
@@ -8126,7 +8337,7 @@
             </a:ln>
             <a:extLst>
               <a:ext uri="{91240B29-F687-4f45-9708-019B960494DF}">
-                <a14:hiddenLine xmlns:a14="http://schemas.microsoft.com/office/drawing/2010/main" xmlns="" w="9525">
+                <a14:hiddenLine xmlns="" xmlns:a14="http://schemas.microsoft.com/office/drawing/2010/main" w="9525">
                   <a:solidFill>
                     <a:srgbClr val="000000"/>
                   </a:solidFill>
@@ -8216,7 +8427,7 @@
             </a:ln>
             <a:extLst>
               <a:ext uri="{91240B29-F687-4f45-9708-019B960494DF}">
-                <a14:hiddenLine xmlns:a14="http://schemas.microsoft.com/office/drawing/2010/main" xmlns="" w="9525">
+                <a14:hiddenLine xmlns="" xmlns:a14="http://schemas.microsoft.com/office/drawing/2010/main" w="9525">
                   <a:solidFill>
                     <a:srgbClr val="000000"/>
                   </a:solidFill>
@@ -8272,7 +8483,7 @@
             </a:ln>
             <a:extLst>
               <a:ext uri="{91240B29-F687-4f45-9708-019B960494DF}">
-                <a14:hiddenLine xmlns:a14="http://schemas.microsoft.com/office/drawing/2010/main" xmlns="" w="9525">
+                <a14:hiddenLine xmlns="" xmlns:a14="http://schemas.microsoft.com/office/drawing/2010/main" w="9525">
                   <a:solidFill>
                     <a:srgbClr val="000000"/>
                   </a:solidFill>
@@ -8362,7 +8573,7 @@
             </a:ln>
             <a:extLst>
               <a:ext uri="{91240B29-F687-4f45-9708-019B960494DF}">
-                <a14:hiddenLine xmlns:a14="http://schemas.microsoft.com/office/drawing/2010/main" xmlns="" w="9525">
+                <a14:hiddenLine xmlns="" xmlns:a14="http://schemas.microsoft.com/office/drawing/2010/main" w="9525">
                   <a:solidFill>
                     <a:srgbClr val="000000"/>
                   </a:solidFill>
@@ -8430,7 +8641,7 @@
             </a:ln>
             <a:extLst>
               <a:ext uri="{91240B29-F687-4f45-9708-019B960494DF}">
-                <a14:hiddenLine xmlns:a14="http://schemas.microsoft.com/office/drawing/2010/main" xmlns="" w="9525">
+                <a14:hiddenLine xmlns="" xmlns:a14="http://schemas.microsoft.com/office/drawing/2010/main" w="9525">
                   <a:solidFill>
                     <a:srgbClr val="000000"/>
                   </a:solidFill>
@@ -8520,7 +8731,7 @@
             </a:ln>
             <a:extLst>
               <a:ext uri="{91240B29-F687-4f45-9708-019B960494DF}">
-                <a14:hiddenLine xmlns:a14="http://schemas.microsoft.com/office/drawing/2010/main" xmlns="" w="9525">
+                <a14:hiddenLine xmlns="" xmlns:a14="http://schemas.microsoft.com/office/drawing/2010/main" w="9525">
                   <a:solidFill>
                     <a:srgbClr val="000000"/>
                   </a:solidFill>
@@ -8588,7 +8799,7 @@
             </a:ln>
             <a:extLst>
               <a:ext uri="{91240B29-F687-4f45-9708-019B960494DF}">
-                <a14:hiddenLine xmlns:a14="http://schemas.microsoft.com/office/drawing/2010/main" xmlns="" w="9525">
+                <a14:hiddenLine xmlns="" xmlns:a14="http://schemas.microsoft.com/office/drawing/2010/main" w="9525">
                   <a:solidFill>
                     <a:srgbClr val="000000"/>
                   </a:solidFill>
@@ -8678,7 +8889,7 @@
             </a:ln>
             <a:extLst>
               <a:ext uri="{91240B29-F687-4f45-9708-019B960494DF}">
-                <a14:hiddenLine xmlns:a14="http://schemas.microsoft.com/office/drawing/2010/main" xmlns="" w="9525">
+                <a14:hiddenLine xmlns="" xmlns:a14="http://schemas.microsoft.com/office/drawing/2010/main" w="9525">
                   <a:solidFill>
                     <a:srgbClr val="000000"/>
                   </a:solidFill>
@@ -8712,7 +8923,7 @@
             </a:ln>
             <a:extLst>
               <a:ext uri="{91240B29-F687-4f45-9708-019B960494DF}">
-                <a14:hiddenLine xmlns:a14="http://schemas.microsoft.com/office/drawing/2010/main" xmlns="" w="9525">
+                <a14:hiddenLine xmlns="" xmlns:a14="http://schemas.microsoft.com/office/drawing/2010/main" w="9525">
                   <a:solidFill>
                     <a:srgbClr val="000000"/>
                   </a:solidFill>
@@ -8802,7 +9013,7 @@
             </a:ln>
             <a:extLst>
               <a:ext uri="{91240B29-F687-4f45-9708-019B960494DF}">
-                <a14:hiddenLine xmlns:a14="http://schemas.microsoft.com/office/drawing/2010/main" xmlns="" w="9525">
+                <a14:hiddenLine xmlns="" xmlns:a14="http://schemas.microsoft.com/office/drawing/2010/main" w="9525">
                   <a:solidFill>
                     <a:srgbClr val="000000"/>
                   </a:solidFill>
@@ -8864,7 +9075,7 @@
             </a:ln>
             <a:extLst>
               <a:ext uri="{91240B29-F687-4f45-9708-019B960494DF}">
-                <a14:hiddenLine xmlns:a14="http://schemas.microsoft.com/office/drawing/2010/main" xmlns="" w="9525">
+                <a14:hiddenLine xmlns="" xmlns:a14="http://schemas.microsoft.com/office/drawing/2010/main" w="9525">
                   <a:solidFill>
                     <a:srgbClr val="000000"/>
                   </a:solidFill>
@@ -8926,7 +9137,7 @@
             </a:ln>
             <a:extLst>
               <a:ext uri="{91240B29-F687-4f45-9708-019B960494DF}">
-                <a14:hiddenLine xmlns:a14="http://schemas.microsoft.com/office/drawing/2010/main" xmlns="" w="9525">
+                <a14:hiddenLine xmlns="" xmlns:a14="http://schemas.microsoft.com/office/drawing/2010/main" w="9525">
                   <a:solidFill>
                     <a:srgbClr val="000000"/>
                   </a:solidFill>
@@ -9016,7 +9227,7 @@
             </a:ln>
             <a:extLst>
               <a:ext uri="{91240B29-F687-4f45-9708-019B960494DF}">
-                <a14:hiddenLine xmlns:a14="http://schemas.microsoft.com/office/drawing/2010/main" xmlns="" w="9525">
+                <a14:hiddenLine xmlns="" xmlns:a14="http://schemas.microsoft.com/office/drawing/2010/main" w="9525">
                   <a:solidFill>
                     <a:srgbClr val="000000"/>
                   </a:solidFill>
@@ -9084,7 +9295,7 @@
             </a:ln>
             <a:extLst>
               <a:ext uri="{91240B29-F687-4f45-9708-019B960494DF}">
-                <a14:hiddenLine xmlns:a14="http://schemas.microsoft.com/office/drawing/2010/main" xmlns="" w="9525">
+                <a14:hiddenLine xmlns="" xmlns:a14="http://schemas.microsoft.com/office/drawing/2010/main" w="9525">
                   <a:solidFill>
                     <a:srgbClr val="000000"/>
                   </a:solidFill>
@@ -9146,7 +9357,7 @@
             </a:ln>
             <a:extLst>
               <a:ext uri="{91240B29-F687-4f45-9708-019B960494DF}">
-                <a14:hiddenLine xmlns:a14="http://schemas.microsoft.com/office/drawing/2010/main" xmlns="" w="9525">
+                <a14:hiddenLine xmlns="" xmlns:a14="http://schemas.microsoft.com/office/drawing/2010/main" w="9525">
                   <a:solidFill>
                     <a:srgbClr val="000000"/>
                   </a:solidFill>
@@ -9236,7 +9447,7 @@
             </a:ln>
             <a:extLst>
               <a:ext uri="{91240B29-F687-4f45-9708-019B960494DF}">
-                <a14:hiddenLine xmlns:a14="http://schemas.microsoft.com/office/drawing/2010/main" xmlns="" w="9525">
+                <a14:hiddenLine xmlns="" xmlns:a14="http://schemas.microsoft.com/office/drawing/2010/main" w="9525">
                   <a:solidFill>
                     <a:srgbClr val="000000"/>
                   </a:solidFill>
@@ -9298,7 +9509,7 @@
             </a:ln>
             <a:extLst>
               <a:ext uri="{91240B29-F687-4f45-9708-019B960494DF}">
-                <a14:hiddenLine xmlns:a14="http://schemas.microsoft.com/office/drawing/2010/main" xmlns="" w="9525">
+                <a14:hiddenLine xmlns="" xmlns:a14="http://schemas.microsoft.com/office/drawing/2010/main" w="9525">
                   <a:solidFill>
                     <a:srgbClr val="000000"/>
                   </a:solidFill>
@@ -9388,7 +9599,7 @@
             </a:ln>
             <a:extLst>
               <a:ext uri="{91240B29-F687-4f45-9708-019B960494DF}">
-                <a14:hiddenLine xmlns:a14="http://schemas.microsoft.com/office/drawing/2010/main" xmlns="" w="9525">
+                <a14:hiddenLine xmlns="" xmlns:a14="http://schemas.microsoft.com/office/drawing/2010/main" w="9525">
                   <a:solidFill>
                     <a:srgbClr val="000000"/>
                   </a:solidFill>
@@ -9450,7 +9661,7 @@
             </a:ln>
             <a:extLst>
               <a:ext uri="{91240B29-F687-4f45-9708-019B960494DF}">
-                <a14:hiddenLine xmlns:a14="http://schemas.microsoft.com/office/drawing/2010/main" xmlns="" w="9525">
+                <a14:hiddenLine xmlns="" xmlns:a14="http://schemas.microsoft.com/office/drawing/2010/main" w="9525">
                   <a:solidFill>
                     <a:srgbClr val="000000"/>
                   </a:solidFill>
@@ -9540,7 +9751,7 @@
             </a:ln>
             <a:extLst>
               <a:ext uri="{91240B29-F687-4f45-9708-019B960494DF}">
-                <a14:hiddenLine xmlns:a14="http://schemas.microsoft.com/office/drawing/2010/main" xmlns="" w="9525">
+                <a14:hiddenLine xmlns="" xmlns:a14="http://schemas.microsoft.com/office/drawing/2010/main" w="9525">
                   <a:solidFill>
                     <a:srgbClr val="000000"/>
                   </a:solidFill>
@@ -9574,7 +9785,7 @@
             </a:ln>
             <a:extLst>
               <a:ext uri="{91240B29-F687-4f45-9708-019B960494DF}">
-                <a14:hiddenLine xmlns:a14="http://schemas.microsoft.com/office/drawing/2010/main" xmlns="" w="9525">
+                <a14:hiddenLine xmlns="" xmlns:a14="http://schemas.microsoft.com/office/drawing/2010/main" w="9525">
                   <a:solidFill>
                     <a:srgbClr val="000000"/>
                   </a:solidFill>
@@ -9639,7 +9850,7 @@
             </a:ln>
             <a:extLst>
               <a:ext uri="{91240B29-F687-4f45-9708-019B960494DF}">
-                <a14:hiddenLine xmlns:a14="http://schemas.microsoft.com/office/drawing/2010/main" xmlns="" w="9525">
+                <a14:hiddenLine xmlns="" xmlns:a14="http://schemas.microsoft.com/office/drawing/2010/main" w="9525">
                   <a:solidFill>
                     <a:srgbClr val="000000"/>
                   </a:solidFill>
@@ -9729,7 +9940,7 @@
             </a:ln>
             <a:extLst>
               <a:ext uri="{91240B29-F687-4f45-9708-019B960494DF}">
-                <a14:hiddenLine xmlns:a14="http://schemas.microsoft.com/office/drawing/2010/main" xmlns="" w="9525">
+                <a14:hiddenLine xmlns="" xmlns:a14="http://schemas.microsoft.com/office/drawing/2010/main" w="9525">
                   <a:solidFill>
                     <a:srgbClr val="000000"/>
                   </a:solidFill>
@@ -9791,7 +10002,7 @@
             </a:ln>
             <a:extLst>
               <a:ext uri="{91240B29-F687-4f45-9708-019B960494DF}">
-                <a14:hiddenLine xmlns:a14="http://schemas.microsoft.com/office/drawing/2010/main" xmlns="" w="9525">
+                <a14:hiddenLine xmlns="" xmlns:a14="http://schemas.microsoft.com/office/drawing/2010/main" w="9525">
                   <a:solidFill>
                     <a:srgbClr val="000000"/>
                   </a:solidFill>
@@ -9881,7 +10092,7 @@
             </a:ln>
             <a:extLst>
               <a:ext uri="{91240B29-F687-4f45-9708-019B960494DF}">
-                <a14:hiddenLine xmlns:a14="http://schemas.microsoft.com/office/drawing/2010/main" xmlns="" w="9525">
+                <a14:hiddenLine xmlns="" xmlns:a14="http://schemas.microsoft.com/office/drawing/2010/main" w="9525">
                   <a:solidFill>
                     <a:srgbClr val="000000"/>
                   </a:solidFill>
@@ -9971,7 +10182,7 @@
             </a:ln>
             <a:extLst>
               <a:ext uri="{91240B29-F687-4f45-9708-019B960494DF}">
-                <a14:hiddenLine xmlns:a14="http://schemas.microsoft.com/office/drawing/2010/main" xmlns="" w="9525">
+                <a14:hiddenLine xmlns="" xmlns:a14="http://schemas.microsoft.com/office/drawing/2010/main" w="9525">
                   <a:solidFill>
                     <a:srgbClr val="000000"/>
                   </a:solidFill>
@@ -10036,7 +10247,7 @@
             </a:ln>
             <a:extLst>
               <a:ext uri="{91240B29-F687-4f45-9708-019B960494DF}">
-                <a14:hiddenLine xmlns:a14="http://schemas.microsoft.com/office/drawing/2010/main" xmlns="" w="9525">
+                <a14:hiddenLine xmlns="" xmlns:a14="http://schemas.microsoft.com/office/drawing/2010/main" w="9525">
                   <a:solidFill>
                     <a:srgbClr val="000000"/>
                   </a:solidFill>
@@ -10098,7 +10309,7 @@
             </a:ln>
             <a:extLst>
               <a:ext uri="{91240B29-F687-4f45-9708-019B960494DF}">
-                <a14:hiddenLine xmlns:a14="http://schemas.microsoft.com/office/drawing/2010/main" xmlns="" w="9525">
+                <a14:hiddenLine xmlns="" xmlns:a14="http://schemas.microsoft.com/office/drawing/2010/main" w="9525">
                   <a:solidFill>
                     <a:srgbClr val="000000"/>
                   </a:solidFill>
@@ -10188,7 +10399,7 @@
             </a:ln>
             <a:extLst>
               <a:ext uri="{91240B29-F687-4f45-9708-019B960494DF}">
-                <a14:hiddenLine xmlns:a14="http://schemas.microsoft.com/office/drawing/2010/main" xmlns="" w="9525">
+                <a14:hiddenLine xmlns="" xmlns:a14="http://schemas.microsoft.com/office/drawing/2010/main" w="9525">
                   <a:solidFill>
                     <a:srgbClr val="000000"/>
                   </a:solidFill>
@@ -10278,7 +10489,7 @@
             </a:ln>
             <a:extLst>
               <a:ext uri="{91240B29-F687-4f45-9708-019B960494DF}">
-                <a14:hiddenLine xmlns:a14="http://schemas.microsoft.com/office/drawing/2010/main" xmlns="" w="9525">
+                <a14:hiddenLine xmlns="" xmlns:a14="http://schemas.microsoft.com/office/drawing/2010/main" w="9525">
                   <a:solidFill>
                     <a:srgbClr val="000000"/>
                   </a:solidFill>
@@ -10340,7 +10551,7 @@
             </a:ln>
             <a:extLst>
               <a:ext uri="{91240B29-F687-4f45-9708-019B960494DF}">
-                <a14:hiddenLine xmlns:a14="http://schemas.microsoft.com/office/drawing/2010/main" xmlns="" w="9525">
+                <a14:hiddenLine xmlns="" xmlns:a14="http://schemas.microsoft.com/office/drawing/2010/main" w="9525">
                   <a:solidFill>
                     <a:srgbClr val="000000"/>
                   </a:solidFill>
@@ -10460,7 +10671,7 @@
             </a:ln>
             <a:extLst>
               <a:ext uri="{91240B29-F687-4f45-9708-019B960494DF}">
-                <a14:hiddenLine xmlns:a14="http://schemas.microsoft.com/office/drawing/2010/main" xmlns="" w="9525">
+                <a14:hiddenLine xmlns="" xmlns:a14="http://schemas.microsoft.com/office/drawing/2010/main" w="9525">
                   <a:solidFill>
                     <a:srgbClr val="000000"/>
                   </a:solidFill>
@@ -10528,7 +10739,7 @@
             </a:ln>
             <a:extLst>
               <a:ext uri="{91240B29-F687-4f45-9708-019B960494DF}">
-                <a14:hiddenLine xmlns:a14="http://schemas.microsoft.com/office/drawing/2010/main" xmlns="" w="9525">
+                <a14:hiddenLine xmlns="" xmlns:a14="http://schemas.microsoft.com/office/drawing/2010/main" w="9525">
                   <a:solidFill>
                     <a:srgbClr val="000000"/>
                   </a:solidFill>
@@ -10618,7 +10829,7 @@
             </a:ln>
             <a:extLst>
               <a:ext uri="{91240B29-F687-4f45-9708-019B960494DF}">
-                <a14:hiddenLine xmlns:a14="http://schemas.microsoft.com/office/drawing/2010/main" xmlns="" w="9525">
+                <a14:hiddenLine xmlns="" xmlns:a14="http://schemas.microsoft.com/office/drawing/2010/main" w="9525">
                   <a:solidFill>
                     <a:srgbClr val="000000"/>
                   </a:solidFill>
@@ -10758,7 +10969,7 @@
           <a:p>
             <a:fld id="{41DCBB70-9A08-4AA5-A271-721B6525CB9F}" type="datetime1">
               <a:rPr lang="en-US" smtClean="0"/>
-              <a:t>6/11/2017</a:t>
+              <a:t>6/14/17</a:t>
             </a:fld>
             <a:endParaRPr lang="en-US"/>
           </a:p>
@@ -11025,7 +11236,7 @@
           <a:p>
             <a:fld id="{9E661AA1-C993-49F4-84DE-675C7065B200}" type="datetime1">
               <a:rPr lang="en-US" smtClean="0"/>
-              <a:t>6/11/2017</a:t>
+              <a:t>6/14/17</a:t>
             </a:fld>
             <a:endParaRPr lang="en-US"/>
           </a:p>
@@ -11221,7 +11432,7 @@
           <a:p>
             <a:fld id="{35ED3023-723E-443F-8079-577C9EEE921C}" type="datetime1">
               <a:rPr lang="en-US" smtClean="0"/>
-              <a:t>6/11/2017</a:t>
+              <a:t>6/14/17</a:t>
             </a:fld>
             <a:endParaRPr lang="en-US"/>
           </a:p>
@@ -11484,7 +11695,7 @@
           <a:p>
             <a:fld id="{6B73FD1C-B51A-48F7-AC02-2F0D97D814F7}" type="datetime1">
               <a:rPr lang="en-US" smtClean="0"/>
-              <a:t>6/11/2017</a:t>
+              <a:t>6/14/17</a:t>
             </a:fld>
             <a:endParaRPr lang="en-US"/>
           </a:p>
@@ -11918,7 +12129,7 @@
           <a:p>
             <a:fld id="{FB8D9E83-F75A-43AD-B2ED-7E8CAF48F668}" type="datetime1">
               <a:rPr lang="en-US" smtClean="0"/>
-              <a:t>6/11/2017</a:t>
+              <a:t>6/14/17</a:t>
             </a:fld>
             <a:endParaRPr lang="en-US"/>
           </a:p>
@@ -12464,7 +12675,7 @@
           <a:p>
             <a:fld id="{768A83B0-3BAE-4E53-B5B7-0FF7FE737D64}" type="datetime1">
               <a:rPr lang="en-US" smtClean="0"/>
-              <a:t>6/11/2017</a:t>
+              <a:t>6/14/17</a:t>
             </a:fld>
             <a:endParaRPr lang="en-US"/>
           </a:p>
@@ -13184,7 +13395,7 @@
           <a:p>
             <a:fld id="{B16730D7-1777-41F9-B918-BBBB96CD566E}" type="datetime1">
               <a:rPr lang="en-US" smtClean="0"/>
-              <a:t>6/11/2017</a:t>
+              <a:t>6/14/17</a:t>
             </a:fld>
             <a:endParaRPr lang="en-US"/>
           </a:p>
@@ -13354,7 +13565,7 @@
           <a:p>
             <a:fld id="{6D09EAFD-48A8-461E-BE3C-44687419BF39}" type="datetime1">
               <a:rPr lang="en-US" smtClean="0"/>
-              <a:t>6/11/2017</a:t>
+              <a:t>6/14/17</a:t>
             </a:fld>
             <a:endParaRPr lang="en-US"/>
           </a:p>
@@ -13534,7 +13745,7 @@
           <a:p>
             <a:fld id="{8FD3B498-F311-4C43-B1BB-5A8293E0A9A4}" type="datetime1">
               <a:rPr lang="en-US" smtClean="0"/>
-              <a:t>6/11/2017</a:t>
+              <a:t>6/14/17</a:t>
             </a:fld>
             <a:endParaRPr lang="en-US"/>
           </a:p>
@@ -13704,7 +13915,7 @@
           <a:p>
             <a:fld id="{883771BF-CA23-432F-8D8B-D4805A2FDC25}" type="datetime1">
               <a:rPr lang="en-US" smtClean="0"/>
-              <a:t>6/11/2017</a:t>
+              <a:t>6/14/17</a:t>
             </a:fld>
             <a:endParaRPr lang="en-US"/>
           </a:p>
@@ -13954,7 +14165,7 @@
           <a:p>
             <a:fld id="{1D68C36A-6259-4E5A-A049-3DCA1D14583C}" type="datetime1">
               <a:rPr lang="en-US" smtClean="0"/>
-              <a:t>6/11/2017</a:t>
+              <a:t>6/14/17</a:t>
             </a:fld>
             <a:endParaRPr lang="en-US"/>
           </a:p>
@@ -14186,7 +14397,7 @@
           <a:p>
             <a:fld id="{F34191F4-FB8B-48CA-AE1C-459EE9927C52}" type="datetime1">
               <a:rPr lang="en-US" smtClean="0"/>
-              <a:t>6/11/2017</a:t>
+              <a:t>6/14/17</a:t>
             </a:fld>
             <a:endParaRPr lang="en-US"/>
           </a:p>
@@ -14567,7 +14778,7 @@
           <a:p>
             <a:fld id="{1A00DB3D-0C93-46F0-85AD-FA7B3F55FC09}" type="datetime1">
               <a:rPr lang="en-US" smtClean="0"/>
-              <a:t>6/11/2017</a:t>
+              <a:t>6/14/17</a:t>
             </a:fld>
             <a:endParaRPr lang="en-US"/>
           </a:p>
@@ -14685,7 +14896,7 @@
           <a:p>
             <a:fld id="{497B238E-31D3-4B1F-B348-185C972FE44A}" type="datetime1">
               <a:rPr lang="en-US" smtClean="0"/>
-              <a:t>6/11/2017</a:t>
+              <a:t>6/14/17</a:t>
             </a:fld>
             <a:endParaRPr lang="en-US"/>
           </a:p>
@@ -14780,7 +14991,7 @@
           <a:p>
             <a:fld id="{19582FB6-8FF1-4BD0-8894-95577FB7710C}" type="datetime1">
               <a:rPr lang="en-US" smtClean="0"/>
-              <a:t>6/11/2017</a:t>
+              <a:t>6/14/17</a:t>
             </a:fld>
             <a:endParaRPr lang="en-US"/>
           </a:p>
@@ -15029,7 +15240,7 @@
           <a:p>
             <a:fld id="{4DA5B7C6-DBC3-44D3-B529-A12A76EAA082}" type="datetime1">
               <a:rPr lang="en-US" smtClean="0"/>
-              <a:t>6/11/2017</a:t>
+              <a:t>6/14/17</a:t>
             </a:fld>
             <a:endParaRPr lang="en-US"/>
           </a:p>
@@ -15309,7 +15520,7 @@
           <a:p>
             <a:fld id="{A5E04D17-1D2A-4495-A1D2-AEA6C5658C0F}" type="datetime1">
               <a:rPr lang="en-US" smtClean="0"/>
-              <a:t>6/11/2017</a:t>
+              <a:t>6/14/17</a:t>
             </a:fld>
             <a:endParaRPr lang="en-US"/>
           </a:p>
@@ -15425,7 +15636,7 @@
           <a:noFill/>
           <a:extLst>
             <a:ext uri="{909E8E84-426E-40dd-AFC4-6F175D3DCCD1}">
-              <a14:hiddenFill xmlns:a14="http://schemas.microsoft.com/office/drawing/2010/main" xmlns="">
+              <a14:hiddenFill xmlns="" xmlns:a14="http://schemas.microsoft.com/office/drawing/2010/main">
                 <a:solidFill>
                   <a:srgbClr val="FFFFFF"/>
                 </a:solidFill>
@@ -15499,7 +15710,7 @@
               </a:ln>
               <a:extLst>
                 <a:ext uri="{91240B29-F687-4f45-9708-019B960494DF}">
-                  <a14:hiddenLine xmlns:a14="http://schemas.microsoft.com/office/drawing/2010/main" xmlns="" w="9525">
+                  <a14:hiddenLine xmlns="" xmlns:a14="http://schemas.microsoft.com/office/drawing/2010/main" w="9525">
                     <a:solidFill>
                       <a:srgbClr val="000000"/>
                     </a:solidFill>
@@ -15589,7 +15800,7 @@
               </a:ln>
               <a:extLst>
                 <a:ext uri="{91240B29-F687-4f45-9708-019B960494DF}">
-                  <a14:hiddenLine xmlns:a14="http://schemas.microsoft.com/office/drawing/2010/main" xmlns="" w="9525">
+                  <a14:hiddenLine xmlns="" xmlns:a14="http://schemas.microsoft.com/office/drawing/2010/main" w="9525">
                     <a:solidFill>
                       <a:srgbClr val="000000"/>
                     </a:solidFill>
@@ -15679,7 +15890,7 @@
               </a:ln>
               <a:extLst>
                 <a:ext uri="{91240B29-F687-4f45-9708-019B960494DF}">
-                  <a14:hiddenLine xmlns:a14="http://schemas.microsoft.com/office/drawing/2010/main" xmlns="" w="9525">
+                  <a14:hiddenLine xmlns="" xmlns:a14="http://schemas.microsoft.com/office/drawing/2010/main" w="9525">
                     <a:solidFill>
                       <a:srgbClr val="000000"/>
                     </a:solidFill>
@@ -15741,7 +15952,7 @@
               </a:ln>
               <a:extLst>
                 <a:ext uri="{91240B29-F687-4f45-9708-019B960494DF}">
-                  <a14:hiddenLine xmlns:a14="http://schemas.microsoft.com/office/drawing/2010/main" xmlns="" w="9525">
+                  <a14:hiddenLine xmlns="" xmlns:a14="http://schemas.microsoft.com/office/drawing/2010/main" w="9525">
                     <a:solidFill>
                       <a:srgbClr val="000000"/>
                     </a:solidFill>
@@ -15831,7 +16042,7 @@
               </a:ln>
               <a:extLst>
                 <a:ext uri="{91240B29-F687-4f45-9708-019B960494DF}">
-                  <a14:hiddenLine xmlns:a14="http://schemas.microsoft.com/office/drawing/2010/main" xmlns="" w="9525">
+                  <a14:hiddenLine xmlns="" xmlns:a14="http://schemas.microsoft.com/office/drawing/2010/main" w="9525">
                     <a:solidFill>
                       <a:srgbClr val="000000"/>
                     </a:solidFill>
@@ -15893,7 +16104,7 @@
               </a:ln>
               <a:extLst>
                 <a:ext uri="{91240B29-F687-4f45-9708-019B960494DF}">
-                  <a14:hiddenLine xmlns:a14="http://schemas.microsoft.com/office/drawing/2010/main" xmlns="" w="9525">
+                  <a14:hiddenLine xmlns="" xmlns:a14="http://schemas.microsoft.com/office/drawing/2010/main" w="9525">
                     <a:solidFill>
                       <a:srgbClr val="000000"/>
                     </a:solidFill>
@@ -15955,7 +16166,7 @@
               </a:ln>
               <a:extLst>
                 <a:ext uri="{91240B29-F687-4f45-9708-019B960494DF}">
-                  <a14:hiddenLine xmlns:a14="http://schemas.microsoft.com/office/drawing/2010/main" xmlns="" w="9525">
+                  <a14:hiddenLine xmlns="" xmlns:a14="http://schemas.microsoft.com/office/drawing/2010/main" w="9525">
                     <a:solidFill>
                       <a:srgbClr val="000000"/>
                     </a:solidFill>
@@ -16045,7 +16256,7 @@
               </a:ln>
               <a:extLst>
                 <a:ext uri="{91240B29-F687-4f45-9708-019B960494DF}">
-                  <a14:hiddenLine xmlns:a14="http://schemas.microsoft.com/office/drawing/2010/main" xmlns="" w="9525">
+                  <a14:hiddenLine xmlns="" xmlns:a14="http://schemas.microsoft.com/office/drawing/2010/main" w="9525">
                     <a:solidFill>
                       <a:srgbClr val="000000"/>
                     </a:solidFill>
@@ -16135,7 +16346,7 @@
               </a:ln>
               <a:extLst>
                 <a:ext uri="{91240B29-F687-4f45-9708-019B960494DF}">
-                  <a14:hiddenLine xmlns:a14="http://schemas.microsoft.com/office/drawing/2010/main" xmlns="" w="9525">
+                  <a14:hiddenLine xmlns="" xmlns:a14="http://schemas.microsoft.com/office/drawing/2010/main" w="9525">
                     <a:solidFill>
                       <a:srgbClr val="000000"/>
                     </a:solidFill>
@@ -16197,7 +16408,7 @@
               </a:ln>
               <a:extLst>
                 <a:ext uri="{91240B29-F687-4f45-9708-019B960494DF}">
-                  <a14:hiddenLine xmlns:a14="http://schemas.microsoft.com/office/drawing/2010/main" xmlns="" w="9525">
+                  <a14:hiddenLine xmlns="" xmlns:a14="http://schemas.microsoft.com/office/drawing/2010/main" w="9525">
                     <a:solidFill>
                       <a:srgbClr val="000000"/>
                     </a:solidFill>
@@ -16307,7 +16518,7 @@
               </a:ln>
               <a:extLst>
                 <a:ext uri="{91240B29-F687-4f45-9708-019B960494DF}">
-                  <a14:hiddenLine xmlns:a14="http://schemas.microsoft.com/office/drawing/2010/main" xmlns="" w="9525">
+                  <a14:hiddenLine xmlns="" xmlns:a14="http://schemas.microsoft.com/office/drawing/2010/main" w="9525">
                     <a:solidFill>
                       <a:srgbClr val="000000"/>
                     </a:solidFill>
@@ -16391,7 +16602,7 @@
               </a:ln>
               <a:extLst>
                 <a:ext uri="{91240B29-F687-4f45-9708-019B960494DF}">
-                  <a14:hiddenLine xmlns:a14="http://schemas.microsoft.com/office/drawing/2010/main" xmlns="" w="9525">
+                  <a14:hiddenLine xmlns="" xmlns:a14="http://schemas.microsoft.com/office/drawing/2010/main" w="9525">
                     <a:solidFill>
                       <a:srgbClr val="000000"/>
                     </a:solidFill>
@@ -16453,7 +16664,7 @@
               </a:ln>
               <a:extLst>
                 <a:ext uri="{91240B29-F687-4f45-9708-019B960494DF}">
-                  <a14:hiddenLine xmlns:a14="http://schemas.microsoft.com/office/drawing/2010/main" xmlns="" w="9525">
+                  <a14:hiddenLine xmlns="" xmlns:a14="http://schemas.microsoft.com/office/drawing/2010/main" w="9525">
                     <a:solidFill>
                       <a:srgbClr val="000000"/>
                     </a:solidFill>
@@ -16515,7 +16726,7 @@
               </a:ln>
               <a:extLst>
                 <a:ext uri="{91240B29-F687-4f45-9708-019B960494DF}">
-                  <a14:hiddenLine xmlns:a14="http://schemas.microsoft.com/office/drawing/2010/main" xmlns="" w="9525">
+                  <a14:hiddenLine xmlns="" xmlns:a14="http://schemas.microsoft.com/office/drawing/2010/main" w="9525">
                     <a:solidFill>
                       <a:srgbClr val="000000"/>
                     </a:solidFill>
@@ -16605,7 +16816,7 @@
               </a:ln>
               <a:extLst>
                 <a:ext uri="{91240B29-F687-4f45-9708-019B960494DF}">
-                  <a14:hiddenLine xmlns:a14="http://schemas.microsoft.com/office/drawing/2010/main" xmlns="" w="9525">
+                  <a14:hiddenLine xmlns="" xmlns:a14="http://schemas.microsoft.com/office/drawing/2010/main" w="9525">
                     <a:solidFill>
                       <a:srgbClr val="000000"/>
                     </a:solidFill>
@@ -16639,7 +16850,7 @@
               </a:ln>
               <a:extLst>
                 <a:ext uri="{91240B29-F687-4f45-9708-019B960494DF}">
-                  <a14:hiddenLine xmlns:a14="http://schemas.microsoft.com/office/drawing/2010/main" xmlns="" w="9525">
+                  <a14:hiddenLine xmlns="" xmlns:a14="http://schemas.microsoft.com/office/drawing/2010/main" w="9525">
                     <a:solidFill>
                       <a:srgbClr val="000000"/>
                     </a:solidFill>
@@ -16704,7 +16915,7 @@
               </a:ln>
               <a:extLst>
                 <a:ext uri="{91240B29-F687-4f45-9708-019B960494DF}">
-                  <a14:hiddenLine xmlns:a14="http://schemas.microsoft.com/office/drawing/2010/main" xmlns="" w="9525">
+                  <a14:hiddenLine xmlns="" xmlns:a14="http://schemas.microsoft.com/office/drawing/2010/main" w="9525">
                     <a:solidFill>
                       <a:srgbClr val="000000"/>
                     </a:solidFill>
@@ -16794,7 +17005,7 @@
               </a:ln>
               <a:extLst>
                 <a:ext uri="{91240B29-F687-4f45-9708-019B960494DF}">
-                  <a14:hiddenLine xmlns:a14="http://schemas.microsoft.com/office/drawing/2010/main" xmlns="" w="9525">
+                  <a14:hiddenLine xmlns="" xmlns:a14="http://schemas.microsoft.com/office/drawing/2010/main" w="9525">
                     <a:solidFill>
                       <a:srgbClr val="000000"/>
                     </a:solidFill>
@@ -16856,7 +17067,7 @@
               </a:ln>
               <a:extLst>
                 <a:ext uri="{91240B29-F687-4f45-9708-019B960494DF}">
-                  <a14:hiddenLine xmlns:a14="http://schemas.microsoft.com/office/drawing/2010/main" xmlns="" w="9525">
+                  <a14:hiddenLine xmlns="" xmlns:a14="http://schemas.microsoft.com/office/drawing/2010/main" w="9525">
                     <a:solidFill>
                       <a:srgbClr val="000000"/>
                     </a:solidFill>
@@ -16946,7 +17157,7 @@
               </a:ln>
               <a:extLst>
                 <a:ext uri="{91240B29-F687-4f45-9708-019B960494DF}">
-                  <a14:hiddenLine xmlns:a14="http://schemas.microsoft.com/office/drawing/2010/main" xmlns="" w="9525">
+                  <a14:hiddenLine xmlns="" xmlns:a14="http://schemas.microsoft.com/office/drawing/2010/main" w="9525">
                     <a:solidFill>
                       <a:srgbClr val="000000"/>
                     </a:solidFill>
@@ -17011,7 +17222,7 @@
               </a:ln>
               <a:extLst>
                 <a:ext uri="{91240B29-F687-4f45-9708-019B960494DF}">
-                  <a14:hiddenLine xmlns:a14="http://schemas.microsoft.com/office/drawing/2010/main" xmlns="" w="9525">
+                  <a14:hiddenLine xmlns="" xmlns:a14="http://schemas.microsoft.com/office/drawing/2010/main" w="9525">
                     <a:solidFill>
                       <a:srgbClr val="000000"/>
                     </a:solidFill>
@@ -17073,7 +17284,7 @@
               </a:ln>
               <a:extLst>
                 <a:ext uri="{91240B29-F687-4f45-9708-019B960494DF}">
-                  <a14:hiddenLine xmlns:a14="http://schemas.microsoft.com/office/drawing/2010/main" xmlns="" w="9525">
+                  <a14:hiddenLine xmlns="" xmlns:a14="http://schemas.microsoft.com/office/drawing/2010/main" w="9525">
                     <a:solidFill>
                       <a:srgbClr val="000000"/>
                     </a:solidFill>
@@ -17163,7 +17374,7 @@
               </a:ln>
               <a:extLst>
                 <a:ext uri="{91240B29-F687-4f45-9708-019B960494DF}">
-                  <a14:hiddenLine xmlns:a14="http://schemas.microsoft.com/office/drawing/2010/main" xmlns="" w="9525">
+                  <a14:hiddenLine xmlns="" xmlns:a14="http://schemas.microsoft.com/office/drawing/2010/main" w="9525">
                     <a:solidFill>
                       <a:srgbClr val="000000"/>
                     </a:solidFill>
@@ -17253,7 +17464,7 @@
               </a:ln>
               <a:extLst>
                 <a:ext uri="{91240B29-F687-4f45-9708-019B960494DF}">
-                  <a14:hiddenLine xmlns:a14="http://schemas.microsoft.com/office/drawing/2010/main" xmlns="" w="9525">
+                  <a14:hiddenLine xmlns="" xmlns:a14="http://schemas.microsoft.com/office/drawing/2010/main" w="9525">
                     <a:solidFill>
                       <a:srgbClr val="000000"/>
                     </a:solidFill>
@@ -17318,7 +17529,7 @@
               </a:ln>
               <a:extLst>
                 <a:ext uri="{91240B29-F687-4f45-9708-019B960494DF}">
-                  <a14:hiddenLine xmlns:a14="http://schemas.microsoft.com/office/drawing/2010/main" xmlns="" w="9525">
+                  <a14:hiddenLine xmlns="" xmlns:a14="http://schemas.microsoft.com/office/drawing/2010/main" w="9525">
                     <a:solidFill>
                       <a:srgbClr val="000000"/>
                     </a:solidFill>
@@ -17438,7 +17649,7 @@
               </a:ln>
               <a:extLst>
                 <a:ext uri="{91240B29-F687-4f45-9708-019B960494DF}">
-                  <a14:hiddenLine xmlns:a14="http://schemas.microsoft.com/office/drawing/2010/main" xmlns="" w="9525">
+                  <a14:hiddenLine xmlns="" xmlns:a14="http://schemas.microsoft.com/office/drawing/2010/main" w="9525">
                     <a:solidFill>
                       <a:srgbClr val="000000"/>
                     </a:solidFill>
@@ -17536,7 +17747,7 @@
               </a:ln>
               <a:extLst>
                 <a:ext uri="{91240B29-F687-4f45-9708-019B960494DF}">
-                  <a14:hiddenLine xmlns:a14="http://schemas.microsoft.com/office/drawing/2010/main" xmlns="" w="9525">
+                  <a14:hiddenLine xmlns="" xmlns:a14="http://schemas.microsoft.com/office/drawing/2010/main" w="9525">
                     <a:solidFill>
                       <a:srgbClr val="000000"/>
                     </a:solidFill>
@@ -17651,7 +17862,7 @@
               </a:ln>
               <a:extLst>
                 <a:ext uri="{91240B29-F687-4f45-9708-019B960494DF}">
-                  <a14:hiddenLine xmlns:a14="http://schemas.microsoft.com/office/drawing/2010/main" xmlns="" w="9525">
+                  <a14:hiddenLine xmlns="" xmlns:a14="http://schemas.microsoft.com/office/drawing/2010/main" w="9525">
                     <a:solidFill>
                       <a:srgbClr val="000000"/>
                     </a:solidFill>
@@ -17741,7 +17952,7 @@
               </a:ln>
               <a:extLst>
                 <a:ext uri="{91240B29-F687-4f45-9708-019B960494DF}">
-                  <a14:hiddenLine xmlns:a14="http://schemas.microsoft.com/office/drawing/2010/main" xmlns="" w="9525">
+                  <a14:hiddenLine xmlns="" xmlns:a14="http://schemas.microsoft.com/office/drawing/2010/main" w="9525">
                     <a:solidFill>
                       <a:srgbClr val="000000"/>
                     </a:solidFill>
@@ -17806,7 +18017,7 @@
               </a:ln>
               <a:extLst>
                 <a:ext uri="{91240B29-F687-4f45-9708-019B960494DF}">
-                  <a14:hiddenLine xmlns:a14="http://schemas.microsoft.com/office/drawing/2010/main" xmlns="" w="9525">
+                  <a14:hiddenLine xmlns="" xmlns:a14="http://schemas.microsoft.com/office/drawing/2010/main" w="9525">
                     <a:solidFill>
                       <a:srgbClr val="000000"/>
                     </a:solidFill>
@@ -17896,7 +18107,7 @@
               </a:ln>
               <a:extLst>
                 <a:ext uri="{91240B29-F687-4f45-9708-019B960494DF}">
-                  <a14:hiddenLine xmlns:a14="http://schemas.microsoft.com/office/drawing/2010/main" xmlns="" w="9525">
+                  <a14:hiddenLine xmlns="" xmlns:a14="http://schemas.microsoft.com/office/drawing/2010/main" w="9525">
                     <a:solidFill>
                       <a:srgbClr val="000000"/>
                     </a:solidFill>
@@ -17964,7 +18175,7 @@
               </a:ln>
               <a:extLst>
                 <a:ext uri="{91240B29-F687-4f45-9708-019B960494DF}">
-                  <a14:hiddenLine xmlns:a14="http://schemas.microsoft.com/office/drawing/2010/main" xmlns="" w="9525">
+                  <a14:hiddenLine xmlns="" xmlns:a14="http://schemas.microsoft.com/office/drawing/2010/main" w="9525">
                     <a:solidFill>
                       <a:srgbClr val="000000"/>
                     </a:solidFill>
@@ -18054,7 +18265,7 @@
               </a:ln>
               <a:extLst>
                 <a:ext uri="{91240B29-F687-4f45-9708-019B960494DF}">
-                  <a14:hiddenLine xmlns:a14="http://schemas.microsoft.com/office/drawing/2010/main" xmlns="" w="9525">
+                  <a14:hiddenLine xmlns="" xmlns:a14="http://schemas.microsoft.com/office/drawing/2010/main" w="9525">
                     <a:solidFill>
                       <a:srgbClr val="000000"/>
                     </a:solidFill>
@@ -18122,7 +18333,7 @@
               </a:ln>
               <a:extLst>
                 <a:ext uri="{91240B29-F687-4f45-9708-019B960494DF}">
-                  <a14:hiddenLine xmlns:a14="http://schemas.microsoft.com/office/drawing/2010/main" xmlns="" w="9525">
+                  <a14:hiddenLine xmlns="" xmlns:a14="http://schemas.microsoft.com/office/drawing/2010/main" w="9525">
                     <a:solidFill>
                       <a:srgbClr val="000000"/>
                     </a:solidFill>
@@ -18212,7 +18423,7 @@
               </a:ln>
               <a:extLst>
                 <a:ext uri="{91240B29-F687-4f45-9708-019B960494DF}">
-                  <a14:hiddenLine xmlns:a14="http://schemas.microsoft.com/office/drawing/2010/main" xmlns="" w="9525">
+                  <a14:hiddenLine xmlns="" xmlns:a14="http://schemas.microsoft.com/office/drawing/2010/main" w="9525">
                     <a:solidFill>
                       <a:srgbClr val="000000"/>
                     </a:solidFill>
@@ -18246,7 +18457,7 @@
               </a:ln>
               <a:extLst>
                 <a:ext uri="{91240B29-F687-4f45-9708-019B960494DF}">
-                  <a14:hiddenLine xmlns:a14="http://schemas.microsoft.com/office/drawing/2010/main" xmlns="" w="9525">
+                  <a14:hiddenLine xmlns="" xmlns:a14="http://schemas.microsoft.com/office/drawing/2010/main" w="9525">
                     <a:solidFill>
                       <a:srgbClr val="000000"/>
                     </a:solidFill>
@@ -18386,7 +18597,7 @@
           <a:p>
             <a:fld id="{0780C3C2-E360-4074-89B7-939D42F4D217}" type="datetime1">
               <a:rPr lang="en-US" smtClean="0"/>
-              <a:t>6/11/2017</a:t>
+              <a:t>6/14/17</a:t>
             </a:fld>
             <a:endParaRPr lang="en-US"/>
           </a:p>
@@ -34446,8 +34657,12 @@
               <a:t>Static code analysis tools such as </a:t>
             </a:r>
             <a:r>
-              <a:rPr lang="en-US" dirty="0" err="1"/>
+              <a:rPr lang="en-US" dirty="0" err="1" smtClean="0"/>
               <a:t>Klocwork</a:t>
+            </a:r>
+            <a:r>
+              <a:rPr lang="en-US" dirty="0" smtClean="0"/>
+              <a:t> </a:t>
             </a:r>
             <a:endParaRPr lang="en-US" dirty="0"/>
           </a:p>
@@ -34468,8 +34683,13 @@
           <a:p>
             <a:r>
               <a:rPr lang="en-US" dirty="0"/>
-              <a:t>Fuzzing the enclave (with a kind help of edger8r tool)</a:t>
-            </a:r>
+              <a:t>Fuzzing the enclave (with a kind help of edger8r </a:t>
+            </a:r>
+            <a:r>
+              <a:rPr lang="en-US" dirty="0" smtClean="0"/>
+              <a:t>tool, both from OCALL and ECALL sides)</a:t>
+            </a:r>
+            <a:endParaRPr lang="en-US" dirty="0"/>
           </a:p>
         </p:txBody>
       </p:sp>
@@ -34543,8 +34763,15 @@
           <a:p>
             <a:r>
               <a:rPr lang="en-US" dirty="0"/>
-              <a:t>Special thanks</a:t>
-            </a:r>
+              <a:t>BTW, Intel opened a bug bounty program </a:t>
+            </a:r>
+            <a:r>
+              <a:rPr lang="en-US" dirty="0">
+                <a:sym typeface="Wingdings" panose="05000000000000000000" pitchFamily="2" charset="2"/>
+              </a:rPr>
+              <a:t></a:t>
+            </a:r>
+            <a:endParaRPr lang="en-US" dirty="0"/>
           </a:p>
         </p:txBody>
       </p:sp>
@@ -34564,21 +34791,31 @@
           <a:lstStyle/>
           <a:p>
             <a:r>
-              <a:rPr lang="en-US" dirty="0"/>
-              <a:t>Lars Richter @ayeks.de</a:t>
-            </a:r>
-          </a:p>
-          <a:p>
-            <a:r>
-              <a:rPr lang="en-US" dirty="0"/>
-              <a:t>My colleagues – if you hear this – it was an honor to work with you and I wouldn’t find all these bugs alone.</a:t>
-            </a:r>
-          </a:p>
-          <a:p>
-            <a:r>
-              <a:rPr lang="en-US" dirty="0"/>
-              <a:t>Recon organizers. It’s an honor to present here.</a:t>
-            </a:r>
+              <a:rPr lang="en-US" dirty="0">
+                <a:hlinkClick r:id="rId3"/>
+              </a:rPr>
+              <a:t>https://security-center.intel.com/BugBountyProgram.aspx</a:t>
+            </a:r>
+            <a:endParaRPr lang="en-US" dirty="0"/>
+          </a:p>
+          <a:p>
+            <a:r>
+              <a:rPr lang="en-US" dirty="0"/>
+              <a:t>All the PSW is a critical part of the infrastructure</a:t>
+            </a:r>
+          </a:p>
+          <a:p>
+            <a:pPr lvl="1"/>
+            <a:r>
+              <a:rPr lang="en-US" dirty="0"/>
+              <a:t>Bugs which are found sooner are easier to cure</a:t>
+            </a:r>
+          </a:p>
+          <a:p>
+            <a:pPr marL="0" indent="0">
+              <a:buNone/>
+            </a:pPr>
+            <a:endParaRPr lang="en-US" dirty="0"/>
           </a:p>
         </p:txBody>
       </p:sp>
@@ -34608,7 +34845,7 @@
     </p:spTree>
     <p:extLst>
       <p:ext uri="{BB962C8B-B14F-4D97-AF65-F5344CB8AC3E}">
-        <p14:creationId xmlns:p14="http://schemas.microsoft.com/office/powerpoint/2010/main" val="3110051537"/>
+        <p14:creationId xmlns:p14="http://schemas.microsoft.com/office/powerpoint/2010/main" val="2106738480"/>
       </p:ext>
     </p:extLst>
   </p:cSld>
@@ -34640,7 +34877,7 @@
           <p:cNvPr id="2" name="כותרת 1">
             <a:extLst>
               <a:ext uri="{FF2B5EF4-FFF2-40B4-BE49-F238E27FC236}">
-                <a16:creationId xmlns:a16="http://schemas.microsoft.com/office/drawing/2014/main" id="{2441E693-AAC6-490E-AAB9-F3263105878D}"/>
+                <a16:creationId xmlns:a16="http://schemas.microsoft.com/office/drawing/2014/main" xmlns="" id="{2441E693-AAC6-490E-AAB9-F3263105878D}"/>
               </a:ext>
             </a:extLst>
           </p:cNvPr>
@@ -34668,7 +34905,7 @@
           <p:cNvPr id="3" name="מציין מיקום תוכן 2">
             <a:extLst>
               <a:ext uri="{FF2B5EF4-FFF2-40B4-BE49-F238E27FC236}">
-                <a16:creationId xmlns:a16="http://schemas.microsoft.com/office/drawing/2014/main" id="{40D7FADA-349C-4F46-A92A-84063BD0ED85}"/>
+                <a16:creationId xmlns:a16="http://schemas.microsoft.com/office/drawing/2014/main" xmlns="" id="{40D7FADA-349C-4F46-A92A-84063BD0ED85}"/>
               </a:ext>
             </a:extLst>
           </p:cNvPr>
@@ -34714,7 +34951,7 @@
           <p:cNvPr id="4" name="מציין מיקום של מספר שקופית 3">
             <a:extLst>
               <a:ext uri="{FF2B5EF4-FFF2-40B4-BE49-F238E27FC236}">
-                <a16:creationId xmlns:a16="http://schemas.microsoft.com/office/drawing/2014/main" id="{DCC7083C-F067-4A46-953F-24D561884803}"/>
+                <a16:creationId xmlns:a16="http://schemas.microsoft.com/office/drawing/2014/main" xmlns="" id="{DCC7083C-F067-4A46-953F-24D561884803}"/>
               </a:ext>
             </a:extLst>
           </p:cNvPr>
@@ -34785,15 +35022,8 @@
           <a:p>
             <a:r>
               <a:rPr lang="en-US" dirty="0"/>
-              <a:t>BTW, Intel opened a bug bounty program </a:t>
-            </a:r>
-            <a:r>
-              <a:rPr lang="en-US" dirty="0">
-                <a:sym typeface="Wingdings" panose="05000000000000000000" pitchFamily="2" charset="2"/>
-              </a:rPr>
-              <a:t></a:t>
-            </a:r>
-            <a:endParaRPr lang="en-US" dirty="0"/>
+              <a:t>enclave – USEFUL links</a:t>
+            </a:r>
           </a:p>
         </p:txBody>
       </p:sp>
@@ -34809,34 +35039,120 @@
         </p:nvSpPr>
         <p:spPr/>
         <p:txBody>
-          <a:bodyPr/>
+          <a:bodyPr>
+            <a:normAutofit fontScale="62500" lnSpcReduction="20000"/>
+          </a:bodyPr>
           <a:lstStyle/>
           <a:p>
+            <a:r>
+              <a:rPr lang="en-US" dirty="0"/>
+              <a:t>Where to start : </a:t>
+            </a:r>
             <a:r>
               <a:rPr lang="en-US" dirty="0">
                 <a:hlinkClick r:id="rId3"/>
               </a:rPr>
-              <a:t>https://security-center.intel.com/BugBountyProgram.aspx</a:t>
+              <a:t>https://software.intel.com/en-us/sgx</a:t>
+            </a:r>
+            <a:r>
+              <a:rPr lang="en-US" dirty="0"/>
+              <a:t> </a:t>
+            </a:r>
+          </a:p>
+          <a:p>
+            <a:r>
+              <a:rPr lang="en-US" dirty="0"/>
+              <a:t>ISCA 2015 SGX tutorial: </a:t>
+            </a:r>
+            <a:r>
+              <a:rPr lang="en-US" dirty="0">
+                <a:hlinkClick r:id="rId4"/>
+              </a:rPr>
+              <a:t>https://software.intel.com/sites/default/files/332680-002.pdf</a:t>
             </a:r>
             <a:endParaRPr lang="en-US" dirty="0"/>
           </a:p>
           <a:p>
             <a:r>
               <a:rPr lang="en-US" dirty="0"/>
-              <a:t>All the PSW is a critical part of the infrastructure</a:t>
+              <a:t>Good external analysis: </a:t>
+            </a:r>
+            <a:r>
+              <a:rPr lang="en-US" dirty="0">
+                <a:hlinkClick r:id="rId5"/>
+              </a:rPr>
+              <a:t>http://eprint.iacr.org/2016/086.pdf</a:t>
+            </a:r>
+            <a:r>
+              <a:rPr lang="en-US" dirty="0"/>
+              <a:t> </a:t>
+            </a:r>
+          </a:p>
+          <a:p>
+            <a:r>
+              <a:rPr lang="en-US" dirty="0"/>
+              <a:t>For HW - SDM is the best: Vol. 3D : </a:t>
+            </a:r>
+            <a:r>
+              <a:rPr lang="en-US" dirty="0">
+                <a:hlinkClick r:id="rId6"/>
+              </a:rPr>
+              <a:t>http://www.intel.com/content/dam/www/public/us/en/documents/manuals/64-ia-32-architectures-software-developer-manual-325462.pdf</a:t>
+            </a:r>
+            <a:r>
+              <a:rPr lang="en-US" dirty="0"/>
+              <a:t> </a:t>
+            </a:r>
+          </a:p>
+          <a:p>
+            <a:r>
+              <a:rPr lang="en-US" dirty="0"/>
+              <a:t>Linux SDK and platform software</a:t>
             </a:r>
           </a:p>
           <a:p>
             <a:pPr lvl="1"/>
             <a:r>
-              <a:rPr lang="en-US" dirty="0"/>
-              <a:t>Bugs which are found sooner are easier to cure</a:t>
-            </a:r>
-          </a:p>
-          <a:p>
-            <a:pPr marL="0" indent="0">
-              <a:buNone/>
-            </a:pPr>
+              <a:rPr lang="en-US" dirty="0">
+                <a:hlinkClick r:id="rId7"/>
+              </a:rPr>
+              <a:t>https://01.org/intel-softwareguard-extensions</a:t>
+            </a:r>
+            <a:r>
+              <a:rPr lang="en-US" dirty="0"/>
+              <a:t>  </a:t>
+            </a:r>
+          </a:p>
+          <a:p>
+            <a:pPr lvl="1"/>
+            <a:r>
+              <a:rPr lang="en-US" dirty="0">
+                <a:hlinkClick r:id="rId8"/>
+              </a:rPr>
+              <a:t>https://github.com/01org/linux-sgx</a:t>
+            </a:r>
+            <a:r>
+              <a:rPr lang="en-US" dirty="0"/>
+              <a:t> </a:t>
+            </a:r>
+          </a:p>
+          <a:p>
+            <a:r>
+              <a:rPr lang="en-US" dirty="0"/>
+              <a:t>Enclave writers guide </a:t>
+            </a:r>
+            <a:r>
+              <a:rPr lang="en-US" dirty="0">
+                <a:hlinkClick r:id="rId9"/>
+              </a:rPr>
+              <a:t>https://software.intel.com/sites/default/files/managed/ae/48/Software-Guard-Extensions-Enclave-Writers-Guide.pdf</a:t>
+            </a:r>
+            <a:r>
+              <a:rPr lang="en-US" dirty="0"/>
+              <a:t>   </a:t>
+            </a:r>
+          </a:p>
+          <a:p>
             <a:endParaRPr lang="en-US" dirty="0"/>
           </a:p>
         </p:txBody>
@@ -34867,7 +35183,7 @@
     </p:spTree>
     <p:extLst>
       <p:ext uri="{BB962C8B-B14F-4D97-AF65-F5344CB8AC3E}">
-        <p14:creationId xmlns:p14="http://schemas.microsoft.com/office/powerpoint/2010/main" val="2106738480"/>
+        <p14:creationId xmlns:p14="http://schemas.microsoft.com/office/powerpoint/2010/main" val="3255152671"/>
       </p:ext>
     </p:extLst>
   </p:cSld>
@@ -34911,7 +35227,7 @@
           <a:p>
             <a:r>
               <a:rPr lang="en-US" dirty="0"/>
-              <a:t>enclave – USEFUL links</a:t>
+              <a:t>Special thanks</a:t>
             </a:r>
           </a:p>
         </p:txBody>
@@ -34928,121 +35244,25 @@
         </p:nvSpPr>
         <p:spPr/>
         <p:txBody>
-          <a:bodyPr>
-            <a:normAutofit fontScale="62500" lnSpcReduction="20000"/>
-          </a:bodyPr>
+          <a:bodyPr/>
           <a:lstStyle/>
           <a:p>
             <a:r>
               <a:rPr lang="en-US" dirty="0"/>
-              <a:t>Where to start : </a:t>
-            </a:r>
-            <a:r>
-              <a:rPr lang="en-US" dirty="0">
-                <a:hlinkClick r:id="rId3"/>
-              </a:rPr>
-              <a:t>https://software.intel.com/en-us/sgx</a:t>
-            </a:r>
-            <a:r>
-              <a:rPr lang="en-US" dirty="0"/>
-              <a:t> </a:t>
-            </a:r>
-          </a:p>
-          <a:p>
-            <a:r>
-              <a:rPr lang="en-US" dirty="0"/>
-              <a:t>ISCA 2015 SGX tutorial: </a:t>
-            </a:r>
-            <a:r>
-              <a:rPr lang="en-US" dirty="0">
-                <a:hlinkClick r:id="rId4"/>
-              </a:rPr>
-              <a:t>https://software.intel.com/sites/default/files/332680-002.pdf</a:t>
-            </a:r>
-            <a:endParaRPr lang="en-US" dirty="0"/>
-          </a:p>
-          <a:p>
-            <a:r>
-              <a:rPr lang="en-US" dirty="0"/>
-              <a:t>Good external analysis: </a:t>
-            </a:r>
-            <a:r>
-              <a:rPr lang="en-US" dirty="0">
-                <a:hlinkClick r:id="rId5"/>
-              </a:rPr>
-              <a:t>http://eprint.iacr.org/2016/086.pdf</a:t>
-            </a:r>
-            <a:r>
-              <a:rPr lang="en-US" dirty="0"/>
-              <a:t> </a:t>
-            </a:r>
-          </a:p>
-          <a:p>
-            <a:r>
-              <a:rPr lang="en-US" dirty="0"/>
-              <a:t>For HW - SDM is the best: Vol. 3D : </a:t>
-            </a:r>
-            <a:r>
-              <a:rPr lang="en-US" dirty="0">
-                <a:hlinkClick r:id="rId6"/>
-              </a:rPr>
-              <a:t>http://www.intel.com/content/dam/www/public/us/en/documents/manuals/64-ia-32-architectures-software-developer-manual-325462.pdf</a:t>
-            </a:r>
-            <a:r>
-              <a:rPr lang="en-US" dirty="0"/>
-              <a:t> </a:t>
-            </a:r>
-          </a:p>
-          <a:p>
-            <a:r>
-              <a:rPr lang="en-US" dirty="0"/>
-              <a:t>Linux SDK and platform software</a:t>
-            </a:r>
-          </a:p>
-          <a:p>
-            <a:pPr lvl="1"/>
-            <a:r>
-              <a:rPr lang="en-US" dirty="0">
-                <a:hlinkClick r:id="rId7"/>
-              </a:rPr>
-              <a:t>https://01.org/intel-softwareguard-extensions</a:t>
-            </a:r>
-            <a:r>
-              <a:rPr lang="en-US" dirty="0"/>
-              <a:t>  </a:t>
-            </a:r>
-          </a:p>
-          <a:p>
-            <a:pPr lvl="1"/>
-            <a:r>
-              <a:rPr lang="en-US" dirty="0">
-                <a:hlinkClick r:id="rId8"/>
-              </a:rPr>
-              <a:t>https://github.com/01org/linux-sgx</a:t>
-            </a:r>
-            <a:r>
-              <a:rPr lang="en-US" dirty="0"/>
-              <a:t> </a:t>
-            </a:r>
-          </a:p>
-          <a:p>
-            <a:r>
-              <a:rPr lang="en-US" dirty="0"/>
-              <a:t>Enclave writers guide </a:t>
-            </a:r>
-            <a:r>
-              <a:rPr lang="en-US" dirty="0">
-                <a:hlinkClick r:id="rId9"/>
-              </a:rPr>
-              <a:t>https://software.intel.com/sites/default/files/managed/ae/48/Software-Guard-Extensions-Enclave-Writers-Guide.pdf</a:t>
-            </a:r>
-            <a:r>
-              <a:rPr lang="en-US" dirty="0"/>
-              <a:t>   </a:t>
-            </a:r>
-          </a:p>
-          <a:p>
-            <a:endParaRPr lang="en-US" dirty="0"/>
+              <a:t>Lars Richter @ayeks.de</a:t>
+            </a:r>
+          </a:p>
+          <a:p>
+            <a:r>
+              <a:rPr lang="en-US" dirty="0"/>
+              <a:t>My colleagues – if you hear this – it was an honor to work with you and I wouldn’t find all these bugs alone.</a:t>
+            </a:r>
+          </a:p>
+          <a:p>
+            <a:r>
+              <a:rPr lang="en-US" dirty="0"/>
+              <a:t>Recon organizers. It’s an honor to present here.</a:t>
+            </a:r>
           </a:p>
         </p:txBody>
       </p:sp>
@@ -35072,7 +35292,7 @@
     </p:spTree>
     <p:extLst>
       <p:ext uri="{BB962C8B-B14F-4D97-AF65-F5344CB8AC3E}">
-        <p14:creationId xmlns:p14="http://schemas.microsoft.com/office/powerpoint/2010/main" val="3255152671"/>
+        <p14:creationId xmlns:p14="http://schemas.microsoft.com/office/powerpoint/2010/main" val="3110051537"/>
       </p:ext>
     </p:extLst>
   </p:cSld>
@@ -35201,7 +35421,7 @@
           <p:cNvPr id="2" name="כותרת 1">
             <a:extLst>
               <a:ext uri="{FF2B5EF4-FFF2-40B4-BE49-F238E27FC236}">
-                <a16:creationId xmlns:a16="http://schemas.microsoft.com/office/drawing/2014/main" id="{E85A3F79-B5FD-453E-87B1-16E7A0A22C98}"/>
+                <a16:creationId xmlns:a16="http://schemas.microsoft.com/office/drawing/2014/main" xmlns="" id="{E85A3F79-B5FD-453E-87B1-16E7A0A22C98}"/>
               </a:ext>
             </a:extLst>
           </p:cNvPr>
@@ -35236,7 +35456,7 @@
           <p:cNvPr id="3" name="מציין מיקום תוכן 2">
             <a:extLst>
               <a:ext uri="{FF2B5EF4-FFF2-40B4-BE49-F238E27FC236}">
-                <a16:creationId xmlns:a16="http://schemas.microsoft.com/office/drawing/2014/main" id="{E296E813-5662-455A-8B30-6B4B8556C8BB}"/>
+                <a16:creationId xmlns:a16="http://schemas.microsoft.com/office/drawing/2014/main" xmlns="" id="{E296E813-5662-455A-8B30-6B4B8556C8BB}"/>
               </a:ext>
             </a:extLst>
           </p:cNvPr>
@@ -35295,7 +35515,7 @@
           <p:cNvPr id="4" name="מציין מיקום של מספר שקופית 3">
             <a:extLst>
               <a:ext uri="{FF2B5EF4-FFF2-40B4-BE49-F238E27FC236}">
-                <a16:creationId xmlns:a16="http://schemas.microsoft.com/office/drawing/2014/main" id="{E56584D9-68B2-425F-9636-C9626FB3477A}"/>
+                <a16:creationId xmlns:a16="http://schemas.microsoft.com/office/drawing/2014/main" xmlns="" id="{E56584D9-68B2-425F-9636-C9626FB3477A}"/>
               </a:ext>
             </a:extLst>
           </p:cNvPr>

</xml_diff>

<commit_message>
Last additions to the presentation
</commit_message>
<xml_diff>
--- a/docs/SGX Enclave Programming - Common Mistakes.pptx
+++ b/docs/SGX Enclave Programming - Common Mistakes.pptx
@@ -703,7 +703,31 @@
             <a:pPr lvl="1"/>
             <a:r>
               <a:rPr lang="en-US" dirty="0"/>
-              <a:t>SGX enclave is a code, written by programmers. They are making mistakes. I know that my English is bad, but I really mean that they are writing code now and making mistakes just now – it is never ending process and it will continue until something will not disappear: SGX or programmers </a:t>
+              <a:t>SGX enclave is a code, written by programmers. They are making mistakes. I know that my English is bad, but I really mean that they are writing code now and making mistakes just </a:t>
+            </a:r>
+            <a:r>
+              <a:rPr lang="en-US" dirty="0" smtClean="0"/>
+              <a:t>now, in this very moment</a:t>
+            </a:r>
+            <a:r>
+              <a:rPr lang="en-US" baseline="0" dirty="0" smtClean="0"/>
+              <a:t> (at least in countries were Sunday is a working day)</a:t>
+            </a:r>
+            <a:r>
+              <a:rPr lang="en-US" dirty="0" smtClean="0"/>
+              <a:t> </a:t>
+            </a:r>
+            <a:r>
+              <a:rPr lang="en-US" dirty="0"/>
+              <a:t>– </a:t>
+            </a:r>
+            <a:r>
+              <a:rPr lang="en-US" dirty="0" smtClean="0"/>
+              <a:t>and it </a:t>
+            </a:r>
+            <a:r>
+              <a:rPr lang="en-US" dirty="0"/>
+              <a:t>is never ending process and it will continue until something will not disappear: SGX or programmers </a:t>
             </a:r>
             <a:r>
               <a:rPr lang="en-US" dirty="0">
@@ -866,7 +890,15 @@
           <a:p>
             <a:r>
               <a:rPr lang="en-US" dirty="0"/>
-              <a:t>It also changes the focus of the attack: Attacks on SGX enclaves will be mostly focused on extracting of enclaves secrets and reusing enclaves capabilities rather then code execution - </a:t>
+              <a:t>It also changes the focus of the attack: </a:t>
+            </a:r>
+            <a:r>
+              <a:rPr lang="en-US" dirty="0" smtClean="0"/>
+              <a:t>really successful attacks </a:t>
+            </a:r>
+            <a:r>
+              <a:rPr lang="en-US" dirty="0"/>
+              <a:t>on SGX enclaves will be mostly focused on extracting of enclaves secrets and reusing enclaves capabilities rather then code execution - </a:t>
             </a:r>
           </a:p>
           <a:p>
@@ -976,26 +1008,101 @@
               <a:defRPr/>
             </a:pPr>
             <a:r>
-              <a:rPr lang="en-US" dirty="0"/>
-              <a:t>Side channel attacks are the special case: see SGX enclave writers guide </a:t>
-            </a:r>
-            <a:r>
-              <a:rPr lang="mr-IN" dirty="0"/>
+              <a:rPr lang="en-US" dirty="0" smtClean="0"/>
+              <a:t>As a part of changes in threat model </a:t>
+            </a:r>
+            <a:r>
+              <a:rPr lang="mr-IN" dirty="0" smtClean="0"/>
               <a:t>–</a:t>
             </a:r>
             <a:r>
-              <a:rPr lang="en-US" dirty="0"/>
-              <a:t> but you are more then welcome to explore this direction, it works</a:t>
-            </a:r>
-          </a:p>
-          <a:p>
-            <a:r>
-              <a:rPr lang="en-US" dirty="0"/>
-              <a:t>There are some articles published recently. I keeping this long quote here</a:t>
+              <a:rPr lang="en-US" baseline="0" dirty="0" smtClean="0"/>
+              <a:t> timing attacks are getting more and more important and this is a</a:t>
+            </a:r>
+            <a:r>
+              <a:rPr lang="en-US" dirty="0" smtClean="0"/>
+              <a:t> </a:t>
+            </a:r>
+          </a:p>
+          <a:p>
+            <a:pPr marL="0" marR="0" lvl="0" indent="0" algn="l" defTabSz="914400" rtl="0" eaLnBrk="1" fontAlgn="auto" latinLnBrk="0" hangingPunct="1">
+              <a:lnSpc>
+                <a:spcPct val="100000"/>
+              </a:lnSpc>
+              <a:spcBef>
+                <a:spcPts val="0"/>
+              </a:spcBef>
+              <a:spcAft>
+                <a:spcPts val="0"/>
+              </a:spcAft>
+              <a:buClrTx/>
+              <a:buSzTx/>
+              <a:buFontTx/>
+              <a:buNone/>
+              <a:tabLst/>
+              <a:defRPr/>
+            </a:pPr>
+            <a:r>
+              <a:rPr lang="en-US" dirty="0" smtClean="0"/>
+              <a:t>Very</a:t>
+            </a:r>
+            <a:r>
+              <a:rPr lang="en-US" baseline="0" dirty="0" smtClean="0"/>
+              <a:t> </a:t>
+            </a:r>
+            <a:r>
+              <a:rPr lang="en-US" dirty="0" smtClean="0"/>
+              <a:t>special case</a:t>
+            </a:r>
+            <a:r>
+              <a:rPr lang="en-US" baseline="0" dirty="0" smtClean="0"/>
+              <a:t> </a:t>
+            </a:r>
+            <a:r>
+              <a:rPr lang="mr-IN" dirty="0" smtClean="0"/>
+              <a:t>–</a:t>
+            </a:r>
+            <a:r>
+              <a:rPr lang="en-US" dirty="0" smtClean="0"/>
+              <a:t> </a:t>
+            </a:r>
+            <a:r>
+              <a:rPr lang="en-US" dirty="0"/>
+              <a:t>but you are more then welcome to explore this direction, it works</a:t>
+            </a:r>
+          </a:p>
+          <a:p>
+            <a:r>
+              <a:rPr lang="en-US" dirty="0"/>
+              <a:t>There are some articles published </a:t>
+            </a:r>
+            <a:r>
+              <a:rPr lang="en-US" dirty="0" smtClean="0"/>
+              <a:t>recently about it . </a:t>
+            </a:r>
+            <a:r>
+              <a:rPr lang="en-US" dirty="0"/>
+              <a:t>I keeping this long quote </a:t>
+            </a:r>
+            <a:r>
+              <a:rPr lang="en-US" dirty="0" smtClean="0"/>
+              <a:t>from the SGX enclave writers guide here</a:t>
+            </a:r>
+            <a:r>
+              <a:rPr lang="en-US" baseline="0" dirty="0" smtClean="0"/>
+              <a:t> </a:t>
             </a:r>
             <a:r>
               <a:rPr lang="en-US" baseline="0" dirty="0"/>
-              <a:t> for those that can not hear me and will be reading the presentation, it is exact quote from enclave writers guide – please don’t rush into reading it, the essence follows:</a:t>
+              <a:t>for those that can not hear me and will be reading the presentation, it is </a:t>
+            </a:r>
+            <a:r>
+              <a:rPr lang="en-US" baseline="0" dirty="0" smtClean="0"/>
+              <a:t>an exact quote. Please </a:t>
+            </a:r>
+            <a:r>
+              <a:rPr lang="en-US" baseline="0" dirty="0"/>
+              <a:t>don’t rush into reading it, the essence follows:</a:t>
             </a:r>
             <a:endParaRPr lang="en-US" dirty="0"/>
           </a:p>
@@ -4514,13 +4621,10 @@
               <a:t>Debug enclave sent to </a:t>
             </a:r>
             <a:r>
-              <a:rPr lang="en-US" dirty="0" err="1"/>
-              <a:t>to</a:t>
-            </a:r>
-            <a:r>
-              <a:rPr lang="en-US" dirty="0"/>
-              <a:t> production</a:t>
-            </a:r>
+              <a:rPr lang="en-US" dirty="0" smtClean="0"/>
+              <a:t>production</a:t>
+            </a:r>
+            <a:endParaRPr lang="en-US" dirty="0"/>
           </a:p>
           <a:p>
             <a:r>
@@ -4932,8 +5036,37 @@
           <a:p>
             <a:r>
               <a:rPr lang="en-US" dirty="0"/>
-              <a:t>Please note that most interesting things almost can not be found dynamically.</a:t>
-            </a:r>
+              <a:t>Please note that most interesting things almost can not be found dynamically</a:t>
+            </a:r>
+            <a:r>
+              <a:rPr lang="en-US" dirty="0" smtClean="0"/>
+              <a:t>.</a:t>
+            </a:r>
+          </a:p>
+          <a:p>
+            <a:r>
+              <a:rPr lang="en-US" dirty="0" smtClean="0"/>
+              <a:t>“Bad design guard” </a:t>
+            </a:r>
+            <a:r>
+              <a:rPr lang="mr-IN" dirty="0" smtClean="0"/>
+              <a:t>–</a:t>
+            </a:r>
+            <a:r>
+              <a:rPr lang="en-US" dirty="0" smtClean="0"/>
+              <a:t> wee really need</a:t>
+            </a:r>
+            <a:r>
+              <a:rPr lang="en-US" baseline="0" dirty="0" smtClean="0"/>
+              <a:t> it </a:t>
+            </a:r>
+            <a:r>
+              <a:rPr lang="en-US" baseline="0" dirty="0" smtClean="0">
+                <a:sym typeface="Wingdings"/>
+              </a:rPr>
+              <a:t></a:t>
+            </a:r>
+            <a:endParaRPr lang="en-US" dirty="0"/>
           </a:p>
         </p:txBody>
       </p:sp>
@@ -5105,8 +5238,29 @@
           <a:p>
             <a:r>
               <a:rPr lang="en-US" baseline="0" dirty="0"/>
-              <a:t>7 – Read through the code</a:t>
-            </a:r>
+              <a:t>7 – Read through the </a:t>
+            </a:r>
+            <a:r>
+              <a:rPr lang="en-US" baseline="0" dirty="0" smtClean="0"/>
+              <a:t>code of the </a:t>
+            </a:r>
+            <a:r>
+              <a:rPr lang="en-US" baseline="0" smtClean="0"/>
+              <a:t>Enclave test (show </a:t>
+            </a:r>
+            <a:r>
+              <a:rPr lang="en-US" baseline="0" dirty="0" smtClean="0"/>
+              <a:t>shortcuts: we using for the </a:t>
+            </a:r>
+            <a:r>
+              <a:rPr lang="en-US" baseline="0" smtClean="0"/>
+              <a:t>same EDL and even the same class for ECALLS, but the OCALLS are changed). </a:t>
+            </a:r>
+            <a:r>
+              <a:rPr lang="en-US" baseline="0" dirty="0" smtClean="0"/>
+              <a:t>Show generated files </a:t>
+            </a:r>
+            <a:endParaRPr lang="en-US" baseline="0" dirty="0"/>
           </a:p>
           <a:p>
             <a:r>
@@ -5454,11 +5608,7 @@
             </a:r>
             <a:r>
               <a:rPr lang="en-US" baseline="0" dirty="0" smtClean="0"/>
-              <a:t> and missing information can </a:t>
-            </a:r>
-            <a:r>
-              <a:rPr lang="en-US" baseline="0" smtClean="0"/>
-              <a:t>be obtained by code review. </a:t>
+              <a:t> and missing information can be obtained by code review. </a:t>
             </a:r>
             <a:endParaRPr lang="en-US" dirty="0" smtClean="0"/>
           </a:p>
@@ -32328,9 +32478,10 @@
           <a:p>
             <a:pPr lvl="1"/>
             <a:r>
-              <a:rPr lang="en-US" dirty="0"/>
-              <a:t>Call your crypto PhD, don’t do it yourself</a:t>
-            </a:r>
+              <a:rPr lang="en-US" dirty="0" smtClean="0"/>
+              <a:t>Writing crypto code all alone (call your crypto PhD to avoid this) </a:t>
+            </a:r>
+            <a:endParaRPr lang="en-US" dirty="0"/>
           </a:p>
         </p:txBody>
       </p:sp>

</xml_diff>